<commit_message>
Hasan mono performance finalized
See WPG_output/Hasan_mono/WPG_4_bounce_mono_demo.pptx
</commit_message>
<xml_diff>
--- a/WPG_output/Hasan_Mono/WPG_4_bounce_mono_demo.pptx
+++ b/WPG_output/Hasan_Mono/WPG_4_bounce_mono_demo.pptx
@@ -5,10 +5,10 @@
     <p:sldMasterId id="2147483648" r:id="rId4"/>
   </p:sldMasterIdLst>
   <p:notesMasterIdLst>
-    <p:notesMasterId r:id="rId23"/>
+    <p:notesMasterId r:id="rId25"/>
   </p:notesMasterIdLst>
   <p:handoutMasterIdLst>
-    <p:handoutMasterId r:id="rId24"/>
+    <p:handoutMasterId r:id="rId26"/>
   </p:handoutMasterIdLst>
   <p:sldIdLst>
     <p:sldId id="269" r:id="rId5"/>
@@ -21,19 +21,21 @@
     <p:sldId id="294" r:id="rId12"/>
     <p:sldId id="305" r:id="rId13"/>
     <p:sldId id="295" r:id="rId14"/>
-    <p:sldId id="296" r:id="rId15"/>
-    <p:sldId id="297" r:id="rId16"/>
-    <p:sldId id="298" r:id="rId17"/>
-    <p:sldId id="299" r:id="rId18"/>
-    <p:sldId id="300" r:id="rId19"/>
-    <p:sldId id="301" r:id="rId20"/>
-    <p:sldId id="306" r:id="rId21"/>
-    <p:sldId id="309" r:id="rId22"/>
+    <p:sldId id="310" r:id="rId15"/>
+    <p:sldId id="298" r:id="rId16"/>
+    <p:sldId id="299" r:id="rId17"/>
+    <p:sldId id="300" r:id="rId18"/>
+    <p:sldId id="301" r:id="rId19"/>
+    <p:sldId id="306" r:id="rId20"/>
+    <p:sldId id="309" r:id="rId21"/>
+    <p:sldId id="311" r:id="rId22"/>
+    <p:sldId id="296" r:id="rId23"/>
+    <p:sldId id="297" r:id="rId24"/>
   </p:sldIdLst>
   <p:sldSz cx="9144000" cy="6858000" type="screen4x3"/>
   <p:notesSz cx="6858000" cy="9144000"/>
   <p:custDataLst>
-    <p:tags r:id="rId25"/>
+    <p:tags r:id="rId27"/>
   </p:custDataLst>
   <p:defaultTextStyle>
     <a:defPPr>
@@ -332,7 +334,7 @@
             <a:fld id="{4FEBF33E-D9A7-42CC-B598-9AD8356CBB5A}" type="datetimeFigureOut">
               <a:rPr lang="en-US" smtClean="0"/>
               <a:pPr/>
-              <a:t>6/20/2020</a:t>
+              <a:t>7/2/2020</a:t>
             </a:fld>
             <a:endParaRPr lang="en-US"/>
           </a:p>
@@ -495,7 +497,7 @@
             <a:fld id="{C3B58700-9FA2-48CE-AC88-D71D45EB490A}" type="datetimeFigureOut">
               <a:rPr lang="en-US" smtClean="0"/>
               <a:pPr/>
-              <a:t>6/20/2020</a:t>
+              <a:t>7/2/2020</a:t>
             </a:fld>
             <a:endParaRPr lang="en-US" dirty="0"/>
           </a:p>
@@ -1010,7 +1012,7 @@
     </p:spTree>
     <p:extLst>
       <p:ext uri="{BB962C8B-B14F-4D97-AF65-F5344CB8AC3E}">
-        <p14:creationId xmlns:p14="http://schemas.microsoft.com/office/powerpoint/2010/main" val="618602414"/>
+        <p14:creationId xmlns:p14="http://schemas.microsoft.com/office/powerpoint/2010/main" val="4028132763"/>
       </p:ext>
     </p:extLst>
   </p:cSld>
@@ -1097,7 +1099,7 @@
     </p:spTree>
     <p:extLst>
       <p:ext uri="{BB962C8B-B14F-4D97-AF65-F5344CB8AC3E}">
-        <p14:creationId xmlns:p14="http://schemas.microsoft.com/office/powerpoint/2010/main" val="1543343612"/>
+        <p14:creationId xmlns:p14="http://schemas.microsoft.com/office/powerpoint/2010/main" val="3617525860"/>
       </p:ext>
     </p:extLst>
   </p:cSld>
@@ -1184,7 +1186,7 @@
     </p:spTree>
     <p:extLst>
       <p:ext uri="{BB962C8B-B14F-4D97-AF65-F5344CB8AC3E}">
-        <p14:creationId xmlns:p14="http://schemas.microsoft.com/office/powerpoint/2010/main" val="3617525860"/>
+        <p14:creationId xmlns:p14="http://schemas.microsoft.com/office/powerpoint/2010/main" val="863068246"/>
       </p:ext>
     </p:extLst>
   </p:cSld>
@@ -1271,7 +1273,7 @@
     </p:spTree>
     <p:extLst>
       <p:ext uri="{BB962C8B-B14F-4D97-AF65-F5344CB8AC3E}">
-        <p14:creationId xmlns:p14="http://schemas.microsoft.com/office/powerpoint/2010/main" val="863068246"/>
+        <p14:creationId xmlns:p14="http://schemas.microsoft.com/office/powerpoint/2010/main" val="113385380"/>
       </p:ext>
     </p:extLst>
   </p:cSld>
@@ -1358,7 +1360,7 @@
     </p:spTree>
     <p:extLst>
       <p:ext uri="{BB962C8B-B14F-4D97-AF65-F5344CB8AC3E}">
-        <p14:creationId xmlns:p14="http://schemas.microsoft.com/office/powerpoint/2010/main" val="113385380"/>
+        <p14:creationId xmlns:p14="http://schemas.microsoft.com/office/powerpoint/2010/main" val="3516181412"/>
       </p:ext>
     </p:extLst>
   </p:cSld>
@@ -1445,7 +1447,7 @@
     </p:spTree>
     <p:extLst>
       <p:ext uri="{BB962C8B-B14F-4D97-AF65-F5344CB8AC3E}">
-        <p14:creationId xmlns:p14="http://schemas.microsoft.com/office/powerpoint/2010/main" val="3516181412"/>
+        <p14:creationId xmlns:p14="http://schemas.microsoft.com/office/powerpoint/2010/main" val="3586015514"/>
       </p:ext>
     </p:extLst>
   </p:cSld>
@@ -1532,7 +1534,7 @@
     </p:spTree>
     <p:extLst>
       <p:ext uri="{BB962C8B-B14F-4D97-AF65-F5344CB8AC3E}">
-        <p14:creationId xmlns:p14="http://schemas.microsoft.com/office/powerpoint/2010/main" val="3586015514"/>
+        <p14:creationId xmlns:p14="http://schemas.microsoft.com/office/powerpoint/2010/main" val="712590958"/>
       </p:ext>
     </p:extLst>
   </p:cSld>
@@ -1619,7 +1621,94 @@
     </p:spTree>
     <p:extLst>
       <p:ext uri="{BB962C8B-B14F-4D97-AF65-F5344CB8AC3E}">
-        <p14:creationId xmlns:p14="http://schemas.microsoft.com/office/powerpoint/2010/main" val="712590958"/>
+        <p14:creationId xmlns:p14="http://schemas.microsoft.com/office/powerpoint/2010/main" val="268388504"/>
+      </p:ext>
+    </p:extLst>
+  </p:cSld>
+  <p:clrMapOvr>
+    <a:masterClrMapping/>
+  </p:clrMapOvr>
+</p:notes>
+</file>
+
+<file path=ppt/notesSlides/notesSlide19.xml><?xml version="1.0" encoding="utf-8"?>
+<p:notes xmlns:a="http://schemas.openxmlformats.org/drawingml/2006/main" xmlns:r="http://schemas.openxmlformats.org/officeDocument/2006/relationships" xmlns:p="http://schemas.openxmlformats.org/presentationml/2006/main">
+  <p:cSld>
+    <p:spTree>
+      <p:nvGrpSpPr>
+        <p:cNvPr id="1" name=""/>
+        <p:cNvGrpSpPr/>
+        <p:nvPr/>
+      </p:nvGrpSpPr>
+      <p:grpSpPr>
+        <a:xfrm>
+          <a:off x="0" y="0"/>
+          <a:ext cx="0" cy="0"/>
+          <a:chOff x="0" y="0"/>
+          <a:chExt cx="0" cy="0"/>
+        </a:xfrm>
+      </p:grpSpPr>
+      <p:sp>
+        <p:nvSpPr>
+          <p:cNvPr id="2" name="Slide Image Placeholder 1"/>
+          <p:cNvSpPr>
+            <a:spLocks noGrp="1" noRot="1" noChangeAspect="1"/>
+          </p:cNvSpPr>
+          <p:nvPr>
+            <p:ph type="sldImg"/>
+          </p:nvPr>
+        </p:nvSpPr>
+        <p:spPr/>
+      </p:sp>
+      <p:sp>
+        <p:nvSpPr>
+          <p:cNvPr id="3" name="Notes Placeholder 2"/>
+          <p:cNvSpPr>
+            <a:spLocks noGrp="1"/>
+          </p:cNvSpPr>
+          <p:nvPr>
+            <p:ph type="body" idx="1"/>
+          </p:nvPr>
+        </p:nvSpPr>
+        <p:spPr/>
+        <p:txBody>
+          <a:bodyPr>
+            <a:normAutofit/>
+          </a:bodyPr>
+          <a:lstStyle/>
+          <a:p>
+            <a:endParaRPr lang="en-US"/>
+          </a:p>
+        </p:txBody>
+      </p:sp>
+      <p:sp>
+        <p:nvSpPr>
+          <p:cNvPr id="4" name="Slide Number Placeholder 3"/>
+          <p:cNvSpPr>
+            <a:spLocks noGrp="1"/>
+          </p:cNvSpPr>
+          <p:nvPr>
+            <p:ph type="sldNum" sz="quarter" idx="10"/>
+          </p:nvPr>
+        </p:nvSpPr>
+        <p:spPr/>
+        <p:txBody>
+          <a:bodyPr/>
+          <a:lstStyle/>
+          <a:p>
+            <a:fld id="{FE9BC4E5-2BC1-4F43-85DD-A1B8F74CB7EB}" type="slidenum">
+              <a:rPr lang="en-US" smtClean="0"/>
+              <a:pPr/>
+              <a:t>19</a:t>
+            </a:fld>
+            <a:endParaRPr lang="en-US" dirty="0"/>
+          </a:p>
+        </p:txBody>
+      </p:sp>
+    </p:spTree>
+    <p:extLst>
+      <p:ext uri="{BB962C8B-B14F-4D97-AF65-F5344CB8AC3E}">
+        <p14:creationId xmlns:p14="http://schemas.microsoft.com/office/powerpoint/2010/main" val="2853305726"/>
       </p:ext>
     </p:extLst>
   </p:cSld>
@@ -1707,6 +1796,93 @@
     <p:extLst>
       <p:ext uri="{BB962C8B-B14F-4D97-AF65-F5344CB8AC3E}">
         <p14:creationId xmlns:p14="http://schemas.microsoft.com/office/powerpoint/2010/main" val="1304895239"/>
+      </p:ext>
+    </p:extLst>
+  </p:cSld>
+  <p:clrMapOvr>
+    <a:masterClrMapping/>
+  </p:clrMapOvr>
+</p:notes>
+</file>
+
+<file path=ppt/notesSlides/notesSlide20.xml><?xml version="1.0" encoding="utf-8"?>
+<p:notes xmlns:a="http://schemas.openxmlformats.org/drawingml/2006/main" xmlns:r="http://schemas.openxmlformats.org/officeDocument/2006/relationships" xmlns:p="http://schemas.openxmlformats.org/presentationml/2006/main">
+  <p:cSld>
+    <p:spTree>
+      <p:nvGrpSpPr>
+        <p:cNvPr id="1" name=""/>
+        <p:cNvGrpSpPr/>
+        <p:nvPr/>
+      </p:nvGrpSpPr>
+      <p:grpSpPr>
+        <a:xfrm>
+          <a:off x="0" y="0"/>
+          <a:ext cx="0" cy="0"/>
+          <a:chOff x="0" y="0"/>
+          <a:chExt cx="0" cy="0"/>
+        </a:xfrm>
+      </p:grpSpPr>
+      <p:sp>
+        <p:nvSpPr>
+          <p:cNvPr id="2" name="Slide Image Placeholder 1"/>
+          <p:cNvSpPr>
+            <a:spLocks noGrp="1" noRot="1" noChangeAspect="1"/>
+          </p:cNvSpPr>
+          <p:nvPr>
+            <p:ph type="sldImg"/>
+          </p:nvPr>
+        </p:nvSpPr>
+        <p:spPr/>
+      </p:sp>
+      <p:sp>
+        <p:nvSpPr>
+          <p:cNvPr id="3" name="Notes Placeholder 2"/>
+          <p:cNvSpPr>
+            <a:spLocks noGrp="1"/>
+          </p:cNvSpPr>
+          <p:nvPr>
+            <p:ph type="body" idx="1"/>
+          </p:nvPr>
+        </p:nvSpPr>
+        <p:spPr/>
+        <p:txBody>
+          <a:bodyPr>
+            <a:normAutofit/>
+          </a:bodyPr>
+          <a:lstStyle/>
+          <a:p>
+            <a:endParaRPr lang="en-US"/>
+          </a:p>
+        </p:txBody>
+      </p:sp>
+      <p:sp>
+        <p:nvSpPr>
+          <p:cNvPr id="4" name="Slide Number Placeholder 3"/>
+          <p:cNvSpPr>
+            <a:spLocks noGrp="1"/>
+          </p:cNvSpPr>
+          <p:nvPr>
+            <p:ph type="sldNum" sz="quarter" idx="10"/>
+          </p:nvPr>
+        </p:nvSpPr>
+        <p:spPr/>
+        <p:txBody>
+          <a:bodyPr/>
+          <a:lstStyle/>
+          <a:p>
+            <a:fld id="{FE9BC4E5-2BC1-4F43-85DD-A1B8F74CB7EB}" type="slidenum">
+              <a:rPr lang="en-US" smtClean="0"/>
+              <a:pPr/>
+              <a:t>20</a:t>
+            </a:fld>
+            <a:endParaRPr lang="en-US" dirty="0"/>
+          </a:p>
+        </p:txBody>
+      </p:sp>
+    </p:spTree>
+    <p:extLst>
+      <p:ext uri="{BB962C8B-B14F-4D97-AF65-F5344CB8AC3E}">
+        <p14:creationId xmlns:p14="http://schemas.microsoft.com/office/powerpoint/2010/main" val="2513457212"/>
       </p:ext>
     </p:extLst>
   </p:cSld>
@@ -4374,11 +4550,11 @@
           <a:p>
             <a:r>
               <a:rPr lang="en-CA" dirty="0"/>
-              <a:t>Nan Wang, Jun 20</a:t>
+              <a:t>Nan Wang, Jul 3</a:t>
             </a:r>
             <a:r>
               <a:rPr lang="en-CA" baseline="30000" dirty="0"/>
-              <a:t>th</a:t>
+              <a:t>rd</a:t>
             </a:r>
             <a:r>
               <a:rPr lang="en-CA" dirty="0"/>
@@ -5298,1911 +5474,6 @@
 </file>
 
 <file path=ppt/slides/slide11.xml><?xml version="1.0" encoding="utf-8"?>
-<p:sld xmlns:a="http://schemas.openxmlformats.org/drawingml/2006/main" xmlns:r="http://schemas.openxmlformats.org/officeDocument/2006/relationships" xmlns:p="http://schemas.openxmlformats.org/presentationml/2006/main" show="0">
-  <p:cSld>
-    <p:spTree>
-      <p:nvGrpSpPr>
-        <p:cNvPr id="1" name=""/>
-        <p:cNvGrpSpPr/>
-        <p:nvPr/>
-      </p:nvGrpSpPr>
-      <p:grpSpPr>
-        <a:xfrm>
-          <a:off x="0" y="0"/>
-          <a:ext cx="0" cy="0"/>
-          <a:chOff x="0" y="0"/>
-          <a:chExt cx="0" cy="0"/>
-        </a:xfrm>
-      </p:grpSpPr>
-      <p:sp>
-        <p:nvSpPr>
-          <p:cNvPr id="7" name="Slide Number Placeholder 6"/>
-          <p:cNvSpPr>
-            <a:spLocks noGrp="1"/>
-          </p:cNvSpPr>
-          <p:nvPr>
-            <p:ph type="sldNum" sz="quarter" idx="11"/>
-          </p:nvPr>
-        </p:nvSpPr>
-        <p:spPr/>
-        <p:txBody>
-          <a:bodyPr/>
-          <a:lstStyle/>
-          <a:p>
-            <a:fld id="{5BD36294-2849-48A8-8531-5354CF3095D2}" type="slidenum">
-              <a:rPr lang="en-US" smtClean="0"/>
-              <a:pPr/>
-              <a:t>11</a:t>
-            </a:fld>
-            <a:endParaRPr lang="en-US" dirty="0"/>
-          </a:p>
-        </p:txBody>
-      </p:sp>
-      <p:sp>
-        <p:nvSpPr>
-          <p:cNvPr id="29" name="Title 28"/>
-          <p:cNvSpPr>
-            <a:spLocks noGrp="1"/>
-          </p:cNvSpPr>
-          <p:nvPr>
-            <p:ph type="title"/>
-          </p:nvPr>
-        </p:nvSpPr>
-        <p:spPr/>
-        <p:txBody>
-          <a:bodyPr/>
-          <a:lstStyle/>
-          <a:p>
-            <a:r>
-              <a:rPr lang="en-US" altLang="zh-CN" dirty="0"/>
-              <a:t>Crystal only, changing </a:t>
-            </a:r>
-            <a:r>
-              <a:rPr lang="en-US" altLang="zh-CN" dirty="0" err="1"/>
-              <a:t>miscut</a:t>
-            </a:r>
-            <a:r>
-              <a:rPr lang="en-US" altLang="zh-CN" dirty="0"/>
-              <a:t>, Si 220</a:t>
-            </a:r>
-            <a:endParaRPr lang="en-CA" dirty="0"/>
-          </a:p>
-        </p:txBody>
-      </p:sp>
-      <p:grpSp>
-        <p:nvGrpSpPr>
-          <p:cNvPr id="26" name="组合 25">
-            <a:extLst>
-              <a:ext uri="{FF2B5EF4-FFF2-40B4-BE49-F238E27FC236}">
-                <a16:creationId xmlns:a16="http://schemas.microsoft.com/office/drawing/2014/main" id="{118EE74E-010B-4071-B451-D4A78193064D}"/>
-              </a:ext>
-            </a:extLst>
-          </p:cNvPr>
-          <p:cNvGrpSpPr/>
-          <p:nvPr/>
-        </p:nvGrpSpPr>
-        <p:grpSpPr>
-          <a:xfrm>
-            <a:off x="1" y="1232834"/>
-            <a:ext cx="4260062" cy="1142938"/>
-            <a:chOff x="0" y="1414116"/>
-            <a:chExt cx="9144000" cy="2453257"/>
-          </a:xfrm>
-        </p:grpSpPr>
-        <p:pic>
-          <p:nvPicPr>
-            <p:cNvPr id="8" name="图片 7" descr="图片包含 游戏机, 吉他, 画&#10;&#10;描述已自动生成">
-              <a:extLst>
-                <a:ext uri="{FF2B5EF4-FFF2-40B4-BE49-F238E27FC236}">
-                  <a16:creationId xmlns:a16="http://schemas.microsoft.com/office/drawing/2014/main" id="{E8A749AF-7CE3-488A-A441-B01382BFFCC0}"/>
-                </a:ext>
-              </a:extLst>
-            </p:cNvPr>
-            <p:cNvPicPr>
-              <a:picLocks noChangeAspect="1"/>
-            </p:cNvPicPr>
-            <p:nvPr/>
-          </p:nvPicPr>
-          <p:blipFill>
-            <a:blip r:embed="rId3"/>
-            <a:stretch>
-              <a:fillRect/>
-            </a:stretch>
-          </p:blipFill>
-          <p:spPr>
-            <a:xfrm>
-              <a:off x="0" y="1769524"/>
-              <a:ext cx="9144000" cy="1659476"/>
-            </a:xfrm>
-            <a:prstGeom prst="rect">
-              <a:avLst/>
-            </a:prstGeom>
-          </p:spPr>
-        </p:pic>
-        <p:sp>
-          <p:nvSpPr>
-            <p:cNvPr id="11" name="文本框 10">
-              <a:extLst>
-                <a:ext uri="{FF2B5EF4-FFF2-40B4-BE49-F238E27FC236}">
-                  <a16:creationId xmlns:a16="http://schemas.microsoft.com/office/drawing/2014/main" id="{2EC05EBB-E2AC-4CC3-A6D2-2CCBB84162D6}"/>
-                </a:ext>
-              </a:extLst>
-            </p:cNvPr>
-            <p:cNvSpPr txBox="1"/>
-            <p:nvPr/>
-          </p:nvSpPr>
-          <p:spPr>
-            <a:xfrm>
-              <a:off x="1035234" y="3305841"/>
-              <a:ext cx="2960728" cy="561532"/>
-            </a:xfrm>
-            <a:prstGeom prst="rect">
-              <a:avLst/>
-            </a:prstGeom>
-            <a:noFill/>
-          </p:spPr>
-          <p:txBody>
-            <a:bodyPr wrap="square" rtlCol="0">
-              <a:spAutoFit/>
-            </a:bodyPr>
-            <a:lstStyle/>
-            <a:p>
-              <a:r>
-                <a:rPr lang="en-US" altLang="zh-CN" sz="1050" dirty="0">
-                  <a:solidFill>
-                    <a:srgbClr val="FF0000"/>
-                  </a:solidFill>
-                </a:rPr>
-                <a:t>C1, z = 200m</a:t>
-              </a:r>
-              <a:endParaRPr lang="zh-CN" altLang="en-US" sz="1050" dirty="0">
-                <a:solidFill>
-                  <a:srgbClr val="FF0000"/>
-                </a:solidFill>
-              </a:endParaRPr>
-            </a:p>
-          </p:txBody>
-        </p:sp>
-        <p:sp>
-          <p:nvSpPr>
-            <p:cNvPr id="12" name="文本框 11">
-              <a:extLst>
-                <a:ext uri="{FF2B5EF4-FFF2-40B4-BE49-F238E27FC236}">
-                  <a16:creationId xmlns:a16="http://schemas.microsoft.com/office/drawing/2014/main" id="{BB6D2045-68E7-4B8E-AD21-FC556102651B}"/>
-                </a:ext>
-              </a:extLst>
-            </p:cNvPr>
-            <p:cNvSpPr txBox="1"/>
-            <p:nvPr/>
-          </p:nvSpPr>
-          <p:spPr>
-            <a:xfrm>
-              <a:off x="2689346" y="1414116"/>
-              <a:ext cx="2431751" cy="561532"/>
-            </a:xfrm>
-            <a:prstGeom prst="rect">
-              <a:avLst/>
-            </a:prstGeom>
-            <a:noFill/>
-          </p:spPr>
-          <p:txBody>
-            <a:bodyPr wrap="square" rtlCol="0">
-              <a:spAutoFit/>
-            </a:bodyPr>
-            <a:lstStyle/>
-            <a:p>
-              <a:r>
-                <a:rPr lang="en-US" altLang="zh-CN" sz="1050" dirty="0">
-                  <a:solidFill>
-                    <a:srgbClr val="FF0000"/>
-                  </a:solidFill>
-                </a:rPr>
-                <a:t>C2</a:t>
-              </a:r>
-              <a:endParaRPr lang="zh-CN" altLang="en-US" sz="1050" dirty="0">
-                <a:solidFill>
-                  <a:srgbClr val="FF0000"/>
-                </a:solidFill>
-              </a:endParaRPr>
-            </a:p>
-          </p:txBody>
-        </p:sp>
-        <p:sp>
-          <p:nvSpPr>
-            <p:cNvPr id="13" name="文本框 12">
-              <a:extLst>
-                <a:ext uri="{FF2B5EF4-FFF2-40B4-BE49-F238E27FC236}">
-                  <a16:creationId xmlns:a16="http://schemas.microsoft.com/office/drawing/2014/main" id="{1BB76494-6058-49C6-B356-DAE4A2FE0DF9}"/>
-                </a:ext>
-              </a:extLst>
-            </p:cNvPr>
-            <p:cNvSpPr txBox="1"/>
-            <p:nvPr/>
-          </p:nvSpPr>
-          <p:spPr>
-            <a:xfrm>
-              <a:off x="5591880" y="1488758"/>
-              <a:ext cx="2185852" cy="561532"/>
-            </a:xfrm>
-            <a:prstGeom prst="rect">
-              <a:avLst/>
-            </a:prstGeom>
-            <a:noFill/>
-          </p:spPr>
-          <p:txBody>
-            <a:bodyPr wrap="square" rtlCol="0">
-              <a:spAutoFit/>
-            </a:bodyPr>
-            <a:lstStyle/>
-            <a:p>
-              <a:r>
-                <a:rPr lang="en-US" altLang="zh-CN" sz="1050" dirty="0">
-                  <a:solidFill>
-                    <a:srgbClr val="FF0000"/>
-                  </a:solidFill>
-                </a:rPr>
-                <a:t>C3</a:t>
-              </a:r>
-              <a:endParaRPr lang="zh-CN" altLang="en-US" sz="1050" dirty="0">
-                <a:solidFill>
-                  <a:srgbClr val="FF0000"/>
-                </a:solidFill>
-              </a:endParaRPr>
-            </a:p>
-          </p:txBody>
-        </p:sp>
-        <p:sp>
-          <p:nvSpPr>
-            <p:cNvPr id="14" name="文本框 13">
-              <a:extLst>
-                <a:ext uri="{FF2B5EF4-FFF2-40B4-BE49-F238E27FC236}">
-                  <a16:creationId xmlns:a16="http://schemas.microsoft.com/office/drawing/2014/main" id="{E59C5294-A50D-43F3-B08E-459FF40806EA}"/>
-                </a:ext>
-              </a:extLst>
-            </p:cNvPr>
-            <p:cNvSpPr txBox="1"/>
-            <p:nvPr/>
-          </p:nvSpPr>
-          <p:spPr>
-            <a:xfrm>
-              <a:off x="6433511" y="3233338"/>
-              <a:ext cx="1943100" cy="561532"/>
-            </a:xfrm>
-            <a:prstGeom prst="rect">
-              <a:avLst/>
-            </a:prstGeom>
-            <a:noFill/>
-          </p:spPr>
-          <p:txBody>
-            <a:bodyPr wrap="square" rtlCol="0">
-              <a:spAutoFit/>
-            </a:bodyPr>
-            <a:lstStyle/>
-            <a:p>
-              <a:r>
-                <a:rPr lang="en-US" altLang="zh-CN" sz="1050" dirty="0">
-                  <a:solidFill>
-                    <a:srgbClr val="FF0000"/>
-                  </a:solidFill>
-                </a:rPr>
-                <a:t>C4</a:t>
-              </a:r>
-              <a:endParaRPr lang="zh-CN" altLang="en-US" sz="1050" dirty="0">
-                <a:solidFill>
-                  <a:srgbClr val="FF0000"/>
-                </a:solidFill>
-              </a:endParaRPr>
-            </a:p>
-          </p:txBody>
-        </p:sp>
-        <p:sp>
-          <p:nvSpPr>
-            <p:cNvPr id="18" name="文本框 17">
-              <a:extLst>
-                <a:ext uri="{FF2B5EF4-FFF2-40B4-BE49-F238E27FC236}">
-                  <a16:creationId xmlns:a16="http://schemas.microsoft.com/office/drawing/2014/main" id="{25E2B448-6696-4A92-AB80-3DFBC1EC09E2}"/>
-                </a:ext>
-              </a:extLst>
-            </p:cNvPr>
-            <p:cNvSpPr txBox="1"/>
-            <p:nvPr/>
-          </p:nvSpPr>
-          <p:spPr>
-            <a:xfrm>
-              <a:off x="1626396" y="2164418"/>
-              <a:ext cx="864319" cy="495469"/>
-            </a:xfrm>
-            <a:prstGeom prst="rect">
-              <a:avLst/>
-            </a:prstGeom>
-            <a:noFill/>
-          </p:spPr>
-          <p:txBody>
-            <a:bodyPr wrap="none" rtlCol="0">
-              <a:spAutoFit/>
-            </a:bodyPr>
-            <a:lstStyle/>
-            <a:p>
-              <a:r>
-                <a:rPr lang="en-US" altLang="zh-CN" sz="900" dirty="0">
-                  <a:solidFill>
-                    <a:srgbClr val="00B0F0"/>
-                  </a:solidFill>
-                </a:rPr>
-                <a:t>3cm</a:t>
-              </a:r>
-              <a:endParaRPr lang="zh-CN" altLang="en-US" sz="900" dirty="0">
-                <a:solidFill>
-                  <a:srgbClr val="00B0F0"/>
-                </a:solidFill>
-              </a:endParaRPr>
-            </a:p>
-          </p:txBody>
-        </p:sp>
-        <p:sp>
-          <p:nvSpPr>
-            <p:cNvPr id="28" name="文本框 27">
-              <a:extLst>
-                <a:ext uri="{FF2B5EF4-FFF2-40B4-BE49-F238E27FC236}">
-                  <a16:creationId xmlns:a16="http://schemas.microsoft.com/office/drawing/2014/main" id="{A0D154BD-937F-4708-9E44-C6FE05DDF224}"/>
-                </a:ext>
-              </a:extLst>
-            </p:cNvPr>
-            <p:cNvSpPr txBox="1"/>
-            <p:nvPr/>
-          </p:nvSpPr>
-          <p:spPr>
-            <a:xfrm>
-              <a:off x="4373067" y="2357300"/>
-              <a:ext cx="740451" cy="495469"/>
-            </a:xfrm>
-            <a:prstGeom prst="rect">
-              <a:avLst/>
-            </a:prstGeom>
-            <a:noFill/>
-          </p:spPr>
-          <p:txBody>
-            <a:bodyPr wrap="none" rtlCol="0">
-              <a:spAutoFit/>
-            </a:bodyPr>
-            <a:lstStyle/>
-            <a:p>
-              <a:r>
-                <a:rPr lang="en-US" altLang="zh-CN" sz="900" dirty="0">
-                  <a:solidFill>
-                    <a:srgbClr val="00B0F0"/>
-                  </a:solidFill>
-                </a:rPr>
-                <a:t>1m</a:t>
-              </a:r>
-              <a:endParaRPr lang="zh-CN" altLang="en-US" sz="900" dirty="0">
-                <a:solidFill>
-                  <a:srgbClr val="00B0F0"/>
-                </a:solidFill>
-              </a:endParaRPr>
-            </a:p>
-          </p:txBody>
-        </p:sp>
-      </p:grpSp>
-      <p:pic>
-        <p:nvPicPr>
-          <p:cNvPr id="31" name="图片 30">
-            <a:extLst>
-              <a:ext uri="{FF2B5EF4-FFF2-40B4-BE49-F238E27FC236}">
-                <a16:creationId xmlns:a16="http://schemas.microsoft.com/office/drawing/2014/main" id="{6EC0BD79-1238-4B2D-B45C-18AAE5842F87}"/>
-              </a:ext>
-            </a:extLst>
-          </p:cNvPr>
-          <p:cNvPicPr>
-            <a:picLocks noChangeAspect="1"/>
-          </p:cNvPicPr>
-          <p:nvPr/>
-        </p:nvPicPr>
-        <p:blipFill>
-          <a:blip r:embed="rId4"/>
-          <a:srcRect/>
-          <a:stretch/>
-        </p:blipFill>
-        <p:spPr>
-          <a:xfrm>
-            <a:off x="-568068" y="2346927"/>
-            <a:ext cx="6480000" cy="1620000"/>
-          </a:xfrm>
-          <a:prstGeom prst="rect">
-            <a:avLst/>
-          </a:prstGeom>
-        </p:spPr>
-      </p:pic>
-      <p:pic>
-        <p:nvPicPr>
-          <p:cNvPr id="33" name="图片 32">
-            <a:extLst>
-              <a:ext uri="{FF2B5EF4-FFF2-40B4-BE49-F238E27FC236}">
-                <a16:creationId xmlns:a16="http://schemas.microsoft.com/office/drawing/2014/main" id="{C84BDE3E-0A96-4D2B-8509-A98AB788CA5F}"/>
-              </a:ext>
-            </a:extLst>
-          </p:cNvPr>
-          <p:cNvPicPr>
-            <a:picLocks noChangeAspect="1"/>
-          </p:cNvPicPr>
-          <p:nvPr/>
-        </p:nvPicPr>
-        <p:blipFill>
-          <a:blip r:embed="rId5"/>
-          <a:srcRect/>
-          <a:stretch/>
-        </p:blipFill>
-        <p:spPr>
-          <a:xfrm>
-            <a:off x="-568070" y="3810000"/>
-            <a:ext cx="6480000" cy="1619999"/>
-          </a:xfrm>
-          <a:prstGeom prst="rect">
-            <a:avLst/>
-          </a:prstGeom>
-        </p:spPr>
-      </p:pic>
-      <p:pic>
-        <p:nvPicPr>
-          <p:cNvPr id="35" name="图片 34">
-            <a:extLst>
-              <a:ext uri="{FF2B5EF4-FFF2-40B4-BE49-F238E27FC236}">
-                <a16:creationId xmlns:a16="http://schemas.microsoft.com/office/drawing/2014/main" id="{ED81AFAD-9C3C-4818-BC14-2F919C053A70}"/>
-              </a:ext>
-            </a:extLst>
-          </p:cNvPr>
-          <p:cNvPicPr>
-            <a:picLocks noChangeAspect="1"/>
-          </p:cNvPicPr>
-          <p:nvPr/>
-        </p:nvPicPr>
-        <p:blipFill>
-          <a:blip r:embed="rId6"/>
-          <a:srcRect/>
-          <a:stretch/>
-        </p:blipFill>
-        <p:spPr>
-          <a:xfrm>
-            <a:off x="-568073" y="5257800"/>
-            <a:ext cx="6480000" cy="1620000"/>
-          </a:xfrm>
-          <a:prstGeom prst="rect">
-            <a:avLst/>
-          </a:prstGeom>
-        </p:spPr>
-      </p:pic>
-      <p:graphicFrame>
-        <p:nvGraphicFramePr>
-          <p:cNvPr id="38" name="表格 38">
-            <a:extLst>
-              <a:ext uri="{FF2B5EF4-FFF2-40B4-BE49-F238E27FC236}">
-                <a16:creationId xmlns:a16="http://schemas.microsoft.com/office/drawing/2014/main" id="{0BD303DD-13EA-422E-A934-AEB940D2AA9B}"/>
-              </a:ext>
-            </a:extLst>
-          </p:cNvPr>
-          <p:cNvGraphicFramePr>
-            <a:graphicFrameLocks noGrp="1"/>
-          </p:cNvGraphicFramePr>
-          <p:nvPr>
-            <p:extLst>
-              <p:ext uri="{D42A27DB-BD31-4B8C-83A1-F6EECF244321}">
-                <p14:modId xmlns:p14="http://schemas.microsoft.com/office/powerpoint/2010/main" val="212008946"/>
-              </p:ext>
-            </p:extLst>
-          </p:nvPr>
-        </p:nvGraphicFramePr>
-        <p:xfrm>
-          <a:off x="5463541" y="1354442"/>
-          <a:ext cx="3444402" cy="1097280"/>
-        </p:xfrm>
-        <a:graphic>
-          <a:graphicData uri="http://schemas.openxmlformats.org/drawingml/2006/table">
-            <a:tbl>
-              <a:tblPr firstRow="1" bandRow="1">
-                <a:tableStyleId>{5C22544A-7EE6-4342-B048-85BDC9FD1C3A}</a:tableStyleId>
-              </a:tblPr>
-              <a:tblGrid>
-                <a:gridCol w="1219200">
-                  <a:extLst>
-                    <a:ext uri="{9D8B030D-6E8A-4147-A177-3AD203B41FA5}">
-                      <a16:colId xmlns:a16="http://schemas.microsoft.com/office/drawing/2014/main" val="475487312"/>
-                    </a:ext>
-                  </a:extLst>
-                </a:gridCol>
-                <a:gridCol w="558555">
-                  <a:extLst>
-                    <a:ext uri="{9D8B030D-6E8A-4147-A177-3AD203B41FA5}">
-                      <a16:colId xmlns:a16="http://schemas.microsoft.com/office/drawing/2014/main" val="1860789350"/>
-                    </a:ext>
-                  </a:extLst>
-                </a:gridCol>
-                <a:gridCol w="555549">
-                  <a:extLst>
-                    <a:ext uri="{9D8B030D-6E8A-4147-A177-3AD203B41FA5}">
-                      <a16:colId xmlns:a16="http://schemas.microsoft.com/office/drawing/2014/main" val="3030780357"/>
-                    </a:ext>
-                  </a:extLst>
-                </a:gridCol>
-                <a:gridCol w="555549">
-                  <a:extLst>
-                    <a:ext uri="{9D8B030D-6E8A-4147-A177-3AD203B41FA5}">
-                      <a16:colId xmlns:a16="http://schemas.microsoft.com/office/drawing/2014/main" val="164721499"/>
-                    </a:ext>
-                  </a:extLst>
-                </a:gridCol>
-                <a:gridCol w="555549">
-                  <a:extLst>
-                    <a:ext uri="{9D8B030D-6E8A-4147-A177-3AD203B41FA5}">
-                      <a16:colId xmlns:a16="http://schemas.microsoft.com/office/drawing/2014/main" val="3298584427"/>
-                    </a:ext>
-                  </a:extLst>
-                </a:gridCol>
-              </a:tblGrid>
-              <a:tr h="244320">
-                <a:tc>
-                  <a:txBody>
-                    <a:bodyPr/>
-                    <a:lstStyle/>
-                    <a:p>
-                      <a:r>
-                        <a:rPr lang="en-US" altLang="zh-CN" sz="1200" dirty="0" err="1"/>
-                        <a:t>miscut</a:t>
-                      </a:r>
-                      <a:endParaRPr lang="zh-CN" altLang="en-US" sz="1200" dirty="0"/>
-                    </a:p>
-                  </a:txBody>
-                  <a:tcPr/>
-                </a:tc>
-                <a:tc>
-                  <a:txBody>
-                    <a:bodyPr/>
-                    <a:lstStyle/>
-                    <a:p>
-                      <a:r>
-                        <a:rPr lang="en-US" altLang="zh-CN" sz="1200" dirty="0"/>
-                        <a:t>C1</a:t>
-                      </a:r>
-                      <a:endParaRPr lang="zh-CN" altLang="en-US" sz="1200" dirty="0"/>
-                    </a:p>
-                  </a:txBody>
-                  <a:tcPr/>
-                </a:tc>
-                <a:tc>
-                  <a:txBody>
-                    <a:bodyPr/>
-                    <a:lstStyle/>
-                    <a:p>
-                      <a:r>
-                        <a:rPr lang="en-US" altLang="zh-CN" sz="1200" dirty="0"/>
-                        <a:t>C2</a:t>
-                      </a:r>
-                      <a:endParaRPr lang="zh-CN" altLang="en-US" sz="1200" dirty="0"/>
-                    </a:p>
-                  </a:txBody>
-                  <a:tcPr/>
-                </a:tc>
-                <a:tc>
-                  <a:txBody>
-                    <a:bodyPr/>
-                    <a:lstStyle/>
-                    <a:p>
-                      <a:r>
-                        <a:rPr lang="en-US" altLang="zh-CN" sz="1200" dirty="0"/>
-                        <a:t>C3</a:t>
-                      </a:r>
-                      <a:endParaRPr lang="zh-CN" altLang="en-US" sz="1200" dirty="0"/>
-                    </a:p>
-                  </a:txBody>
-                  <a:tcPr/>
-                </a:tc>
-                <a:tc>
-                  <a:txBody>
-                    <a:bodyPr/>
-                    <a:lstStyle/>
-                    <a:p>
-                      <a:r>
-                        <a:rPr lang="en-US" altLang="zh-CN" sz="1200" dirty="0"/>
-                        <a:t>C4</a:t>
-                      </a:r>
-                      <a:endParaRPr lang="zh-CN" altLang="en-US" sz="1200" dirty="0"/>
-                    </a:p>
-                  </a:txBody>
-                  <a:tcPr/>
-                </a:tc>
-                <a:extLst>
-                  <a:ext uri="{0D108BD9-81ED-4DB2-BD59-A6C34878D82A}">
-                    <a16:rowId xmlns:a16="http://schemas.microsoft.com/office/drawing/2014/main" val="1096912839"/>
-                  </a:ext>
-                </a:extLst>
-              </a:tr>
-              <a:tr h="244320">
-                <a:tc>
-                  <a:txBody>
-                    <a:bodyPr/>
-                    <a:lstStyle/>
-                    <a:p>
-                      <a:r>
-                        <a:rPr lang="en-US" altLang="zh-CN" sz="1200" dirty="0"/>
-                        <a:t>Top</a:t>
-                      </a:r>
-                      <a:endParaRPr lang="zh-CN" altLang="en-US" sz="1200" dirty="0"/>
-                    </a:p>
-                  </a:txBody>
-                  <a:tcPr/>
-                </a:tc>
-                <a:tc>
-                  <a:txBody>
-                    <a:bodyPr/>
-                    <a:lstStyle/>
-                    <a:p>
-                      <a:r>
-                        <a:rPr lang="en-US" altLang="zh-CN" sz="1200" dirty="0"/>
-                        <a:t>0°</a:t>
-                      </a:r>
-                      <a:endParaRPr lang="zh-CN" altLang="en-US" sz="1200" dirty="0"/>
-                    </a:p>
-                  </a:txBody>
-                  <a:tcPr/>
-                </a:tc>
-                <a:tc>
-                  <a:txBody>
-                    <a:bodyPr/>
-                    <a:lstStyle/>
-                    <a:p>
-                      <a:pPr marL="0" marR="0" lvl="0" indent="0" algn="l" defTabSz="914400" rtl="0" eaLnBrk="1" fontAlgn="auto" latinLnBrk="0" hangingPunct="1">
-                        <a:lnSpc>
-                          <a:spcPct val="100000"/>
-                        </a:lnSpc>
-                        <a:spcBef>
-                          <a:spcPts val="0"/>
-                        </a:spcBef>
-                        <a:spcAft>
-                          <a:spcPts val="0"/>
-                        </a:spcAft>
-                        <a:buClrTx/>
-                        <a:buSzTx/>
-                        <a:buFontTx/>
-                        <a:buNone/>
-                        <a:tabLst/>
-                        <a:defRPr/>
-                      </a:pPr>
-                      <a:r>
-                        <a:rPr lang="en-US" altLang="zh-CN" sz="1200" dirty="0"/>
-                        <a:t>-0°</a:t>
-                      </a:r>
-                      <a:endParaRPr lang="zh-CN" altLang="en-US" sz="1200" dirty="0"/>
-                    </a:p>
-                  </a:txBody>
-                  <a:tcPr/>
-                </a:tc>
-                <a:tc>
-                  <a:txBody>
-                    <a:bodyPr/>
-                    <a:lstStyle/>
-                    <a:p>
-                      <a:r>
-                        <a:rPr lang="en-US" altLang="zh-CN" sz="1200" dirty="0"/>
-                        <a:t>0°</a:t>
-                      </a:r>
-                      <a:endParaRPr lang="zh-CN" altLang="en-US" sz="1200" dirty="0"/>
-                    </a:p>
-                  </a:txBody>
-                  <a:tcPr/>
-                </a:tc>
-                <a:tc>
-                  <a:txBody>
-                    <a:bodyPr/>
-                    <a:lstStyle/>
-                    <a:p>
-                      <a:r>
-                        <a:rPr lang="en-US" altLang="zh-CN" sz="1200" dirty="0"/>
-                        <a:t>0°</a:t>
-                      </a:r>
-                      <a:endParaRPr lang="zh-CN" altLang="en-US" sz="1200" dirty="0"/>
-                    </a:p>
-                  </a:txBody>
-                  <a:tcPr/>
-                </a:tc>
-                <a:extLst>
-                  <a:ext uri="{0D108BD9-81ED-4DB2-BD59-A6C34878D82A}">
-                    <a16:rowId xmlns:a16="http://schemas.microsoft.com/office/drawing/2014/main" val="1270521984"/>
-                  </a:ext>
-                </a:extLst>
-              </a:tr>
-              <a:tr h="244320">
-                <a:tc>
-                  <a:txBody>
-                    <a:bodyPr/>
-                    <a:lstStyle/>
-                    <a:p>
-                      <a:r>
-                        <a:rPr lang="en-US" altLang="zh-CN" sz="1200" dirty="0"/>
-                        <a:t>Mid</a:t>
-                      </a:r>
-                      <a:endParaRPr lang="zh-CN" altLang="en-US" sz="1200" dirty="0"/>
-                    </a:p>
-                  </a:txBody>
-                  <a:tcPr/>
-                </a:tc>
-                <a:tc>
-                  <a:txBody>
-                    <a:bodyPr/>
-                    <a:lstStyle/>
-                    <a:p>
-                      <a:pPr marL="0" marR="0" lvl="0" indent="0" algn="l" defTabSz="914400" rtl="0" eaLnBrk="1" fontAlgn="auto" latinLnBrk="0" hangingPunct="1">
-                        <a:lnSpc>
-                          <a:spcPct val="100000"/>
-                        </a:lnSpc>
-                        <a:spcBef>
-                          <a:spcPts val="0"/>
-                        </a:spcBef>
-                        <a:spcAft>
-                          <a:spcPts val="0"/>
-                        </a:spcAft>
-                        <a:buClrTx/>
-                        <a:buSzTx/>
-                        <a:buFontTx/>
-                        <a:buNone/>
-                        <a:tabLst/>
-                        <a:defRPr/>
-                      </a:pPr>
-                      <a:r>
-                        <a:rPr lang="en-US" altLang="zh-CN" sz="1200" dirty="0"/>
-                        <a:t>0°</a:t>
-                      </a:r>
-                      <a:endParaRPr lang="zh-CN" altLang="en-US" sz="1200" dirty="0"/>
-                    </a:p>
-                  </a:txBody>
-                  <a:tcPr/>
-                </a:tc>
-                <a:tc>
-                  <a:txBody>
-                    <a:bodyPr/>
-                    <a:lstStyle/>
-                    <a:p>
-                      <a:r>
-                        <a:rPr lang="en-US" altLang="zh-CN" sz="1200" dirty="0"/>
-                        <a:t>-3°</a:t>
-                      </a:r>
-                      <a:endParaRPr lang="zh-CN" altLang="en-US" sz="1200" dirty="0"/>
-                    </a:p>
-                  </a:txBody>
-                  <a:tcPr/>
-                </a:tc>
-                <a:tc>
-                  <a:txBody>
-                    <a:bodyPr/>
-                    <a:lstStyle/>
-                    <a:p>
-                      <a:r>
-                        <a:rPr lang="en-US" altLang="zh-CN" sz="1200" dirty="0"/>
-                        <a:t>0°</a:t>
-                      </a:r>
-                      <a:endParaRPr lang="zh-CN" altLang="en-US" sz="1200" dirty="0"/>
-                    </a:p>
-                  </a:txBody>
-                  <a:tcPr/>
-                </a:tc>
-                <a:tc>
-                  <a:txBody>
-                    <a:bodyPr/>
-                    <a:lstStyle/>
-                    <a:p>
-                      <a:r>
-                        <a:rPr lang="en-US" altLang="zh-CN" sz="1200" dirty="0"/>
-                        <a:t>3°</a:t>
-                      </a:r>
-                      <a:endParaRPr lang="zh-CN" altLang="en-US" sz="1200" dirty="0"/>
-                    </a:p>
-                  </a:txBody>
-                  <a:tcPr/>
-                </a:tc>
-                <a:extLst>
-                  <a:ext uri="{0D108BD9-81ED-4DB2-BD59-A6C34878D82A}">
-                    <a16:rowId xmlns:a16="http://schemas.microsoft.com/office/drawing/2014/main" val="3251823014"/>
-                  </a:ext>
-                </a:extLst>
-              </a:tr>
-              <a:tr h="244320">
-                <a:tc>
-                  <a:txBody>
-                    <a:bodyPr/>
-                    <a:lstStyle/>
-                    <a:p>
-                      <a:r>
-                        <a:rPr lang="en-US" altLang="zh-CN" sz="1200" dirty="0"/>
-                        <a:t>Bottom</a:t>
-                      </a:r>
-                      <a:endParaRPr lang="zh-CN" altLang="en-US" sz="1200" dirty="0"/>
-                    </a:p>
-                  </a:txBody>
-                  <a:tcPr/>
-                </a:tc>
-                <a:tc>
-                  <a:txBody>
-                    <a:bodyPr/>
-                    <a:lstStyle/>
-                    <a:p>
-                      <a:pPr marL="0" marR="0" lvl="0" indent="0" algn="l" defTabSz="914400" rtl="0" eaLnBrk="1" fontAlgn="auto" latinLnBrk="0" hangingPunct="1">
-                        <a:lnSpc>
-                          <a:spcPct val="100000"/>
-                        </a:lnSpc>
-                        <a:spcBef>
-                          <a:spcPts val="0"/>
-                        </a:spcBef>
-                        <a:spcAft>
-                          <a:spcPts val="0"/>
-                        </a:spcAft>
-                        <a:buClrTx/>
-                        <a:buSzTx/>
-                        <a:buFontTx/>
-                        <a:buNone/>
-                        <a:tabLst/>
-                        <a:defRPr/>
-                      </a:pPr>
-                      <a:r>
-                        <a:rPr lang="en-US" altLang="zh-CN" sz="1200" dirty="0"/>
-                        <a:t>0°</a:t>
-                      </a:r>
-                      <a:endParaRPr lang="zh-CN" altLang="en-US" sz="1200" dirty="0"/>
-                    </a:p>
-                  </a:txBody>
-                  <a:tcPr/>
-                </a:tc>
-                <a:tc>
-                  <a:txBody>
-                    <a:bodyPr/>
-                    <a:lstStyle/>
-                    <a:p>
-                      <a:r>
-                        <a:rPr lang="en-US" altLang="zh-CN" sz="1200" dirty="0"/>
-                        <a:t>-5°</a:t>
-                      </a:r>
-                      <a:endParaRPr lang="zh-CN" altLang="en-US" sz="1200" dirty="0"/>
-                    </a:p>
-                  </a:txBody>
-                  <a:tcPr/>
-                </a:tc>
-                <a:tc>
-                  <a:txBody>
-                    <a:bodyPr/>
-                    <a:lstStyle/>
-                    <a:p>
-                      <a:r>
-                        <a:rPr lang="en-US" altLang="zh-CN" sz="1200" dirty="0"/>
-                        <a:t>0°</a:t>
-                      </a:r>
-                      <a:endParaRPr lang="zh-CN" altLang="en-US" sz="1200" dirty="0"/>
-                    </a:p>
-                  </a:txBody>
-                  <a:tcPr/>
-                </a:tc>
-                <a:tc>
-                  <a:txBody>
-                    <a:bodyPr/>
-                    <a:lstStyle/>
-                    <a:p>
-                      <a:r>
-                        <a:rPr lang="en-US" altLang="zh-CN" sz="1200" dirty="0"/>
-                        <a:t>5°</a:t>
-                      </a:r>
-                      <a:endParaRPr lang="zh-CN" altLang="en-US" sz="1200" dirty="0"/>
-                    </a:p>
-                  </a:txBody>
-                  <a:tcPr/>
-                </a:tc>
-                <a:extLst>
-                  <a:ext uri="{0D108BD9-81ED-4DB2-BD59-A6C34878D82A}">
-                    <a16:rowId xmlns:a16="http://schemas.microsoft.com/office/drawing/2014/main" val="1205042433"/>
-                  </a:ext>
-                </a:extLst>
-              </a:tr>
-            </a:tbl>
-          </a:graphicData>
-        </a:graphic>
-      </p:graphicFrame>
-      <p:sp>
-        <p:nvSpPr>
-          <p:cNvPr id="41" name="Content Placeholder 29">
-            <a:extLst>
-              <a:ext uri="{FF2B5EF4-FFF2-40B4-BE49-F238E27FC236}">
-                <a16:creationId xmlns:a16="http://schemas.microsoft.com/office/drawing/2014/main" id="{A1C3DA51-7446-48FF-91CF-7C713002AE12}"/>
-              </a:ext>
-            </a:extLst>
-          </p:cNvPr>
-          <p:cNvSpPr>
-            <a:spLocks noGrp="1"/>
-          </p:cNvSpPr>
-          <p:nvPr>
-            <p:ph sz="quarter" idx="14"/>
-          </p:nvPr>
-        </p:nvSpPr>
-        <p:spPr>
-          <a:xfrm>
-            <a:off x="5410200" y="2627108"/>
-            <a:ext cx="3581400" cy="3681998"/>
-          </a:xfrm>
-        </p:spPr>
-        <p:txBody>
-          <a:bodyPr>
-            <a:normAutofit/>
-          </a:bodyPr>
-          <a:lstStyle/>
-          <a:p>
-            <a:pPr marL="233362" lvl="1" indent="0">
-              <a:buNone/>
-            </a:pPr>
-            <a:r>
-              <a:rPr lang="en-US" sz="1400" dirty="0"/>
-              <a:t>Parameters:</a:t>
-            </a:r>
-          </a:p>
-          <a:p>
-            <a:pPr lvl="1"/>
-            <a:r>
-              <a:rPr lang="en-US" sz="1400" dirty="0"/>
-              <a:t>Incident beam: 10keV, 50um (full width), 1fs</a:t>
-            </a:r>
-          </a:p>
-          <a:p>
-            <a:pPr lvl="1"/>
-            <a:r>
-              <a:rPr lang="en-US" sz="1400" dirty="0"/>
-              <a:t>Sampling range: 1.8mm, 1000fs</a:t>
-            </a:r>
-          </a:p>
-          <a:p>
-            <a:pPr marL="233362" lvl="1" indent="0">
-              <a:buNone/>
-            </a:pPr>
-            <a:r>
-              <a:rPr lang="en-US" sz="1400" dirty="0"/>
-              <a:t>Issues:</a:t>
-            </a:r>
-          </a:p>
-          <a:p>
-            <a:pPr lvl="1"/>
-            <a:r>
-              <a:rPr lang="en-US" sz="1400" dirty="0"/>
-              <a:t>Looks alright now</a:t>
-            </a:r>
-          </a:p>
-          <a:p>
-            <a:pPr lvl="1"/>
-            <a:endParaRPr lang="en-US" sz="1400" dirty="0"/>
-          </a:p>
-        </p:txBody>
-      </p:sp>
-    </p:spTree>
-    <p:extLst>
-      <p:ext uri="{BB962C8B-B14F-4D97-AF65-F5344CB8AC3E}">
-        <p14:creationId xmlns:p14="http://schemas.microsoft.com/office/powerpoint/2010/main" val="2838955086"/>
-      </p:ext>
-    </p:extLst>
-  </p:cSld>
-  <p:clrMapOvr>
-    <a:masterClrMapping/>
-  </p:clrMapOvr>
-</p:sld>
-</file>
-
-<file path=ppt/slides/slide12.xml><?xml version="1.0" encoding="utf-8"?>
-<p:sld xmlns:a="http://schemas.openxmlformats.org/drawingml/2006/main" xmlns:r="http://schemas.openxmlformats.org/officeDocument/2006/relationships" xmlns:p="http://schemas.openxmlformats.org/presentationml/2006/main" show="0">
-  <p:cSld>
-    <p:spTree>
-      <p:nvGrpSpPr>
-        <p:cNvPr id="1" name=""/>
-        <p:cNvGrpSpPr/>
-        <p:nvPr/>
-      </p:nvGrpSpPr>
-      <p:grpSpPr>
-        <a:xfrm>
-          <a:off x="0" y="0"/>
-          <a:ext cx="0" cy="0"/>
-          <a:chOff x="0" y="0"/>
-          <a:chExt cx="0" cy="0"/>
-        </a:xfrm>
-      </p:grpSpPr>
-      <p:sp>
-        <p:nvSpPr>
-          <p:cNvPr id="7" name="Slide Number Placeholder 6"/>
-          <p:cNvSpPr>
-            <a:spLocks noGrp="1"/>
-          </p:cNvSpPr>
-          <p:nvPr>
-            <p:ph type="sldNum" sz="quarter" idx="11"/>
-          </p:nvPr>
-        </p:nvSpPr>
-        <p:spPr/>
-        <p:txBody>
-          <a:bodyPr/>
-          <a:lstStyle/>
-          <a:p>
-            <a:fld id="{5BD36294-2849-48A8-8531-5354CF3095D2}" type="slidenum">
-              <a:rPr lang="en-US" smtClean="0"/>
-              <a:pPr/>
-              <a:t>12</a:t>
-            </a:fld>
-            <a:endParaRPr lang="en-US" dirty="0"/>
-          </a:p>
-        </p:txBody>
-      </p:sp>
-      <p:sp>
-        <p:nvSpPr>
-          <p:cNvPr id="29" name="Title 28"/>
-          <p:cNvSpPr>
-            <a:spLocks noGrp="1"/>
-          </p:cNvSpPr>
-          <p:nvPr>
-            <p:ph type="title"/>
-          </p:nvPr>
-        </p:nvSpPr>
-        <p:spPr/>
-        <p:txBody>
-          <a:bodyPr/>
-          <a:lstStyle/>
-          <a:p>
-            <a:r>
-              <a:rPr lang="en-US" altLang="zh-CN" dirty="0"/>
-              <a:t>Crystal only, changing pulse duration, Si 220</a:t>
-            </a:r>
-            <a:endParaRPr lang="en-CA" dirty="0"/>
-          </a:p>
-        </p:txBody>
-      </p:sp>
-      <p:grpSp>
-        <p:nvGrpSpPr>
-          <p:cNvPr id="26" name="组合 25">
-            <a:extLst>
-              <a:ext uri="{FF2B5EF4-FFF2-40B4-BE49-F238E27FC236}">
-                <a16:creationId xmlns:a16="http://schemas.microsoft.com/office/drawing/2014/main" id="{118EE74E-010B-4071-B451-D4A78193064D}"/>
-              </a:ext>
-            </a:extLst>
-          </p:cNvPr>
-          <p:cNvGrpSpPr/>
-          <p:nvPr/>
-        </p:nvGrpSpPr>
-        <p:grpSpPr>
-          <a:xfrm>
-            <a:off x="1" y="1232834"/>
-            <a:ext cx="4260062" cy="1142938"/>
-            <a:chOff x="0" y="1414116"/>
-            <a:chExt cx="9144000" cy="2453257"/>
-          </a:xfrm>
-        </p:grpSpPr>
-        <p:pic>
-          <p:nvPicPr>
-            <p:cNvPr id="8" name="图片 7" descr="图片包含 游戏机, 吉他, 画&#10;&#10;描述已自动生成">
-              <a:extLst>
-                <a:ext uri="{FF2B5EF4-FFF2-40B4-BE49-F238E27FC236}">
-                  <a16:creationId xmlns:a16="http://schemas.microsoft.com/office/drawing/2014/main" id="{E8A749AF-7CE3-488A-A441-B01382BFFCC0}"/>
-                </a:ext>
-              </a:extLst>
-            </p:cNvPr>
-            <p:cNvPicPr>
-              <a:picLocks noChangeAspect="1"/>
-            </p:cNvPicPr>
-            <p:nvPr/>
-          </p:nvPicPr>
-          <p:blipFill>
-            <a:blip r:embed="rId3"/>
-            <a:stretch>
-              <a:fillRect/>
-            </a:stretch>
-          </p:blipFill>
-          <p:spPr>
-            <a:xfrm>
-              <a:off x="0" y="1769524"/>
-              <a:ext cx="9144000" cy="1659476"/>
-            </a:xfrm>
-            <a:prstGeom prst="rect">
-              <a:avLst/>
-            </a:prstGeom>
-          </p:spPr>
-        </p:pic>
-        <p:sp>
-          <p:nvSpPr>
-            <p:cNvPr id="11" name="文本框 10">
-              <a:extLst>
-                <a:ext uri="{FF2B5EF4-FFF2-40B4-BE49-F238E27FC236}">
-                  <a16:creationId xmlns:a16="http://schemas.microsoft.com/office/drawing/2014/main" id="{2EC05EBB-E2AC-4CC3-A6D2-2CCBB84162D6}"/>
-                </a:ext>
-              </a:extLst>
-            </p:cNvPr>
-            <p:cNvSpPr txBox="1"/>
-            <p:nvPr/>
-          </p:nvSpPr>
-          <p:spPr>
-            <a:xfrm>
-              <a:off x="1035234" y="3305841"/>
-              <a:ext cx="2960728" cy="561532"/>
-            </a:xfrm>
-            <a:prstGeom prst="rect">
-              <a:avLst/>
-            </a:prstGeom>
-            <a:noFill/>
-          </p:spPr>
-          <p:txBody>
-            <a:bodyPr wrap="square" rtlCol="0">
-              <a:spAutoFit/>
-            </a:bodyPr>
-            <a:lstStyle/>
-            <a:p>
-              <a:r>
-                <a:rPr lang="en-US" altLang="zh-CN" sz="1050" dirty="0">
-                  <a:solidFill>
-                    <a:srgbClr val="FF0000"/>
-                  </a:solidFill>
-                </a:rPr>
-                <a:t>C1, z = 200m</a:t>
-              </a:r>
-              <a:endParaRPr lang="zh-CN" altLang="en-US" sz="1050" dirty="0">
-                <a:solidFill>
-                  <a:srgbClr val="FF0000"/>
-                </a:solidFill>
-              </a:endParaRPr>
-            </a:p>
-          </p:txBody>
-        </p:sp>
-        <p:sp>
-          <p:nvSpPr>
-            <p:cNvPr id="12" name="文本框 11">
-              <a:extLst>
-                <a:ext uri="{FF2B5EF4-FFF2-40B4-BE49-F238E27FC236}">
-                  <a16:creationId xmlns:a16="http://schemas.microsoft.com/office/drawing/2014/main" id="{BB6D2045-68E7-4B8E-AD21-FC556102651B}"/>
-                </a:ext>
-              </a:extLst>
-            </p:cNvPr>
-            <p:cNvSpPr txBox="1"/>
-            <p:nvPr/>
-          </p:nvSpPr>
-          <p:spPr>
-            <a:xfrm>
-              <a:off x="2689346" y="1414116"/>
-              <a:ext cx="2431751" cy="561532"/>
-            </a:xfrm>
-            <a:prstGeom prst="rect">
-              <a:avLst/>
-            </a:prstGeom>
-            <a:noFill/>
-          </p:spPr>
-          <p:txBody>
-            <a:bodyPr wrap="square" rtlCol="0">
-              <a:spAutoFit/>
-            </a:bodyPr>
-            <a:lstStyle/>
-            <a:p>
-              <a:r>
-                <a:rPr lang="en-US" altLang="zh-CN" sz="1050" dirty="0">
-                  <a:solidFill>
-                    <a:srgbClr val="FF0000"/>
-                  </a:solidFill>
-                </a:rPr>
-                <a:t>C2, -5 deg</a:t>
-              </a:r>
-              <a:endParaRPr lang="zh-CN" altLang="en-US" sz="1050" dirty="0">
-                <a:solidFill>
-                  <a:srgbClr val="FF0000"/>
-                </a:solidFill>
-              </a:endParaRPr>
-            </a:p>
-          </p:txBody>
-        </p:sp>
-        <p:sp>
-          <p:nvSpPr>
-            <p:cNvPr id="13" name="文本框 12">
-              <a:extLst>
-                <a:ext uri="{FF2B5EF4-FFF2-40B4-BE49-F238E27FC236}">
-                  <a16:creationId xmlns:a16="http://schemas.microsoft.com/office/drawing/2014/main" id="{1BB76494-6058-49C6-B356-DAE4A2FE0DF9}"/>
-                </a:ext>
-              </a:extLst>
-            </p:cNvPr>
-            <p:cNvSpPr txBox="1"/>
-            <p:nvPr/>
-          </p:nvSpPr>
-          <p:spPr>
-            <a:xfrm>
-              <a:off x="5591880" y="1488758"/>
-              <a:ext cx="2185852" cy="561532"/>
-            </a:xfrm>
-            <a:prstGeom prst="rect">
-              <a:avLst/>
-            </a:prstGeom>
-            <a:noFill/>
-          </p:spPr>
-          <p:txBody>
-            <a:bodyPr wrap="square" rtlCol="0">
-              <a:spAutoFit/>
-            </a:bodyPr>
-            <a:lstStyle/>
-            <a:p>
-              <a:r>
-                <a:rPr lang="en-US" altLang="zh-CN" sz="1050" dirty="0">
-                  <a:solidFill>
-                    <a:srgbClr val="FF0000"/>
-                  </a:solidFill>
-                </a:rPr>
-                <a:t>C3</a:t>
-              </a:r>
-              <a:endParaRPr lang="zh-CN" altLang="en-US" sz="1050" dirty="0">
-                <a:solidFill>
-                  <a:srgbClr val="FF0000"/>
-                </a:solidFill>
-              </a:endParaRPr>
-            </a:p>
-          </p:txBody>
-        </p:sp>
-        <p:sp>
-          <p:nvSpPr>
-            <p:cNvPr id="14" name="文本框 13">
-              <a:extLst>
-                <a:ext uri="{FF2B5EF4-FFF2-40B4-BE49-F238E27FC236}">
-                  <a16:creationId xmlns:a16="http://schemas.microsoft.com/office/drawing/2014/main" id="{E59C5294-A50D-43F3-B08E-459FF40806EA}"/>
-                </a:ext>
-              </a:extLst>
-            </p:cNvPr>
-            <p:cNvSpPr txBox="1"/>
-            <p:nvPr/>
-          </p:nvSpPr>
-          <p:spPr>
-            <a:xfrm>
-              <a:off x="6433511" y="3233338"/>
-              <a:ext cx="1943100" cy="561532"/>
-            </a:xfrm>
-            <a:prstGeom prst="rect">
-              <a:avLst/>
-            </a:prstGeom>
-            <a:noFill/>
-          </p:spPr>
-          <p:txBody>
-            <a:bodyPr wrap="square" rtlCol="0">
-              <a:spAutoFit/>
-            </a:bodyPr>
-            <a:lstStyle/>
-            <a:p>
-              <a:r>
-                <a:rPr lang="en-US" altLang="zh-CN" sz="1050" dirty="0">
-                  <a:solidFill>
-                    <a:srgbClr val="FF0000"/>
-                  </a:solidFill>
-                </a:rPr>
-                <a:t>C4, 5 deg</a:t>
-              </a:r>
-              <a:endParaRPr lang="zh-CN" altLang="en-US" sz="1050" dirty="0">
-                <a:solidFill>
-                  <a:srgbClr val="FF0000"/>
-                </a:solidFill>
-              </a:endParaRPr>
-            </a:p>
-          </p:txBody>
-        </p:sp>
-        <p:sp>
-          <p:nvSpPr>
-            <p:cNvPr id="18" name="文本框 17">
-              <a:extLst>
-                <a:ext uri="{FF2B5EF4-FFF2-40B4-BE49-F238E27FC236}">
-                  <a16:creationId xmlns:a16="http://schemas.microsoft.com/office/drawing/2014/main" id="{25E2B448-6696-4A92-AB80-3DFBC1EC09E2}"/>
-                </a:ext>
-              </a:extLst>
-            </p:cNvPr>
-            <p:cNvSpPr txBox="1"/>
-            <p:nvPr/>
-          </p:nvSpPr>
-          <p:spPr>
-            <a:xfrm>
-              <a:off x="1626396" y="2164418"/>
-              <a:ext cx="864319" cy="495469"/>
-            </a:xfrm>
-            <a:prstGeom prst="rect">
-              <a:avLst/>
-            </a:prstGeom>
-            <a:noFill/>
-          </p:spPr>
-          <p:txBody>
-            <a:bodyPr wrap="none" rtlCol="0">
-              <a:spAutoFit/>
-            </a:bodyPr>
-            <a:lstStyle/>
-            <a:p>
-              <a:r>
-                <a:rPr lang="en-US" altLang="zh-CN" sz="900" dirty="0">
-                  <a:solidFill>
-                    <a:srgbClr val="00B0F0"/>
-                  </a:solidFill>
-                </a:rPr>
-                <a:t>3cm</a:t>
-              </a:r>
-              <a:endParaRPr lang="zh-CN" altLang="en-US" sz="900" dirty="0">
-                <a:solidFill>
-                  <a:srgbClr val="00B0F0"/>
-                </a:solidFill>
-              </a:endParaRPr>
-            </a:p>
-          </p:txBody>
-        </p:sp>
-        <p:sp>
-          <p:nvSpPr>
-            <p:cNvPr id="28" name="文本框 27">
-              <a:extLst>
-                <a:ext uri="{FF2B5EF4-FFF2-40B4-BE49-F238E27FC236}">
-                  <a16:creationId xmlns:a16="http://schemas.microsoft.com/office/drawing/2014/main" id="{A0D154BD-937F-4708-9E44-C6FE05DDF224}"/>
-                </a:ext>
-              </a:extLst>
-            </p:cNvPr>
-            <p:cNvSpPr txBox="1"/>
-            <p:nvPr/>
-          </p:nvSpPr>
-          <p:spPr>
-            <a:xfrm>
-              <a:off x="4373067" y="2357300"/>
-              <a:ext cx="740451" cy="495469"/>
-            </a:xfrm>
-            <a:prstGeom prst="rect">
-              <a:avLst/>
-            </a:prstGeom>
-            <a:noFill/>
-          </p:spPr>
-          <p:txBody>
-            <a:bodyPr wrap="none" rtlCol="0">
-              <a:spAutoFit/>
-            </a:bodyPr>
-            <a:lstStyle/>
-            <a:p>
-              <a:r>
-                <a:rPr lang="en-US" altLang="zh-CN" sz="900" dirty="0">
-                  <a:solidFill>
-                    <a:srgbClr val="00B0F0"/>
-                  </a:solidFill>
-                </a:rPr>
-                <a:t>1m</a:t>
-              </a:r>
-              <a:endParaRPr lang="zh-CN" altLang="en-US" sz="900" dirty="0">
-                <a:solidFill>
-                  <a:srgbClr val="00B0F0"/>
-                </a:solidFill>
-              </a:endParaRPr>
-            </a:p>
-          </p:txBody>
-        </p:sp>
-      </p:grpSp>
-      <p:pic>
-        <p:nvPicPr>
-          <p:cNvPr id="31" name="图片 30">
-            <a:extLst>
-              <a:ext uri="{FF2B5EF4-FFF2-40B4-BE49-F238E27FC236}">
-                <a16:creationId xmlns:a16="http://schemas.microsoft.com/office/drawing/2014/main" id="{6EC0BD79-1238-4B2D-B45C-18AAE5842F87}"/>
-              </a:ext>
-            </a:extLst>
-          </p:cNvPr>
-          <p:cNvPicPr>
-            <a:picLocks noChangeAspect="1"/>
-          </p:cNvPicPr>
-          <p:nvPr/>
-        </p:nvPicPr>
-        <p:blipFill>
-          <a:blip r:embed="rId4"/>
-          <a:srcRect/>
-          <a:stretch/>
-        </p:blipFill>
-        <p:spPr>
-          <a:xfrm>
-            <a:off x="-568068" y="2346927"/>
-            <a:ext cx="6480000" cy="1620000"/>
-          </a:xfrm>
-          <a:prstGeom prst="rect">
-            <a:avLst/>
-          </a:prstGeom>
-        </p:spPr>
-      </p:pic>
-      <p:pic>
-        <p:nvPicPr>
-          <p:cNvPr id="33" name="图片 32">
-            <a:extLst>
-              <a:ext uri="{FF2B5EF4-FFF2-40B4-BE49-F238E27FC236}">
-                <a16:creationId xmlns:a16="http://schemas.microsoft.com/office/drawing/2014/main" id="{C84BDE3E-0A96-4D2B-8509-A98AB788CA5F}"/>
-              </a:ext>
-            </a:extLst>
-          </p:cNvPr>
-          <p:cNvPicPr>
-            <a:picLocks noChangeAspect="1"/>
-          </p:cNvPicPr>
-          <p:nvPr/>
-        </p:nvPicPr>
-        <p:blipFill>
-          <a:blip r:embed="rId5"/>
-          <a:srcRect/>
-          <a:stretch/>
-        </p:blipFill>
-        <p:spPr>
-          <a:xfrm>
-            <a:off x="-568070" y="3810000"/>
-            <a:ext cx="6480000" cy="1619999"/>
-          </a:xfrm>
-          <a:prstGeom prst="rect">
-            <a:avLst/>
-          </a:prstGeom>
-        </p:spPr>
-      </p:pic>
-      <p:pic>
-        <p:nvPicPr>
-          <p:cNvPr id="35" name="图片 34">
-            <a:extLst>
-              <a:ext uri="{FF2B5EF4-FFF2-40B4-BE49-F238E27FC236}">
-                <a16:creationId xmlns:a16="http://schemas.microsoft.com/office/drawing/2014/main" id="{ED81AFAD-9C3C-4818-BC14-2F919C053A70}"/>
-              </a:ext>
-            </a:extLst>
-          </p:cNvPr>
-          <p:cNvPicPr>
-            <a:picLocks noChangeAspect="1"/>
-          </p:cNvPicPr>
-          <p:nvPr/>
-        </p:nvPicPr>
-        <p:blipFill>
-          <a:blip r:embed="rId6"/>
-          <a:srcRect/>
-          <a:stretch/>
-        </p:blipFill>
-        <p:spPr>
-          <a:xfrm>
-            <a:off x="-568073" y="5257800"/>
-            <a:ext cx="6480000" cy="1620000"/>
-          </a:xfrm>
-          <a:prstGeom prst="rect">
-            <a:avLst/>
-          </a:prstGeom>
-        </p:spPr>
-      </p:pic>
-      <p:graphicFrame>
-        <p:nvGraphicFramePr>
-          <p:cNvPr id="2" name="表格 2">
-            <a:extLst>
-              <a:ext uri="{FF2B5EF4-FFF2-40B4-BE49-F238E27FC236}">
-                <a16:creationId xmlns:a16="http://schemas.microsoft.com/office/drawing/2014/main" id="{E5DB6E62-07B5-4FB6-A18E-2D7B79820588}"/>
-              </a:ext>
-            </a:extLst>
-          </p:cNvPr>
-          <p:cNvGraphicFramePr>
-            <a:graphicFrameLocks noGrp="1"/>
-          </p:cNvGraphicFramePr>
-          <p:nvPr>
-            <p:extLst>
-              <p:ext uri="{D42A27DB-BD31-4B8C-83A1-F6EECF244321}">
-                <p14:modId xmlns:p14="http://schemas.microsoft.com/office/powerpoint/2010/main" val="3133744709"/>
-              </p:ext>
-            </p:extLst>
-          </p:nvPr>
-        </p:nvGraphicFramePr>
-        <p:xfrm>
-          <a:off x="5727266" y="1348889"/>
-          <a:ext cx="2209800" cy="1097280"/>
-        </p:xfrm>
-        <a:graphic>
-          <a:graphicData uri="http://schemas.openxmlformats.org/drawingml/2006/table">
-            <a:tbl>
-              <a:tblPr firstRow="1" bandRow="1">
-                <a:tableStyleId>{5C22544A-7EE6-4342-B048-85BDC9FD1C3A}</a:tableStyleId>
-              </a:tblPr>
-              <a:tblGrid>
-                <a:gridCol w="735451">
-                  <a:extLst>
-                    <a:ext uri="{9D8B030D-6E8A-4147-A177-3AD203B41FA5}">
-                      <a16:colId xmlns:a16="http://schemas.microsoft.com/office/drawing/2014/main" val="2508812721"/>
-                    </a:ext>
-                  </a:extLst>
-                </a:gridCol>
-                <a:gridCol w="1474349">
-                  <a:extLst>
-                    <a:ext uri="{9D8B030D-6E8A-4147-A177-3AD203B41FA5}">
-                      <a16:colId xmlns:a16="http://schemas.microsoft.com/office/drawing/2014/main" val="4227102101"/>
-                    </a:ext>
-                  </a:extLst>
-                </a:gridCol>
-              </a:tblGrid>
-              <a:tr h="272317">
-                <a:tc>
-                  <a:txBody>
-                    <a:bodyPr/>
-                    <a:lstStyle/>
-                    <a:p>
-                      <a:endParaRPr lang="zh-CN" altLang="en-US" sz="1200" dirty="0"/>
-                    </a:p>
-                  </a:txBody>
-                  <a:tcPr/>
-                </a:tc>
-                <a:tc>
-                  <a:txBody>
-                    <a:bodyPr/>
-                    <a:lstStyle/>
-                    <a:p>
-                      <a:r>
-                        <a:rPr lang="en-US" altLang="zh-CN" sz="1200" dirty="0"/>
-                        <a:t>Pulse duration</a:t>
-                      </a:r>
-                      <a:endParaRPr lang="zh-CN" altLang="en-US" sz="1200" dirty="0"/>
-                    </a:p>
-                  </a:txBody>
-                  <a:tcPr/>
-                </a:tc>
-                <a:extLst>
-                  <a:ext uri="{0D108BD9-81ED-4DB2-BD59-A6C34878D82A}">
-                    <a16:rowId xmlns:a16="http://schemas.microsoft.com/office/drawing/2014/main" val="3762957718"/>
-                  </a:ext>
-                </a:extLst>
-              </a:tr>
-              <a:tr h="272317">
-                <a:tc>
-                  <a:txBody>
-                    <a:bodyPr/>
-                    <a:lstStyle/>
-                    <a:p>
-                      <a:r>
-                        <a:rPr lang="en-US" altLang="zh-CN" sz="1200" dirty="0"/>
-                        <a:t>Top</a:t>
-                      </a:r>
-                      <a:endParaRPr lang="zh-CN" altLang="en-US" sz="1200" dirty="0"/>
-                    </a:p>
-                  </a:txBody>
-                  <a:tcPr/>
-                </a:tc>
-                <a:tc>
-                  <a:txBody>
-                    <a:bodyPr/>
-                    <a:lstStyle/>
-                    <a:p>
-                      <a:r>
-                        <a:rPr lang="en-US" altLang="zh-CN" sz="1200" dirty="0"/>
-                        <a:t>1 fs</a:t>
-                      </a:r>
-                      <a:endParaRPr lang="zh-CN" altLang="en-US" sz="1200" dirty="0"/>
-                    </a:p>
-                  </a:txBody>
-                  <a:tcPr/>
-                </a:tc>
-                <a:extLst>
-                  <a:ext uri="{0D108BD9-81ED-4DB2-BD59-A6C34878D82A}">
-                    <a16:rowId xmlns:a16="http://schemas.microsoft.com/office/drawing/2014/main" val="2494080765"/>
-                  </a:ext>
-                </a:extLst>
-              </a:tr>
-              <a:tr h="272317">
-                <a:tc>
-                  <a:txBody>
-                    <a:bodyPr/>
-                    <a:lstStyle/>
-                    <a:p>
-                      <a:r>
-                        <a:rPr lang="en-US" altLang="zh-CN" sz="1200" dirty="0"/>
-                        <a:t>Mid</a:t>
-                      </a:r>
-                      <a:endParaRPr lang="zh-CN" altLang="en-US" sz="1200" dirty="0"/>
-                    </a:p>
-                  </a:txBody>
-                  <a:tcPr/>
-                </a:tc>
-                <a:tc>
-                  <a:txBody>
-                    <a:bodyPr/>
-                    <a:lstStyle/>
-                    <a:p>
-                      <a:r>
-                        <a:rPr lang="en-US" altLang="zh-CN" sz="1200" dirty="0"/>
-                        <a:t>10 fs</a:t>
-                      </a:r>
-                      <a:endParaRPr lang="zh-CN" altLang="en-US" sz="1200" dirty="0"/>
-                    </a:p>
-                  </a:txBody>
-                  <a:tcPr/>
-                </a:tc>
-                <a:extLst>
-                  <a:ext uri="{0D108BD9-81ED-4DB2-BD59-A6C34878D82A}">
-                    <a16:rowId xmlns:a16="http://schemas.microsoft.com/office/drawing/2014/main" val="1357814628"/>
-                  </a:ext>
-                </a:extLst>
-              </a:tr>
-              <a:tr h="272317">
-                <a:tc>
-                  <a:txBody>
-                    <a:bodyPr/>
-                    <a:lstStyle/>
-                    <a:p>
-                      <a:r>
-                        <a:rPr lang="en-US" altLang="zh-CN" sz="1200" dirty="0"/>
-                        <a:t>Bottom</a:t>
-                      </a:r>
-                      <a:endParaRPr lang="zh-CN" altLang="en-US" sz="1200" dirty="0"/>
-                    </a:p>
-                  </a:txBody>
-                  <a:tcPr/>
-                </a:tc>
-                <a:tc>
-                  <a:txBody>
-                    <a:bodyPr/>
-                    <a:lstStyle/>
-                    <a:p>
-                      <a:r>
-                        <a:rPr lang="en-US" altLang="zh-CN" sz="1200" dirty="0"/>
-                        <a:t>50 fs</a:t>
-                      </a:r>
-                      <a:endParaRPr lang="zh-CN" altLang="en-US" sz="1200" dirty="0"/>
-                    </a:p>
-                  </a:txBody>
-                  <a:tcPr/>
-                </a:tc>
-                <a:extLst>
-                  <a:ext uri="{0D108BD9-81ED-4DB2-BD59-A6C34878D82A}">
-                    <a16:rowId xmlns:a16="http://schemas.microsoft.com/office/drawing/2014/main" val="3299385531"/>
-                  </a:ext>
-                </a:extLst>
-              </a:tr>
-            </a:tbl>
-          </a:graphicData>
-        </a:graphic>
-      </p:graphicFrame>
-      <p:sp>
-        <p:nvSpPr>
-          <p:cNvPr id="21" name="Content Placeholder 29">
-            <a:extLst>
-              <a:ext uri="{FF2B5EF4-FFF2-40B4-BE49-F238E27FC236}">
-                <a16:creationId xmlns:a16="http://schemas.microsoft.com/office/drawing/2014/main" id="{9702A31B-1747-4FF6-8502-95CCFDEE3B63}"/>
-              </a:ext>
-            </a:extLst>
-          </p:cNvPr>
-          <p:cNvSpPr txBox="1">
-            <a:spLocks/>
-          </p:cNvSpPr>
-          <p:nvPr/>
-        </p:nvSpPr>
-        <p:spPr>
-          <a:xfrm>
-            <a:off x="5410200" y="2627108"/>
-            <a:ext cx="3581400" cy="3681998"/>
-          </a:xfrm>
-          <a:prstGeom prst="rect">
-            <a:avLst/>
-          </a:prstGeom>
-        </p:spPr>
-        <p:txBody>
-          <a:bodyPr vert="horz" lIns="0" tIns="0" rIns="0" bIns="0" rtlCol="0">
-            <a:normAutofit/>
-          </a:bodyPr>
-          <a:lstStyle>
-            <a:lvl1pPr marL="0" indent="0" algn="l" defTabSz="914400" rtl="0" eaLnBrk="1" latinLnBrk="0" hangingPunct="1">
-              <a:lnSpc>
-                <a:spcPct val="120000"/>
-              </a:lnSpc>
-              <a:spcBef>
-                <a:spcPts val="0"/>
-              </a:spcBef>
-              <a:spcAft>
-                <a:spcPts val="300"/>
-              </a:spcAft>
-              <a:buClr>
-                <a:srgbClr val="981E32"/>
-              </a:buClr>
-              <a:buFont typeface="Arial" pitchFamily="34" charset="0"/>
-              <a:buNone/>
-              <a:defRPr sz="2400" b="0" kern="1200" baseline="0">
-                <a:solidFill>
-                  <a:schemeClr val="tx1"/>
-                </a:solidFill>
-                <a:latin typeface="Arial" pitchFamily="34" charset="0"/>
-                <a:ea typeface="+mn-ea"/>
-                <a:cs typeface="Arial" pitchFamily="34" charset="0"/>
-              </a:defRPr>
-            </a:lvl1pPr>
-            <a:lvl2pPr marL="457200" indent="-223838" algn="l" defTabSz="914400" rtl="0" eaLnBrk="1" latinLnBrk="0" hangingPunct="1">
-              <a:lnSpc>
-                <a:spcPct val="120000"/>
-              </a:lnSpc>
-              <a:spcBef>
-                <a:spcPts val="0"/>
-              </a:spcBef>
-              <a:spcAft>
-                <a:spcPts val="0"/>
-              </a:spcAft>
-              <a:buClr>
-                <a:srgbClr val="981E32"/>
-              </a:buClr>
-              <a:buSzPct val="120000"/>
-              <a:buFont typeface="Arial" pitchFamily="34" charset="0"/>
-              <a:buChar char="•"/>
-              <a:defRPr sz="2200" kern="1200">
-                <a:solidFill>
-                  <a:schemeClr val="tx1"/>
-                </a:solidFill>
-                <a:latin typeface="Arial" pitchFamily="34" charset="0"/>
-                <a:ea typeface="+mn-ea"/>
-                <a:cs typeface="Arial" pitchFamily="34" charset="0"/>
-              </a:defRPr>
-            </a:lvl2pPr>
-            <a:lvl3pPr marL="690563" indent="-233363" algn="l" defTabSz="914400" rtl="0" eaLnBrk="1" latinLnBrk="0" hangingPunct="1">
-              <a:lnSpc>
-                <a:spcPct val="120000"/>
-              </a:lnSpc>
-              <a:spcBef>
-                <a:spcPts val="0"/>
-              </a:spcBef>
-              <a:buClr>
-                <a:srgbClr val="981E32"/>
-              </a:buClr>
-              <a:buSzPct val="120000"/>
-              <a:buFont typeface="Arial" pitchFamily="34" charset="0"/>
-              <a:buChar char="-"/>
-              <a:defRPr sz="2000" b="0" kern="1200">
-                <a:solidFill>
-                  <a:schemeClr val="tx1"/>
-                </a:solidFill>
-                <a:latin typeface="Arial" pitchFamily="34" charset="0"/>
-                <a:ea typeface="+mn-ea"/>
-                <a:cs typeface="Arial" pitchFamily="34" charset="0"/>
-              </a:defRPr>
-            </a:lvl3pPr>
-            <a:lvl4pPr marL="914400" indent="-223838" algn="l" defTabSz="914400" rtl="0" eaLnBrk="1" latinLnBrk="0" hangingPunct="1">
-              <a:lnSpc>
-                <a:spcPct val="120000"/>
-              </a:lnSpc>
-              <a:spcBef>
-                <a:spcPts val="0"/>
-              </a:spcBef>
-              <a:buClr>
-                <a:srgbClr val="981E32"/>
-              </a:buClr>
-              <a:buSzPct val="120000"/>
-              <a:buFont typeface="Arial" pitchFamily="34" charset="0"/>
-              <a:buChar char="•"/>
-              <a:defRPr sz="1800" kern="1200">
-                <a:solidFill>
-                  <a:schemeClr val="tx1"/>
-                </a:solidFill>
-                <a:latin typeface="Arial" pitchFamily="34" charset="0"/>
-                <a:ea typeface="+mn-ea"/>
-                <a:cs typeface="Arial" pitchFamily="34" charset="0"/>
-              </a:defRPr>
-            </a:lvl4pPr>
-            <a:lvl5pPr marL="1147763" indent="-233363" algn="l" defTabSz="914400" rtl="0" eaLnBrk="1" latinLnBrk="0" hangingPunct="1">
-              <a:lnSpc>
-                <a:spcPct val="120000"/>
-              </a:lnSpc>
-              <a:spcBef>
-                <a:spcPts val="0"/>
-              </a:spcBef>
-              <a:buClr>
-                <a:srgbClr val="981E32"/>
-              </a:buClr>
-              <a:buSzPct val="120000"/>
-              <a:buFont typeface="Arial" pitchFamily="34" charset="0"/>
-              <a:buChar char="-"/>
-              <a:defRPr sz="1600" kern="1200">
-                <a:solidFill>
-                  <a:schemeClr val="tx1"/>
-                </a:solidFill>
-                <a:latin typeface="+mn-lt"/>
-                <a:ea typeface="+mn-ea"/>
-                <a:cs typeface="+mn-cs"/>
-              </a:defRPr>
-            </a:lvl5pPr>
-            <a:lvl6pPr marL="2514600" indent="-228600" algn="l" defTabSz="914400" rtl="0" eaLnBrk="1" latinLnBrk="0" hangingPunct="1">
-              <a:spcBef>
-                <a:spcPct val="20000"/>
-              </a:spcBef>
-              <a:buFont typeface="Arial" pitchFamily="34" charset="0"/>
-              <a:buChar char="•"/>
-              <a:defRPr sz="2000" kern="1200">
-                <a:solidFill>
-                  <a:schemeClr val="tx1"/>
-                </a:solidFill>
-                <a:latin typeface="+mn-lt"/>
-                <a:ea typeface="+mn-ea"/>
-                <a:cs typeface="+mn-cs"/>
-              </a:defRPr>
-            </a:lvl6pPr>
-            <a:lvl7pPr marL="2971800" indent="-228600" algn="l" defTabSz="914400" rtl="0" eaLnBrk="1" latinLnBrk="0" hangingPunct="1">
-              <a:spcBef>
-                <a:spcPct val="20000"/>
-              </a:spcBef>
-              <a:buFont typeface="Arial" pitchFamily="34" charset="0"/>
-              <a:buChar char="•"/>
-              <a:defRPr sz="2000" kern="1200">
-                <a:solidFill>
-                  <a:schemeClr val="tx1"/>
-                </a:solidFill>
-                <a:latin typeface="+mn-lt"/>
-                <a:ea typeface="+mn-ea"/>
-                <a:cs typeface="+mn-cs"/>
-              </a:defRPr>
-            </a:lvl7pPr>
-            <a:lvl8pPr marL="3429000" indent="-228600" algn="l" defTabSz="914400" rtl="0" eaLnBrk="1" latinLnBrk="0" hangingPunct="1">
-              <a:spcBef>
-                <a:spcPct val="20000"/>
-              </a:spcBef>
-              <a:buFont typeface="Arial" pitchFamily="34" charset="0"/>
-              <a:buChar char="•"/>
-              <a:defRPr sz="2000" kern="1200">
-                <a:solidFill>
-                  <a:schemeClr val="tx1"/>
-                </a:solidFill>
-                <a:latin typeface="+mn-lt"/>
-                <a:ea typeface="+mn-ea"/>
-                <a:cs typeface="+mn-cs"/>
-              </a:defRPr>
-            </a:lvl8pPr>
-            <a:lvl9pPr marL="3886200" indent="-228600" algn="l" defTabSz="914400" rtl="0" eaLnBrk="1" latinLnBrk="0" hangingPunct="1">
-              <a:spcBef>
-                <a:spcPct val="20000"/>
-              </a:spcBef>
-              <a:buFont typeface="Arial" pitchFamily="34" charset="0"/>
-              <a:buChar char="•"/>
-              <a:defRPr sz="2000" kern="1200">
-                <a:solidFill>
-                  <a:schemeClr val="tx1"/>
-                </a:solidFill>
-                <a:latin typeface="+mn-lt"/>
-                <a:ea typeface="+mn-ea"/>
-                <a:cs typeface="+mn-cs"/>
-              </a:defRPr>
-            </a:lvl9pPr>
-          </a:lstStyle>
-          <a:p>
-            <a:pPr marL="233362" lvl="1" indent="0">
-              <a:buFont typeface="Arial" pitchFamily="34" charset="0"/>
-              <a:buNone/>
-            </a:pPr>
-            <a:endParaRPr lang="en-US" sz="1400" dirty="0"/>
-          </a:p>
-        </p:txBody>
-      </p:sp>
-      <p:sp>
-        <p:nvSpPr>
-          <p:cNvPr id="22" name="Content Placeholder 29">
-            <a:extLst>
-              <a:ext uri="{FF2B5EF4-FFF2-40B4-BE49-F238E27FC236}">
-                <a16:creationId xmlns:a16="http://schemas.microsoft.com/office/drawing/2014/main" id="{73DEE189-048C-4169-9816-3163E217194F}"/>
-              </a:ext>
-            </a:extLst>
-          </p:cNvPr>
-          <p:cNvSpPr>
-            <a:spLocks noGrp="1"/>
-          </p:cNvSpPr>
-          <p:nvPr>
-            <p:ph sz="quarter" idx="14"/>
-          </p:nvPr>
-        </p:nvSpPr>
-        <p:spPr>
-          <a:xfrm>
-            <a:off x="5562600" y="2779508"/>
-            <a:ext cx="3581400" cy="3681998"/>
-          </a:xfrm>
-        </p:spPr>
-        <p:txBody>
-          <a:bodyPr>
-            <a:normAutofit/>
-          </a:bodyPr>
-          <a:lstStyle/>
-          <a:p>
-            <a:pPr marL="233362" lvl="1" indent="0">
-              <a:buNone/>
-            </a:pPr>
-            <a:r>
-              <a:rPr lang="en-US" sz="1400" dirty="0"/>
-              <a:t>Looks alright now</a:t>
-            </a:r>
-          </a:p>
-        </p:txBody>
-      </p:sp>
-    </p:spTree>
-    <p:extLst>
-      <p:ext uri="{BB962C8B-B14F-4D97-AF65-F5344CB8AC3E}">
-        <p14:creationId xmlns:p14="http://schemas.microsoft.com/office/powerpoint/2010/main" val="3305190942"/>
-      </p:ext>
-    </p:extLst>
-  </p:cSld>
-  <p:clrMapOvr>
-    <a:masterClrMapping/>
-  </p:clrMapOvr>
-</p:sld>
-</file>
-
-<file path=ppt/slides/slide13.xml><?xml version="1.0" encoding="utf-8"?>
 <p:sld xmlns:a="http://schemas.openxmlformats.org/drawingml/2006/main" xmlns:r="http://schemas.openxmlformats.org/officeDocument/2006/relationships" xmlns:p="http://schemas.openxmlformats.org/presentationml/2006/main">
   <p:cSld>
     <p:spTree>
@@ -7237,7 +5508,272 @@
             <a:fld id="{5BD36294-2849-48A8-8531-5354CF3095D2}" type="slidenum">
               <a:rPr lang="en-US" smtClean="0"/>
               <a:pPr/>
-              <a:t>13</a:t>
+              <a:t>11</a:t>
+            </a:fld>
+            <a:endParaRPr lang="en-US" dirty="0"/>
+          </a:p>
+        </p:txBody>
+      </p:sp>
+      <p:sp>
+        <p:nvSpPr>
+          <p:cNvPr id="29" name="Title 28"/>
+          <p:cNvSpPr>
+            <a:spLocks noGrp="1"/>
+          </p:cNvSpPr>
+          <p:nvPr>
+            <p:ph type="title"/>
+          </p:nvPr>
+        </p:nvSpPr>
+        <p:spPr/>
+        <p:txBody>
+          <a:bodyPr/>
+          <a:lstStyle/>
+          <a:p>
+            <a:r>
+              <a:rPr lang="en-US" altLang="zh-CN" dirty="0"/>
+              <a:t>Overall performance</a:t>
+            </a:r>
+            <a:endParaRPr lang="en-CA" dirty="0"/>
+          </a:p>
+        </p:txBody>
+      </p:sp>
+      <p:pic>
+        <p:nvPicPr>
+          <p:cNvPr id="4" name="图片 3" descr="手机屏幕截图&#10;&#10;描述已自动生成">
+            <a:extLst>
+              <a:ext uri="{FF2B5EF4-FFF2-40B4-BE49-F238E27FC236}">
+                <a16:creationId xmlns:a16="http://schemas.microsoft.com/office/drawing/2014/main" id="{C17A5263-6B4E-45F0-AE51-DC024AFF93FA}"/>
+              </a:ext>
+            </a:extLst>
+          </p:cNvPr>
+          <p:cNvPicPr>
+            <a:picLocks noChangeAspect="1"/>
+          </p:cNvPicPr>
+          <p:nvPr/>
+        </p:nvPicPr>
+        <p:blipFill>
+          <a:blip r:embed="rId3"/>
+          <a:stretch>
+            <a:fillRect/>
+          </a:stretch>
+        </p:blipFill>
+        <p:spPr>
+          <a:xfrm>
+            <a:off x="6319200" y="1143000"/>
+            <a:ext cx="2520000" cy="2520000"/>
+          </a:xfrm>
+          <a:prstGeom prst="rect">
+            <a:avLst/>
+          </a:prstGeom>
+        </p:spPr>
+      </p:pic>
+      <p:pic>
+        <p:nvPicPr>
+          <p:cNvPr id="6" name="图片 5" descr="图片包含 游戏机&#10;&#10;描述已自动生成">
+            <a:extLst>
+              <a:ext uri="{FF2B5EF4-FFF2-40B4-BE49-F238E27FC236}">
+                <a16:creationId xmlns:a16="http://schemas.microsoft.com/office/drawing/2014/main" id="{A01F3FC3-E7AC-49E6-926F-570CE0EC5BEF}"/>
+              </a:ext>
+            </a:extLst>
+          </p:cNvPr>
+          <p:cNvPicPr>
+            <a:picLocks noChangeAspect="1"/>
+          </p:cNvPicPr>
+          <p:nvPr/>
+        </p:nvPicPr>
+        <p:blipFill>
+          <a:blip r:embed="rId4"/>
+          <a:stretch>
+            <a:fillRect/>
+          </a:stretch>
+        </p:blipFill>
+        <p:spPr>
+          <a:xfrm>
+            <a:off x="-76200" y="1143000"/>
+            <a:ext cx="4200000" cy="2520000"/>
+          </a:xfrm>
+          <a:prstGeom prst="rect">
+            <a:avLst/>
+          </a:prstGeom>
+        </p:spPr>
+      </p:pic>
+      <p:pic>
+        <p:nvPicPr>
+          <p:cNvPr id="10" name="图片 9" descr="手机屏幕截图&#10;&#10;描述已自动生成">
+            <a:extLst>
+              <a:ext uri="{FF2B5EF4-FFF2-40B4-BE49-F238E27FC236}">
+                <a16:creationId xmlns:a16="http://schemas.microsoft.com/office/drawing/2014/main" id="{2B73ACFD-1D5B-4620-A5FC-C99E6ABE967C}"/>
+              </a:ext>
+            </a:extLst>
+          </p:cNvPr>
+          <p:cNvPicPr>
+            <a:picLocks noChangeAspect="1"/>
+          </p:cNvPicPr>
+          <p:nvPr/>
+        </p:nvPicPr>
+        <p:blipFill>
+          <a:blip r:embed="rId5"/>
+          <a:stretch>
+            <a:fillRect/>
+          </a:stretch>
+        </p:blipFill>
+        <p:spPr>
+          <a:xfrm>
+            <a:off x="3880800" y="1143000"/>
+            <a:ext cx="2520000" cy="2520000"/>
+          </a:xfrm>
+          <a:prstGeom prst="rect">
+            <a:avLst/>
+          </a:prstGeom>
+        </p:spPr>
+      </p:pic>
+      <p:pic>
+        <p:nvPicPr>
+          <p:cNvPr id="13" name="图片 12" descr="手机屏幕截图&#10;&#10;描述已自动生成">
+            <a:extLst>
+              <a:ext uri="{FF2B5EF4-FFF2-40B4-BE49-F238E27FC236}">
+                <a16:creationId xmlns:a16="http://schemas.microsoft.com/office/drawing/2014/main" id="{CCDA07D2-DCDC-4B2E-9A3B-07815FCD6BB1}"/>
+              </a:ext>
+            </a:extLst>
+          </p:cNvPr>
+          <p:cNvPicPr>
+            <a:picLocks noChangeAspect="1"/>
+          </p:cNvPicPr>
+          <p:nvPr/>
+        </p:nvPicPr>
+        <p:blipFill>
+          <a:blip r:embed="rId6"/>
+          <a:stretch>
+            <a:fillRect/>
+          </a:stretch>
+        </p:blipFill>
+        <p:spPr>
+          <a:xfrm>
+            <a:off x="6319200" y="3537375"/>
+            <a:ext cx="2520000" cy="2520000"/>
+          </a:xfrm>
+          <a:prstGeom prst="rect">
+            <a:avLst/>
+          </a:prstGeom>
+        </p:spPr>
+      </p:pic>
+      <p:sp>
+        <p:nvSpPr>
+          <p:cNvPr id="33" name="Content Placeholder 29">
+            <a:extLst>
+              <a:ext uri="{FF2B5EF4-FFF2-40B4-BE49-F238E27FC236}">
+                <a16:creationId xmlns:a16="http://schemas.microsoft.com/office/drawing/2014/main" id="{0F9B0BB7-06AE-44B8-A2F4-81F7427D7051}"/>
+              </a:ext>
+            </a:extLst>
+          </p:cNvPr>
+          <p:cNvSpPr>
+            <a:spLocks noGrp="1"/>
+          </p:cNvSpPr>
+          <p:nvPr>
+            <p:ph sz="quarter" idx="14"/>
+          </p:nvPr>
+        </p:nvSpPr>
+        <p:spPr>
+          <a:xfrm>
+            <a:off x="152400" y="3877675"/>
+            <a:ext cx="6166800" cy="2218325"/>
+          </a:xfrm>
+        </p:spPr>
+        <p:txBody>
+          <a:bodyPr>
+            <a:normAutofit/>
+          </a:bodyPr>
+          <a:lstStyle/>
+          <a:p>
+            <a:pPr marL="233362" lvl="1" indent="0">
+              <a:buNone/>
+            </a:pPr>
+            <a:r>
+              <a:rPr lang="en-US" sz="1400" dirty="0"/>
+              <a:t>Plots:</a:t>
+            </a:r>
+            <a:endParaRPr lang="en-US" altLang="zh-CN" sz="1400" dirty="0"/>
+          </a:p>
+          <a:p>
+            <a:pPr lvl="1"/>
+            <a:r>
+              <a:rPr lang="en-US" altLang="zh-CN" sz="1400" dirty="0"/>
+              <a:t>Spectral intensity: the mean transmitted intensity over the spectral range vs. slit width</a:t>
+            </a:r>
+          </a:p>
+          <a:p>
+            <a:pPr lvl="1"/>
+            <a:r>
+              <a:rPr lang="en-US" altLang="zh-CN" sz="1400" dirty="0"/>
+              <a:t>Throughput: total transmitted power vs. slit width</a:t>
+            </a:r>
+          </a:p>
+          <a:p>
+            <a:pPr lvl="1"/>
+            <a:r>
+              <a:rPr lang="en-US" sz="1400" dirty="0"/>
+              <a:t>Bandwidth: </a:t>
+            </a:r>
+            <a:r>
+              <a:rPr lang="en-US" altLang="zh-CN" sz="1400" dirty="0"/>
+              <a:t>energy resolution limit vs. slit width</a:t>
+            </a:r>
+          </a:p>
+          <a:p>
+            <a:pPr lvl="1"/>
+            <a:endParaRPr lang="en-US" sz="1400" dirty="0"/>
+          </a:p>
+        </p:txBody>
+      </p:sp>
+    </p:spTree>
+    <p:extLst>
+      <p:ext uri="{BB962C8B-B14F-4D97-AF65-F5344CB8AC3E}">
+        <p14:creationId xmlns:p14="http://schemas.microsoft.com/office/powerpoint/2010/main" val="3057985773"/>
+      </p:ext>
+    </p:extLst>
+  </p:cSld>
+  <p:clrMapOvr>
+    <a:masterClrMapping/>
+  </p:clrMapOvr>
+</p:sld>
+</file>
+
+<file path=ppt/slides/slide12.xml><?xml version="1.0" encoding="utf-8"?>
+<p:sld xmlns:a="http://schemas.openxmlformats.org/drawingml/2006/main" xmlns:r="http://schemas.openxmlformats.org/officeDocument/2006/relationships" xmlns:p="http://schemas.openxmlformats.org/presentationml/2006/main">
+  <p:cSld>
+    <p:spTree>
+      <p:nvGrpSpPr>
+        <p:cNvPr id="1" name=""/>
+        <p:cNvGrpSpPr/>
+        <p:nvPr/>
+      </p:nvGrpSpPr>
+      <p:grpSpPr>
+        <a:xfrm>
+          <a:off x="0" y="0"/>
+          <a:ext cx="0" cy="0"/>
+          <a:chOff x="0" y="0"/>
+          <a:chExt cx="0" cy="0"/>
+        </a:xfrm>
+      </p:grpSpPr>
+      <p:sp>
+        <p:nvSpPr>
+          <p:cNvPr id="7" name="Slide Number Placeholder 6"/>
+          <p:cNvSpPr>
+            <a:spLocks noGrp="1"/>
+          </p:cNvSpPr>
+          <p:nvPr>
+            <p:ph type="sldNum" sz="quarter" idx="11"/>
+          </p:nvPr>
+        </p:nvSpPr>
+        <p:spPr/>
+        <p:txBody>
+          <a:bodyPr/>
+          <a:lstStyle/>
+          <a:p>
+            <a:fld id="{5BD36294-2849-48A8-8531-5354CF3095D2}" type="slidenum">
+              <a:rPr lang="en-US" smtClean="0"/>
+              <a:pPr/>
+              <a:t>12</a:t>
             </a:fld>
             <a:endParaRPr lang="en-US" dirty="0"/>
           </a:p>
@@ -7816,7 +6352,7 @@
 </p:sld>
 </file>
 
-<file path=ppt/slides/slide14.xml><?xml version="1.0" encoding="utf-8"?>
+<file path=ppt/slides/slide13.xml><?xml version="1.0" encoding="utf-8"?>
 <p:sld xmlns:a="http://schemas.openxmlformats.org/drawingml/2006/main" xmlns:r="http://schemas.openxmlformats.org/officeDocument/2006/relationships" xmlns:p="http://schemas.openxmlformats.org/presentationml/2006/main">
   <p:cSld>
     <p:spTree>
@@ -7851,7 +6387,7 @@
             <a:fld id="{5BD36294-2849-48A8-8531-5354CF3095D2}" type="slidenum">
               <a:rPr lang="en-US" smtClean="0"/>
               <a:pPr/>
-              <a:t>14</a:t>
+              <a:t>13</a:t>
             </a:fld>
             <a:endParaRPr lang="en-US" dirty="0"/>
           </a:p>
@@ -8430,7 +6966,7 @@
 </p:sld>
 </file>
 
-<file path=ppt/slides/slide15.xml><?xml version="1.0" encoding="utf-8"?>
+<file path=ppt/slides/slide14.xml><?xml version="1.0" encoding="utf-8"?>
 <p:sld xmlns:a="http://schemas.openxmlformats.org/drawingml/2006/main" xmlns:r="http://schemas.openxmlformats.org/officeDocument/2006/relationships" xmlns:p="http://schemas.openxmlformats.org/presentationml/2006/main">
   <p:cSld>
     <p:spTree>
@@ -8553,7 +7089,7 @@
             <a:fld id="{5BD36294-2849-48A8-8531-5354CF3095D2}" type="slidenum">
               <a:rPr lang="en-US" smtClean="0"/>
               <a:pPr/>
-              <a:t>15</a:t>
+              <a:t>14</a:t>
             </a:fld>
             <a:endParaRPr lang="en-US" dirty="0"/>
           </a:p>
@@ -9280,7 +7816,7 @@
 </p:sld>
 </file>
 
-<file path=ppt/slides/slide16.xml><?xml version="1.0" encoding="utf-8"?>
+<file path=ppt/slides/slide15.xml><?xml version="1.0" encoding="utf-8"?>
 <p:sld xmlns:a="http://schemas.openxmlformats.org/drawingml/2006/main" xmlns:r="http://schemas.openxmlformats.org/officeDocument/2006/relationships" xmlns:p="http://schemas.openxmlformats.org/presentationml/2006/main">
   <p:cSld>
     <p:spTree>
@@ -9373,7 +7909,7 @@
             <a:fld id="{5BD36294-2849-48A8-8531-5354CF3095D2}" type="slidenum">
               <a:rPr lang="en-US" smtClean="0"/>
               <a:pPr/>
-              <a:t>16</a:t>
+              <a:t>15</a:t>
             </a:fld>
             <a:endParaRPr lang="en-US" dirty="0"/>
           </a:p>
@@ -10121,7 +8657,7 @@
 </p:sld>
 </file>
 
-<file path=ppt/slides/slide17.xml><?xml version="1.0" encoding="utf-8"?>
+<file path=ppt/slides/slide16.xml><?xml version="1.0" encoding="utf-8"?>
 <p:sld xmlns:a="http://schemas.openxmlformats.org/drawingml/2006/main" xmlns:r="http://schemas.openxmlformats.org/officeDocument/2006/relationships" xmlns:p="http://schemas.openxmlformats.org/presentationml/2006/main">
   <p:cSld>
     <p:spTree>
@@ -10243,7 +8779,7 @@
             <a:fld id="{5BD36294-2849-48A8-8531-5354CF3095D2}" type="slidenum">
               <a:rPr lang="en-US" smtClean="0"/>
               <a:pPr/>
-              <a:t>17</a:t>
+              <a:t>16</a:t>
             </a:fld>
             <a:endParaRPr lang="en-US" dirty="0"/>
           </a:p>
@@ -10970,7 +9506,7 @@
 </p:sld>
 </file>
 
-<file path=ppt/slides/slide18.xml><?xml version="1.0" encoding="utf-8"?>
+<file path=ppt/slides/slide17.xml><?xml version="1.0" encoding="utf-8"?>
 <p:sld xmlns:a="http://schemas.openxmlformats.org/drawingml/2006/main" xmlns:r="http://schemas.openxmlformats.org/officeDocument/2006/relationships" xmlns:p="http://schemas.openxmlformats.org/presentationml/2006/main">
   <p:cSld>
     <p:spTree>
@@ -11092,7 +9628,7 @@
             <a:fld id="{5BD36294-2849-48A8-8531-5354CF3095D2}" type="slidenum">
               <a:rPr lang="en-US" smtClean="0"/>
               <a:pPr/>
-              <a:t>18</a:t>
+              <a:t>17</a:t>
             </a:fld>
             <a:endParaRPr lang="en-US" dirty="0"/>
           </a:p>
@@ -11811,6 +10347,1250 @@
 </p:sld>
 </file>
 
+<file path=ppt/slides/slide18.xml><?xml version="1.0" encoding="utf-8"?>
+<p:sld xmlns:a="http://schemas.openxmlformats.org/drawingml/2006/main" xmlns:r="http://schemas.openxmlformats.org/officeDocument/2006/relationships" xmlns:p="http://schemas.openxmlformats.org/presentationml/2006/main">
+  <p:cSld>
+    <p:spTree>
+      <p:nvGrpSpPr>
+        <p:cNvPr id="1" name=""/>
+        <p:cNvGrpSpPr/>
+        <p:nvPr/>
+      </p:nvGrpSpPr>
+      <p:grpSpPr>
+        <a:xfrm>
+          <a:off x="0" y="0"/>
+          <a:ext cx="0" cy="0"/>
+          <a:chOff x="0" y="0"/>
+          <a:chExt cx="0" cy="0"/>
+        </a:xfrm>
+      </p:grpSpPr>
+      <p:sp>
+        <p:nvSpPr>
+          <p:cNvPr id="7" name="Slide Number Placeholder 6"/>
+          <p:cNvSpPr>
+            <a:spLocks noGrp="1"/>
+          </p:cNvSpPr>
+          <p:nvPr>
+            <p:ph type="sldNum" sz="quarter" idx="11"/>
+          </p:nvPr>
+        </p:nvSpPr>
+        <p:spPr/>
+        <p:txBody>
+          <a:bodyPr/>
+          <a:lstStyle/>
+          <a:p>
+            <a:fld id="{5BD36294-2849-48A8-8531-5354CF3095D2}" type="slidenum">
+              <a:rPr lang="en-US" smtClean="0"/>
+              <a:pPr/>
+              <a:t>18</a:t>
+            </a:fld>
+            <a:endParaRPr lang="en-US" dirty="0"/>
+          </a:p>
+        </p:txBody>
+      </p:sp>
+      <p:sp>
+        <p:nvSpPr>
+          <p:cNvPr id="29" name="Title 28"/>
+          <p:cNvSpPr>
+            <a:spLocks noGrp="1"/>
+          </p:cNvSpPr>
+          <p:nvPr>
+            <p:ph type="title"/>
+          </p:nvPr>
+        </p:nvSpPr>
+        <p:spPr/>
+        <p:txBody>
+          <a:bodyPr/>
+          <a:lstStyle/>
+          <a:p>
+            <a:r>
+              <a:rPr lang="en-US" altLang="zh-CN" dirty="0"/>
+              <a:t>Overall performance</a:t>
+            </a:r>
+            <a:endParaRPr lang="en-CA" dirty="0"/>
+          </a:p>
+        </p:txBody>
+      </p:sp>
+      <p:pic>
+        <p:nvPicPr>
+          <p:cNvPr id="4" name="图片 3">
+            <a:extLst>
+              <a:ext uri="{FF2B5EF4-FFF2-40B4-BE49-F238E27FC236}">
+                <a16:creationId xmlns:a16="http://schemas.microsoft.com/office/drawing/2014/main" id="{C17A5263-6B4E-45F0-AE51-DC024AFF93FA}"/>
+              </a:ext>
+            </a:extLst>
+          </p:cNvPr>
+          <p:cNvPicPr>
+            <a:picLocks noChangeAspect="1"/>
+          </p:cNvPicPr>
+          <p:nvPr/>
+        </p:nvPicPr>
+        <p:blipFill>
+          <a:blip r:embed="rId3"/>
+          <a:srcRect/>
+          <a:stretch/>
+        </p:blipFill>
+        <p:spPr>
+          <a:xfrm>
+            <a:off x="6319200" y="1143000"/>
+            <a:ext cx="2520000" cy="2520000"/>
+          </a:xfrm>
+          <a:prstGeom prst="rect">
+            <a:avLst/>
+          </a:prstGeom>
+        </p:spPr>
+      </p:pic>
+      <p:pic>
+        <p:nvPicPr>
+          <p:cNvPr id="6" name="图片 5">
+            <a:extLst>
+              <a:ext uri="{FF2B5EF4-FFF2-40B4-BE49-F238E27FC236}">
+                <a16:creationId xmlns:a16="http://schemas.microsoft.com/office/drawing/2014/main" id="{A01F3FC3-E7AC-49E6-926F-570CE0EC5BEF}"/>
+              </a:ext>
+            </a:extLst>
+          </p:cNvPr>
+          <p:cNvPicPr>
+            <a:picLocks noChangeAspect="1"/>
+          </p:cNvPicPr>
+          <p:nvPr/>
+        </p:nvPicPr>
+        <p:blipFill>
+          <a:blip r:embed="rId4"/>
+          <a:srcRect/>
+          <a:stretch/>
+        </p:blipFill>
+        <p:spPr>
+          <a:xfrm>
+            <a:off x="-76200" y="1143000"/>
+            <a:ext cx="4200000" cy="2519999"/>
+          </a:xfrm>
+          <a:prstGeom prst="rect">
+            <a:avLst/>
+          </a:prstGeom>
+        </p:spPr>
+      </p:pic>
+      <p:pic>
+        <p:nvPicPr>
+          <p:cNvPr id="10" name="图片 9">
+            <a:extLst>
+              <a:ext uri="{FF2B5EF4-FFF2-40B4-BE49-F238E27FC236}">
+                <a16:creationId xmlns:a16="http://schemas.microsoft.com/office/drawing/2014/main" id="{2B73ACFD-1D5B-4620-A5FC-C99E6ABE967C}"/>
+              </a:ext>
+            </a:extLst>
+          </p:cNvPr>
+          <p:cNvPicPr>
+            <a:picLocks noChangeAspect="1"/>
+          </p:cNvPicPr>
+          <p:nvPr/>
+        </p:nvPicPr>
+        <p:blipFill>
+          <a:blip r:embed="rId5"/>
+          <a:srcRect/>
+          <a:stretch/>
+        </p:blipFill>
+        <p:spPr>
+          <a:xfrm>
+            <a:off x="3880800" y="1143000"/>
+            <a:ext cx="2520000" cy="2520000"/>
+          </a:xfrm>
+          <a:prstGeom prst="rect">
+            <a:avLst/>
+          </a:prstGeom>
+        </p:spPr>
+      </p:pic>
+      <p:pic>
+        <p:nvPicPr>
+          <p:cNvPr id="13" name="图片 12">
+            <a:extLst>
+              <a:ext uri="{FF2B5EF4-FFF2-40B4-BE49-F238E27FC236}">
+                <a16:creationId xmlns:a16="http://schemas.microsoft.com/office/drawing/2014/main" id="{CCDA07D2-DCDC-4B2E-9A3B-07815FCD6BB1}"/>
+              </a:ext>
+            </a:extLst>
+          </p:cNvPr>
+          <p:cNvPicPr>
+            <a:picLocks noChangeAspect="1"/>
+          </p:cNvPicPr>
+          <p:nvPr/>
+        </p:nvPicPr>
+        <p:blipFill>
+          <a:blip r:embed="rId6"/>
+          <a:srcRect/>
+          <a:stretch/>
+        </p:blipFill>
+        <p:spPr>
+          <a:xfrm>
+            <a:off x="6319200" y="3537375"/>
+            <a:ext cx="2520000" cy="2520000"/>
+          </a:xfrm>
+          <a:prstGeom prst="rect">
+            <a:avLst/>
+          </a:prstGeom>
+        </p:spPr>
+      </p:pic>
+      <p:sp>
+        <p:nvSpPr>
+          <p:cNvPr id="33" name="Content Placeholder 29">
+            <a:extLst>
+              <a:ext uri="{FF2B5EF4-FFF2-40B4-BE49-F238E27FC236}">
+                <a16:creationId xmlns:a16="http://schemas.microsoft.com/office/drawing/2014/main" id="{0F9B0BB7-06AE-44B8-A2F4-81F7427D7051}"/>
+              </a:ext>
+            </a:extLst>
+          </p:cNvPr>
+          <p:cNvSpPr>
+            <a:spLocks noGrp="1"/>
+          </p:cNvSpPr>
+          <p:nvPr>
+            <p:ph sz="quarter" idx="14"/>
+          </p:nvPr>
+        </p:nvSpPr>
+        <p:spPr>
+          <a:xfrm>
+            <a:off x="152400" y="3877675"/>
+            <a:ext cx="6166800" cy="2218325"/>
+          </a:xfrm>
+        </p:spPr>
+        <p:txBody>
+          <a:bodyPr>
+            <a:normAutofit/>
+          </a:bodyPr>
+          <a:lstStyle/>
+          <a:p>
+            <a:pPr marL="233362" lvl="1" indent="0">
+              <a:buNone/>
+            </a:pPr>
+            <a:r>
+              <a:rPr lang="en-US" sz="1400" dirty="0"/>
+              <a:t>Plots:</a:t>
+            </a:r>
+            <a:endParaRPr lang="en-US" altLang="zh-CN" sz="1400" dirty="0"/>
+          </a:p>
+          <a:p>
+            <a:pPr lvl="1"/>
+            <a:r>
+              <a:rPr lang="en-US" altLang="zh-CN" sz="1400" dirty="0"/>
+              <a:t>Spectral intensity: the mean transmitted intensity over the spectral range vs. slit width</a:t>
+            </a:r>
+          </a:p>
+          <a:p>
+            <a:pPr lvl="1"/>
+            <a:r>
+              <a:rPr lang="en-US" altLang="zh-CN" sz="1400" dirty="0"/>
+              <a:t>Throughput: total transmitted power vs. slit width</a:t>
+            </a:r>
+          </a:p>
+          <a:p>
+            <a:pPr lvl="1"/>
+            <a:r>
+              <a:rPr lang="en-US" sz="1400" dirty="0"/>
+              <a:t>Bandwidth: </a:t>
+            </a:r>
+            <a:r>
+              <a:rPr lang="en-US" altLang="zh-CN" sz="1400" dirty="0"/>
+              <a:t>energy resolution limit vs. slit width</a:t>
+            </a:r>
+          </a:p>
+          <a:p>
+            <a:pPr lvl="1"/>
+            <a:endParaRPr lang="en-US" sz="1400" dirty="0"/>
+          </a:p>
+        </p:txBody>
+      </p:sp>
+    </p:spTree>
+    <p:extLst>
+      <p:ext uri="{BB962C8B-B14F-4D97-AF65-F5344CB8AC3E}">
+        <p14:creationId xmlns:p14="http://schemas.microsoft.com/office/powerpoint/2010/main" val="2228375729"/>
+      </p:ext>
+    </p:extLst>
+  </p:cSld>
+  <p:clrMapOvr>
+    <a:masterClrMapping/>
+  </p:clrMapOvr>
+</p:sld>
+</file>
+
+<file path=ppt/slides/slide19.xml><?xml version="1.0" encoding="utf-8"?>
+<p:sld xmlns:a="http://schemas.openxmlformats.org/drawingml/2006/main" xmlns:r="http://schemas.openxmlformats.org/officeDocument/2006/relationships" xmlns:p="http://schemas.openxmlformats.org/presentationml/2006/main" show="0">
+  <p:cSld>
+    <p:spTree>
+      <p:nvGrpSpPr>
+        <p:cNvPr id="1" name=""/>
+        <p:cNvGrpSpPr/>
+        <p:nvPr/>
+      </p:nvGrpSpPr>
+      <p:grpSpPr>
+        <a:xfrm>
+          <a:off x="0" y="0"/>
+          <a:ext cx="0" cy="0"/>
+          <a:chOff x="0" y="0"/>
+          <a:chExt cx="0" cy="0"/>
+        </a:xfrm>
+      </p:grpSpPr>
+      <p:sp>
+        <p:nvSpPr>
+          <p:cNvPr id="7" name="Slide Number Placeholder 6"/>
+          <p:cNvSpPr>
+            <a:spLocks noGrp="1"/>
+          </p:cNvSpPr>
+          <p:nvPr>
+            <p:ph type="sldNum" sz="quarter" idx="11"/>
+          </p:nvPr>
+        </p:nvSpPr>
+        <p:spPr/>
+        <p:txBody>
+          <a:bodyPr/>
+          <a:lstStyle/>
+          <a:p>
+            <a:fld id="{5BD36294-2849-48A8-8531-5354CF3095D2}" type="slidenum">
+              <a:rPr lang="en-US" smtClean="0"/>
+              <a:pPr/>
+              <a:t>19</a:t>
+            </a:fld>
+            <a:endParaRPr lang="en-US" dirty="0"/>
+          </a:p>
+        </p:txBody>
+      </p:sp>
+      <p:sp>
+        <p:nvSpPr>
+          <p:cNvPr id="29" name="Title 28"/>
+          <p:cNvSpPr>
+            <a:spLocks noGrp="1"/>
+          </p:cNvSpPr>
+          <p:nvPr>
+            <p:ph type="title"/>
+          </p:nvPr>
+        </p:nvSpPr>
+        <p:spPr/>
+        <p:txBody>
+          <a:bodyPr/>
+          <a:lstStyle/>
+          <a:p>
+            <a:r>
+              <a:rPr lang="en-US" altLang="zh-CN" dirty="0"/>
+              <a:t>Crystal only, changing </a:t>
+            </a:r>
+            <a:r>
+              <a:rPr lang="en-US" altLang="zh-CN" dirty="0" err="1"/>
+              <a:t>miscut</a:t>
+            </a:r>
+            <a:r>
+              <a:rPr lang="en-US" altLang="zh-CN" dirty="0"/>
+              <a:t>, Si 220</a:t>
+            </a:r>
+            <a:endParaRPr lang="en-CA" dirty="0"/>
+          </a:p>
+        </p:txBody>
+      </p:sp>
+      <p:grpSp>
+        <p:nvGrpSpPr>
+          <p:cNvPr id="26" name="组合 25">
+            <a:extLst>
+              <a:ext uri="{FF2B5EF4-FFF2-40B4-BE49-F238E27FC236}">
+                <a16:creationId xmlns:a16="http://schemas.microsoft.com/office/drawing/2014/main" id="{118EE74E-010B-4071-B451-D4A78193064D}"/>
+              </a:ext>
+            </a:extLst>
+          </p:cNvPr>
+          <p:cNvGrpSpPr/>
+          <p:nvPr/>
+        </p:nvGrpSpPr>
+        <p:grpSpPr>
+          <a:xfrm>
+            <a:off x="1" y="1232834"/>
+            <a:ext cx="4260062" cy="1142938"/>
+            <a:chOff x="0" y="1414116"/>
+            <a:chExt cx="9144000" cy="2453257"/>
+          </a:xfrm>
+        </p:grpSpPr>
+        <p:pic>
+          <p:nvPicPr>
+            <p:cNvPr id="8" name="图片 7" descr="图片包含 游戏机, 吉他, 画&#10;&#10;描述已自动生成">
+              <a:extLst>
+                <a:ext uri="{FF2B5EF4-FFF2-40B4-BE49-F238E27FC236}">
+                  <a16:creationId xmlns:a16="http://schemas.microsoft.com/office/drawing/2014/main" id="{E8A749AF-7CE3-488A-A441-B01382BFFCC0}"/>
+                </a:ext>
+              </a:extLst>
+            </p:cNvPr>
+            <p:cNvPicPr>
+              <a:picLocks noChangeAspect="1"/>
+            </p:cNvPicPr>
+            <p:nvPr/>
+          </p:nvPicPr>
+          <p:blipFill>
+            <a:blip r:embed="rId3"/>
+            <a:stretch>
+              <a:fillRect/>
+            </a:stretch>
+          </p:blipFill>
+          <p:spPr>
+            <a:xfrm>
+              <a:off x="0" y="1769524"/>
+              <a:ext cx="9144000" cy="1659476"/>
+            </a:xfrm>
+            <a:prstGeom prst="rect">
+              <a:avLst/>
+            </a:prstGeom>
+          </p:spPr>
+        </p:pic>
+        <p:sp>
+          <p:nvSpPr>
+            <p:cNvPr id="11" name="文本框 10">
+              <a:extLst>
+                <a:ext uri="{FF2B5EF4-FFF2-40B4-BE49-F238E27FC236}">
+                  <a16:creationId xmlns:a16="http://schemas.microsoft.com/office/drawing/2014/main" id="{2EC05EBB-E2AC-4CC3-A6D2-2CCBB84162D6}"/>
+                </a:ext>
+              </a:extLst>
+            </p:cNvPr>
+            <p:cNvSpPr txBox="1"/>
+            <p:nvPr/>
+          </p:nvSpPr>
+          <p:spPr>
+            <a:xfrm>
+              <a:off x="1035234" y="3305841"/>
+              <a:ext cx="2960728" cy="561532"/>
+            </a:xfrm>
+            <a:prstGeom prst="rect">
+              <a:avLst/>
+            </a:prstGeom>
+            <a:noFill/>
+          </p:spPr>
+          <p:txBody>
+            <a:bodyPr wrap="square" rtlCol="0">
+              <a:spAutoFit/>
+            </a:bodyPr>
+            <a:lstStyle/>
+            <a:p>
+              <a:r>
+                <a:rPr lang="en-US" altLang="zh-CN" sz="1050" dirty="0">
+                  <a:solidFill>
+                    <a:srgbClr val="FF0000"/>
+                  </a:solidFill>
+                </a:rPr>
+                <a:t>C1, z = 200m</a:t>
+              </a:r>
+              <a:endParaRPr lang="zh-CN" altLang="en-US" sz="1050" dirty="0">
+                <a:solidFill>
+                  <a:srgbClr val="FF0000"/>
+                </a:solidFill>
+              </a:endParaRPr>
+            </a:p>
+          </p:txBody>
+        </p:sp>
+        <p:sp>
+          <p:nvSpPr>
+            <p:cNvPr id="12" name="文本框 11">
+              <a:extLst>
+                <a:ext uri="{FF2B5EF4-FFF2-40B4-BE49-F238E27FC236}">
+                  <a16:creationId xmlns:a16="http://schemas.microsoft.com/office/drawing/2014/main" id="{BB6D2045-68E7-4B8E-AD21-FC556102651B}"/>
+                </a:ext>
+              </a:extLst>
+            </p:cNvPr>
+            <p:cNvSpPr txBox="1"/>
+            <p:nvPr/>
+          </p:nvSpPr>
+          <p:spPr>
+            <a:xfrm>
+              <a:off x="2689346" y="1414116"/>
+              <a:ext cx="2431751" cy="561532"/>
+            </a:xfrm>
+            <a:prstGeom prst="rect">
+              <a:avLst/>
+            </a:prstGeom>
+            <a:noFill/>
+          </p:spPr>
+          <p:txBody>
+            <a:bodyPr wrap="square" rtlCol="0">
+              <a:spAutoFit/>
+            </a:bodyPr>
+            <a:lstStyle/>
+            <a:p>
+              <a:r>
+                <a:rPr lang="en-US" altLang="zh-CN" sz="1050" dirty="0">
+                  <a:solidFill>
+                    <a:srgbClr val="FF0000"/>
+                  </a:solidFill>
+                </a:rPr>
+                <a:t>C2</a:t>
+              </a:r>
+              <a:endParaRPr lang="zh-CN" altLang="en-US" sz="1050" dirty="0">
+                <a:solidFill>
+                  <a:srgbClr val="FF0000"/>
+                </a:solidFill>
+              </a:endParaRPr>
+            </a:p>
+          </p:txBody>
+        </p:sp>
+        <p:sp>
+          <p:nvSpPr>
+            <p:cNvPr id="13" name="文本框 12">
+              <a:extLst>
+                <a:ext uri="{FF2B5EF4-FFF2-40B4-BE49-F238E27FC236}">
+                  <a16:creationId xmlns:a16="http://schemas.microsoft.com/office/drawing/2014/main" id="{1BB76494-6058-49C6-B356-DAE4A2FE0DF9}"/>
+                </a:ext>
+              </a:extLst>
+            </p:cNvPr>
+            <p:cNvSpPr txBox="1"/>
+            <p:nvPr/>
+          </p:nvSpPr>
+          <p:spPr>
+            <a:xfrm>
+              <a:off x="5591880" y="1488758"/>
+              <a:ext cx="2185852" cy="561532"/>
+            </a:xfrm>
+            <a:prstGeom prst="rect">
+              <a:avLst/>
+            </a:prstGeom>
+            <a:noFill/>
+          </p:spPr>
+          <p:txBody>
+            <a:bodyPr wrap="square" rtlCol="0">
+              <a:spAutoFit/>
+            </a:bodyPr>
+            <a:lstStyle/>
+            <a:p>
+              <a:r>
+                <a:rPr lang="en-US" altLang="zh-CN" sz="1050" dirty="0">
+                  <a:solidFill>
+                    <a:srgbClr val="FF0000"/>
+                  </a:solidFill>
+                </a:rPr>
+                <a:t>C3</a:t>
+              </a:r>
+              <a:endParaRPr lang="zh-CN" altLang="en-US" sz="1050" dirty="0">
+                <a:solidFill>
+                  <a:srgbClr val="FF0000"/>
+                </a:solidFill>
+              </a:endParaRPr>
+            </a:p>
+          </p:txBody>
+        </p:sp>
+        <p:sp>
+          <p:nvSpPr>
+            <p:cNvPr id="14" name="文本框 13">
+              <a:extLst>
+                <a:ext uri="{FF2B5EF4-FFF2-40B4-BE49-F238E27FC236}">
+                  <a16:creationId xmlns:a16="http://schemas.microsoft.com/office/drawing/2014/main" id="{E59C5294-A50D-43F3-B08E-459FF40806EA}"/>
+                </a:ext>
+              </a:extLst>
+            </p:cNvPr>
+            <p:cNvSpPr txBox="1"/>
+            <p:nvPr/>
+          </p:nvSpPr>
+          <p:spPr>
+            <a:xfrm>
+              <a:off x="6433511" y="3233338"/>
+              <a:ext cx="1943100" cy="561532"/>
+            </a:xfrm>
+            <a:prstGeom prst="rect">
+              <a:avLst/>
+            </a:prstGeom>
+            <a:noFill/>
+          </p:spPr>
+          <p:txBody>
+            <a:bodyPr wrap="square" rtlCol="0">
+              <a:spAutoFit/>
+            </a:bodyPr>
+            <a:lstStyle/>
+            <a:p>
+              <a:r>
+                <a:rPr lang="en-US" altLang="zh-CN" sz="1050" dirty="0">
+                  <a:solidFill>
+                    <a:srgbClr val="FF0000"/>
+                  </a:solidFill>
+                </a:rPr>
+                <a:t>C4</a:t>
+              </a:r>
+              <a:endParaRPr lang="zh-CN" altLang="en-US" sz="1050" dirty="0">
+                <a:solidFill>
+                  <a:srgbClr val="FF0000"/>
+                </a:solidFill>
+              </a:endParaRPr>
+            </a:p>
+          </p:txBody>
+        </p:sp>
+        <p:sp>
+          <p:nvSpPr>
+            <p:cNvPr id="18" name="文本框 17">
+              <a:extLst>
+                <a:ext uri="{FF2B5EF4-FFF2-40B4-BE49-F238E27FC236}">
+                  <a16:creationId xmlns:a16="http://schemas.microsoft.com/office/drawing/2014/main" id="{25E2B448-6696-4A92-AB80-3DFBC1EC09E2}"/>
+                </a:ext>
+              </a:extLst>
+            </p:cNvPr>
+            <p:cNvSpPr txBox="1"/>
+            <p:nvPr/>
+          </p:nvSpPr>
+          <p:spPr>
+            <a:xfrm>
+              <a:off x="1626396" y="2164418"/>
+              <a:ext cx="864319" cy="495469"/>
+            </a:xfrm>
+            <a:prstGeom prst="rect">
+              <a:avLst/>
+            </a:prstGeom>
+            <a:noFill/>
+          </p:spPr>
+          <p:txBody>
+            <a:bodyPr wrap="none" rtlCol="0">
+              <a:spAutoFit/>
+            </a:bodyPr>
+            <a:lstStyle/>
+            <a:p>
+              <a:r>
+                <a:rPr lang="en-US" altLang="zh-CN" sz="900" dirty="0">
+                  <a:solidFill>
+                    <a:srgbClr val="00B0F0"/>
+                  </a:solidFill>
+                </a:rPr>
+                <a:t>3cm</a:t>
+              </a:r>
+              <a:endParaRPr lang="zh-CN" altLang="en-US" sz="900" dirty="0">
+                <a:solidFill>
+                  <a:srgbClr val="00B0F0"/>
+                </a:solidFill>
+              </a:endParaRPr>
+            </a:p>
+          </p:txBody>
+        </p:sp>
+        <p:sp>
+          <p:nvSpPr>
+            <p:cNvPr id="28" name="文本框 27">
+              <a:extLst>
+                <a:ext uri="{FF2B5EF4-FFF2-40B4-BE49-F238E27FC236}">
+                  <a16:creationId xmlns:a16="http://schemas.microsoft.com/office/drawing/2014/main" id="{A0D154BD-937F-4708-9E44-C6FE05DDF224}"/>
+                </a:ext>
+              </a:extLst>
+            </p:cNvPr>
+            <p:cNvSpPr txBox="1"/>
+            <p:nvPr/>
+          </p:nvSpPr>
+          <p:spPr>
+            <a:xfrm>
+              <a:off x="4373067" y="2357300"/>
+              <a:ext cx="740451" cy="495469"/>
+            </a:xfrm>
+            <a:prstGeom prst="rect">
+              <a:avLst/>
+            </a:prstGeom>
+            <a:noFill/>
+          </p:spPr>
+          <p:txBody>
+            <a:bodyPr wrap="none" rtlCol="0">
+              <a:spAutoFit/>
+            </a:bodyPr>
+            <a:lstStyle/>
+            <a:p>
+              <a:r>
+                <a:rPr lang="en-US" altLang="zh-CN" sz="900" dirty="0">
+                  <a:solidFill>
+                    <a:srgbClr val="00B0F0"/>
+                  </a:solidFill>
+                </a:rPr>
+                <a:t>1m</a:t>
+              </a:r>
+              <a:endParaRPr lang="zh-CN" altLang="en-US" sz="900" dirty="0">
+                <a:solidFill>
+                  <a:srgbClr val="00B0F0"/>
+                </a:solidFill>
+              </a:endParaRPr>
+            </a:p>
+          </p:txBody>
+        </p:sp>
+      </p:grpSp>
+      <p:pic>
+        <p:nvPicPr>
+          <p:cNvPr id="31" name="图片 30">
+            <a:extLst>
+              <a:ext uri="{FF2B5EF4-FFF2-40B4-BE49-F238E27FC236}">
+                <a16:creationId xmlns:a16="http://schemas.microsoft.com/office/drawing/2014/main" id="{6EC0BD79-1238-4B2D-B45C-18AAE5842F87}"/>
+              </a:ext>
+            </a:extLst>
+          </p:cNvPr>
+          <p:cNvPicPr>
+            <a:picLocks noChangeAspect="1"/>
+          </p:cNvPicPr>
+          <p:nvPr/>
+        </p:nvPicPr>
+        <p:blipFill>
+          <a:blip r:embed="rId4"/>
+          <a:srcRect/>
+          <a:stretch/>
+        </p:blipFill>
+        <p:spPr>
+          <a:xfrm>
+            <a:off x="-568068" y="2346927"/>
+            <a:ext cx="6480000" cy="1620000"/>
+          </a:xfrm>
+          <a:prstGeom prst="rect">
+            <a:avLst/>
+          </a:prstGeom>
+        </p:spPr>
+      </p:pic>
+      <p:pic>
+        <p:nvPicPr>
+          <p:cNvPr id="33" name="图片 32">
+            <a:extLst>
+              <a:ext uri="{FF2B5EF4-FFF2-40B4-BE49-F238E27FC236}">
+                <a16:creationId xmlns:a16="http://schemas.microsoft.com/office/drawing/2014/main" id="{C84BDE3E-0A96-4D2B-8509-A98AB788CA5F}"/>
+              </a:ext>
+            </a:extLst>
+          </p:cNvPr>
+          <p:cNvPicPr>
+            <a:picLocks noChangeAspect="1"/>
+          </p:cNvPicPr>
+          <p:nvPr/>
+        </p:nvPicPr>
+        <p:blipFill>
+          <a:blip r:embed="rId5"/>
+          <a:srcRect/>
+          <a:stretch/>
+        </p:blipFill>
+        <p:spPr>
+          <a:xfrm>
+            <a:off x="-568070" y="3810000"/>
+            <a:ext cx="6480000" cy="1619999"/>
+          </a:xfrm>
+          <a:prstGeom prst="rect">
+            <a:avLst/>
+          </a:prstGeom>
+        </p:spPr>
+      </p:pic>
+      <p:pic>
+        <p:nvPicPr>
+          <p:cNvPr id="35" name="图片 34">
+            <a:extLst>
+              <a:ext uri="{FF2B5EF4-FFF2-40B4-BE49-F238E27FC236}">
+                <a16:creationId xmlns:a16="http://schemas.microsoft.com/office/drawing/2014/main" id="{ED81AFAD-9C3C-4818-BC14-2F919C053A70}"/>
+              </a:ext>
+            </a:extLst>
+          </p:cNvPr>
+          <p:cNvPicPr>
+            <a:picLocks noChangeAspect="1"/>
+          </p:cNvPicPr>
+          <p:nvPr/>
+        </p:nvPicPr>
+        <p:blipFill>
+          <a:blip r:embed="rId6"/>
+          <a:srcRect/>
+          <a:stretch/>
+        </p:blipFill>
+        <p:spPr>
+          <a:xfrm>
+            <a:off x="-568073" y="5257800"/>
+            <a:ext cx="6480000" cy="1620000"/>
+          </a:xfrm>
+          <a:prstGeom prst="rect">
+            <a:avLst/>
+          </a:prstGeom>
+        </p:spPr>
+      </p:pic>
+      <p:graphicFrame>
+        <p:nvGraphicFramePr>
+          <p:cNvPr id="38" name="表格 38">
+            <a:extLst>
+              <a:ext uri="{FF2B5EF4-FFF2-40B4-BE49-F238E27FC236}">
+                <a16:creationId xmlns:a16="http://schemas.microsoft.com/office/drawing/2014/main" id="{0BD303DD-13EA-422E-A934-AEB940D2AA9B}"/>
+              </a:ext>
+            </a:extLst>
+          </p:cNvPr>
+          <p:cNvGraphicFramePr>
+            <a:graphicFrameLocks noGrp="1"/>
+          </p:cNvGraphicFramePr>
+          <p:nvPr/>
+        </p:nvGraphicFramePr>
+        <p:xfrm>
+          <a:off x="5463541" y="1354442"/>
+          <a:ext cx="3444402" cy="1097280"/>
+        </p:xfrm>
+        <a:graphic>
+          <a:graphicData uri="http://schemas.openxmlformats.org/drawingml/2006/table">
+            <a:tbl>
+              <a:tblPr firstRow="1" bandRow="1">
+                <a:tableStyleId>{5C22544A-7EE6-4342-B048-85BDC9FD1C3A}</a:tableStyleId>
+              </a:tblPr>
+              <a:tblGrid>
+                <a:gridCol w="1219200">
+                  <a:extLst>
+                    <a:ext uri="{9D8B030D-6E8A-4147-A177-3AD203B41FA5}">
+                      <a16:colId xmlns:a16="http://schemas.microsoft.com/office/drawing/2014/main" val="475487312"/>
+                    </a:ext>
+                  </a:extLst>
+                </a:gridCol>
+                <a:gridCol w="558555">
+                  <a:extLst>
+                    <a:ext uri="{9D8B030D-6E8A-4147-A177-3AD203B41FA5}">
+                      <a16:colId xmlns:a16="http://schemas.microsoft.com/office/drawing/2014/main" val="1860789350"/>
+                    </a:ext>
+                  </a:extLst>
+                </a:gridCol>
+                <a:gridCol w="555549">
+                  <a:extLst>
+                    <a:ext uri="{9D8B030D-6E8A-4147-A177-3AD203B41FA5}">
+                      <a16:colId xmlns:a16="http://schemas.microsoft.com/office/drawing/2014/main" val="3030780357"/>
+                    </a:ext>
+                  </a:extLst>
+                </a:gridCol>
+                <a:gridCol w="555549">
+                  <a:extLst>
+                    <a:ext uri="{9D8B030D-6E8A-4147-A177-3AD203B41FA5}">
+                      <a16:colId xmlns:a16="http://schemas.microsoft.com/office/drawing/2014/main" val="164721499"/>
+                    </a:ext>
+                  </a:extLst>
+                </a:gridCol>
+                <a:gridCol w="555549">
+                  <a:extLst>
+                    <a:ext uri="{9D8B030D-6E8A-4147-A177-3AD203B41FA5}">
+                      <a16:colId xmlns:a16="http://schemas.microsoft.com/office/drawing/2014/main" val="3298584427"/>
+                    </a:ext>
+                  </a:extLst>
+                </a:gridCol>
+              </a:tblGrid>
+              <a:tr h="244320">
+                <a:tc>
+                  <a:txBody>
+                    <a:bodyPr/>
+                    <a:lstStyle/>
+                    <a:p>
+                      <a:r>
+                        <a:rPr lang="en-US" altLang="zh-CN" sz="1200" dirty="0" err="1"/>
+                        <a:t>miscut</a:t>
+                      </a:r>
+                      <a:endParaRPr lang="zh-CN" altLang="en-US" sz="1200" dirty="0"/>
+                    </a:p>
+                  </a:txBody>
+                  <a:tcPr/>
+                </a:tc>
+                <a:tc>
+                  <a:txBody>
+                    <a:bodyPr/>
+                    <a:lstStyle/>
+                    <a:p>
+                      <a:r>
+                        <a:rPr lang="en-US" altLang="zh-CN" sz="1200" dirty="0"/>
+                        <a:t>C1</a:t>
+                      </a:r>
+                      <a:endParaRPr lang="zh-CN" altLang="en-US" sz="1200" dirty="0"/>
+                    </a:p>
+                  </a:txBody>
+                  <a:tcPr/>
+                </a:tc>
+                <a:tc>
+                  <a:txBody>
+                    <a:bodyPr/>
+                    <a:lstStyle/>
+                    <a:p>
+                      <a:r>
+                        <a:rPr lang="en-US" altLang="zh-CN" sz="1200" dirty="0"/>
+                        <a:t>C2</a:t>
+                      </a:r>
+                      <a:endParaRPr lang="zh-CN" altLang="en-US" sz="1200" dirty="0"/>
+                    </a:p>
+                  </a:txBody>
+                  <a:tcPr/>
+                </a:tc>
+                <a:tc>
+                  <a:txBody>
+                    <a:bodyPr/>
+                    <a:lstStyle/>
+                    <a:p>
+                      <a:r>
+                        <a:rPr lang="en-US" altLang="zh-CN" sz="1200" dirty="0"/>
+                        <a:t>C3</a:t>
+                      </a:r>
+                      <a:endParaRPr lang="zh-CN" altLang="en-US" sz="1200" dirty="0"/>
+                    </a:p>
+                  </a:txBody>
+                  <a:tcPr/>
+                </a:tc>
+                <a:tc>
+                  <a:txBody>
+                    <a:bodyPr/>
+                    <a:lstStyle/>
+                    <a:p>
+                      <a:r>
+                        <a:rPr lang="en-US" altLang="zh-CN" sz="1200" dirty="0"/>
+                        <a:t>C4</a:t>
+                      </a:r>
+                      <a:endParaRPr lang="zh-CN" altLang="en-US" sz="1200" dirty="0"/>
+                    </a:p>
+                  </a:txBody>
+                  <a:tcPr/>
+                </a:tc>
+                <a:extLst>
+                  <a:ext uri="{0D108BD9-81ED-4DB2-BD59-A6C34878D82A}">
+                    <a16:rowId xmlns:a16="http://schemas.microsoft.com/office/drawing/2014/main" val="1096912839"/>
+                  </a:ext>
+                </a:extLst>
+              </a:tr>
+              <a:tr h="244320">
+                <a:tc>
+                  <a:txBody>
+                    <a:bodyPr/>
+                    <a:lstStyle/>
+                    <a:p>
+                      <a:r>
+                        <a:rPr lang="en-US" altLang="zh-CN" sz="1200" dirty="0"/>
+                        <a:t>Top</a:t>
+                      </a:r>
+                      <a:endParaRPr lang="zh-CN" altLang="en-US" sz="1200" dirty="0"/>
+                    </a:p>
+                  </a:txBody>
+                  <a:tcPr/>
+                </a:tc>
+                <a:tc>
+                  <a:txBody>
+                    <a:bodyPr/>
+                    <a:lstStyle/>
+                    <a:p>
+                      <a:r>
+                        <a:rPr lang="en-US" altLang="zh-CN" sz="1200" dirty="0"/>
+                        <a:t>0°</a:t>
+                      </a:r>
+                      <a:endParaRPr lang="zh-CN" altLang="en-US" sz="1200" dirty="0"/>
+                    </a:p>
+                  </a:txBody>
+                  <a:tcPr/>
+                </a:tc>
+                <a:tc>
+                  <a:txBody>
+                    <a:bodyPr/>
+                    <a:lstStyle/>
+                    <a:p>
+                      <a:pPr marL="0" marR="0" lvl="0" indent="0" algn="l" defTabSz="914400" rtl="0" eaLnBrk="1" fontAlgn="auto" latinLnBrk="0" hangingPunct="1">
+                        <a:lnSpc>
+                          <a:spcPct val="100000"/>
+                        </a:lnSpc>
+                        <a:spcBef>
+                          <a:spcPts val="0"/>
+                        </a:spcBef>
+                        <a:spcAft>
+                          <a:spcPts val="0"/>
+                        </a:spcAft>
+                        <a:buClrTx/>
+                        <a:buSzTx/>
+                        <a:buFontTx/>
+                        <a:buNone/>
+                        <a:tabLst/>
+                        <a:defRPr/>
+                      </a:pPr>
+                      <a:r>
+                        <a:rPr lang="en-US" altLang="zh-CN" sz="1200" dirty="0"/>
+                        <a:t>-0°</a:t>
+                      </a:r>
+                      <a:endParaRPr lang="zh-CN" altLang="en-US" sz="1200" dirty="0"/>
+                    </a:p>
+                  </a:txBody>
+                  <a:tcPr/>
+                </a:tc>
+                <a:tc>
+                  <a:txBody>
+                    <a:bodyPr/>
+                    <a:lstStyle/>
+                    <a:p>
+                      <a:r>
+                        <a:rPr lang="en-US" altLang="zh-CN" sz="1200" dirty="0"/>
+                        <a:t>0°</a:t>
+                      </a:r>
+                      <a:endParaRPr lang="zh-CN" altLang="en-US" sz="1200" dirty="0"/>
+                    </a:p>
+                  </a:txBody>
+                  <a:tcPr/>
+                </a:tc>
+                <a:tc>
+                  <a:txBody>
+                    <a:bodyPr/>
+                    <a:lstStyle/>
+                    <a:p>
+                      <a:r>
+                        <a:rPr lang="en-US" altLang="zh-CN" sz="1200" dirty="0"/>
+                        <a:t>0°</a:t>
+                      </a:r>
+                      <a:endParaRPr lang="zh-CN" altLang="en-US" sz="1200" dirty="0"/>
+                    </a:p>
+                  </a:txBody>
+                  <a:tcPr/>
+                </a:tc>
+                <a:extLst>
+                  <a:ext uri="{0D108BD9-81ED-4DB2-BD59-A6C34878D82A}">
+                    <a16:rowId xmlns:a16="http://schemas.microsoft.com/office/drawing/2014/main" val="1270521984"/>
+                  </a:ext>
+                </a:extLst>
+              </a:tr>
+              <a:tr h="244320">
+                <a:tc>
+                  <a:txBody>
+                    <a:bodyPr/>
+                    <a:lstStyle/>
+                    <a:p>
+                      <a:r>
+                        <a:rPr lang="en-US" altLang="zh-CN" sz="1200" dirty="0"/>
+                        <a:t>Mid</a:t>
+                      </a:r>
+                      <a:endParaRPr lang="zh-CN" altLang="en-US" sz="1200" dirty="0"/>
+                    </a:p>
+                  </a:txBody>
+                  <a:tcPr/>
+                </a:tc>
+                <a:tc>
+                  <a:txBody>
+                    <a:bodyPr/>
+                    <a:lstStyle/>
+                    <a:p>
+                      <a:pPr marL="0" marR="0" lvl="0" indent="0" algn="l" defTabSz="914400" rtl="0" eaLnBrk="1" fontAlgn="auto" latinLnBrk="0" hangingPunct="1">
+                        <a:lnSpc>
+                          <a:spcPct val="100000"/>
+                        </a:lnSpc>
+                        <a:spcBef>
+                          <a:spcPts val="0"/>
+                        </a:spcBef>
+                        <a:spcAft>
+                          <a:spcPts val="0"/>
+                        </a:spcAft>
+                        <a:buClrTx/>
+                        <a:buSzTx/>
+                        <a:buFontTx/>
+                        <a:buNone/>
+                        <a:tabLst/>
+                        <a:defRPr/>
+                      </a:pPr>
+                      <a:r>
+                        <a:rPr lang="en-US" altLang="zh-CN" sz="1200" dirty="0"/>
+                        <a:t>0°</a:t>
+                      </a:r>
+                      <a:endParaRPr lang="zh-CN" altLang="en-US" sz="1200" dirty="0"/>
+                    </a:p>
+                  </a:txBody>
+                  <a:tcPr/>
+                </a:tc>
+                <a:tc>
+                  <a:txBody>
+                    <a:bodyPr/>
+                    <a:lstStyle/>
+                    <a:p>
+                      <a:r>
+                        <a:rPr lang="en-US" altLang="zh-CN" sz="1200" dirty="0"/>
+                        <a:t>-3°</a:t>
+                      </a:r>
+                      <a:endParaRPr lang="zh-CN" altLang="en-US" sz="1200" dirty="0"/>
+                    </a:p>
+                  </a:txBody>
+                  <a:tcPr/>
+                </a:tc>
+                <a:tc>
+                  <a:txBody>
+                    <a:bodyPr/>
+                    <a:lstStyle/>
+                    <a:p>
+                      <a:r>
+                        <a:rPr lang="en-US" altLang="zh-CN" sz="1200" dirty="0"/>
+                        <a:t>0°</a:t>
+                      </a:r>
+                      <a:endParaRPr lang="zh-CN" altLang="en-US" sz="1200" dirty="0"/>
+                    </a:p>
+                  </a:txBody>
+                  <a:tcPr/>
+                </a:tc>
+                <a:tc>
+                  <a:txBody>
+                    <a:bodyPr/>
+                    <a:lstStyle/>
+                    <a:p>
+                      <a:r>
+                        <a:rPr lang="en-US" altLang="zh-CN" sz="1200" dirty="0"/>
+                        <a:t>3°</a:t>
+                      </a:r>
+                      <a:endParaRPr lang="zh-CN" altLang="en-US" sz="1200" dirty="0"/>
+                    </a:p>
+                  </a:txBody>
+                  <a:tcPr/>
+                </a:tc>
+                <a:extLst>
+                  <a:ext uri="{0D108BD9-81ED-4DB2-BD59-A6C34878D82A}">
+                    <a16:rowId xmlns:a16="http://schemas.microsoft.com/office/drawing/2014/main" val="3251823014"/>
+                  </a:ext>
+                </a:extLst>
+              </a:tr>
+              <a:tr h="244320">
+                <a:tc>
+                  <a:txBody>
+                    <a:bodyPr/>
+                    <a:lstStyle/>
+                    <a:p>
+                      <a:r>
+                        <a:rPr lang="en-US" altLang="zh-CN" sz="1200" dirty="0"/>
+                        <a:t>Bottom</a:t>
+                      </a:r>
+                      <a:endParaRPr lang="zh-CN" altLang="en-US" sz="1200" dirty="0"/>
+                    </a:p>
+                  </a:txBody>
+                  <a:tcPr/>
+                </a:tc>
+                <a:tc>
+                  <a:txBody>
+                    <a:bodyPr/>
+                    <a:lstStyle/>
+                    <a:p>
+                      <a:pPr marL="0" marR="0" lvl="0" indent="0" algn="l" defTabSz="914400" rtl="0" eaLnBrk="1" fontAlgn="auto" latinLnBrk="0" hangingPunct="1">
+                        <a:lnSpc>
+                          <a:spcPct val="100000"/>
+                        </a:lnSpc>
+                        <a:spcBef>
+                          <a:spcPts val="0"/>
+                        </a:spcBef>
+                        <a:spcAft>
+                          <a:spcPts val="0"/>
+                        </a:spcAft>
+                        <a:buClrTx/>
+                        <a:buSzTx/>
+                        <a:buFontTx/>
+                        <a:buNone/>
+                        <a:tabLst/>
+                        <a:defRPr/>
+                      </a:pPr>
+                      <a:r>
+                        <a:rPr lang="en-US" altLang="zh-CN" sz="1200" dirty="0"/>
+                        <a:t>0°</a:t>
+                      </a:r>
+                      <a:endParaRPr lang="zh-CN" altLang="en-US" sz="1200" dirty="0"/>
+                    </a:p>
+                  </a:txBody>
+                  <a:tcPr/>
+                </a:tc>
+                <a:tc>
+                  <a:txBody>
+                    <a:bodyPr/>
+                    <a:lstStyle/>
+                    <a:p>
+                      <a:r>
+                        <a:rPr lang="en-US" altLang="zh-CN" sz="1200" dirty="0"/>
+                        <a:t>-5°</a:t>
+                      </a:r>
+                      <a:endParaRPr lang="zh-CN" altLang="en-US" sz="1200" dirty="0"/>
+                    </a:p>
+                  </a:txBody>
+                  <a:tcPr/>
+                </a:tc>
+                <a:tc>
+                  <a:txBody>
+                    <a:bodyPr/>
+                    <a:lstStyle/>
+                    <a:p>
+                      <a:r>
+                        <a:rPr lang="en-US" altLang="zh-CN" sz="1200" dirty="0"/>
+                        <a:t>0°</a:t>
+                      </a:r>
+                      <a:endParaRPr lang="zh-CN" altLang="en-US" sz="1200" dirty="0"/>
+                    </a:p>
+                  </a:txBody>
+                  <a:tcPr/>
+                </a:tc>
+                <a:tc>
+                  <a:txBody>
+                    <a:bodyPr/>
+                    <a:lstStyle/>
+                    <a:p>
+                      <a:r>
+                        <a:rPr lang="en-US" altLang="zh-CN" sz="1200" dirty="0"/>
+                        <a:t>5°</a:t>
+                      </a:r>
+                      <a:endParaRPr lang="zh-CN" altLang="en-US" sz="1200" dirty="0"/>
+                    </a:p>
+                  </a:txBody>
+                  <a:tcPr/>
+                </a:tc>
+                <a:extLst>
+                  <a:ext uri="{0D108BD9-81ED-4DB2-BD59-A6C34878D82A}">
+                    <a16:rowId xmlns:a16="http://schemas.microsoft.com/office/drawing/2014/main" val="1205042433"/>
+                  </a:ext>
+                </a:extLst>
+              </a:tr>
+            </a:tbl>
+          </a:graphicData>
+        </a:graphic>
+      </p:graphicFrame>
+      <p:sp>
+        <p:nvSpPr>
+          <p:cNvPr id="41" name="Content Placeholder 29">
+            <a:extLst>
+              <a:ext uri="{FF2B5EF4-FFF2-40B4-BE49-F238E27FC236}">
+                <a16:creationId xmlns:a16="http://schemas.microsoft.com/office/drawing/2014/main" id="{A1C3DA51-7446-48FF-91CF-7C713002AE12}"/>
+              </a:ext>
+            </a:extLst>
+          </p:cNvPr>
+          <p:cNvSpPr>
+            <a:spLocks noGrp="1"/>
+          </p:cNvSpPr>
+          <p:nvPr>
+            <p:ph sz="quarter" idx="14"/>
+          </p:nvPr>
+        </p:nvSpPr>
+        <p:spPr>
+          <a:xfrm>
+            <a:off x="5410200" y="2627108"/>
+            <a:ext cx="3581400" cy="3681998"/>
+          </a:xfrm>
+        </p:spPr>
+        <p:txBody>
+          <a:bodyPr>
+            <a:normAutofit/>
+          </a:bodyPr>
+          <a:lstStyle/>
+          <a:p>
+            <a:pPr marL="233362" lvl="1" indent="0">
+              <a:buNone/>
+            </a:pPr>
+            <a:r>
+              <a:rPr lang="en-US" sz="1400" dirty="0"/>
+              <a:t>Parameters:</a:t>
+            </a:r>
+          </a:p>
+          <a:p>
+            <a:pPr lvl="1"/>
+            <a:r>
+              <a:rPr lang="en-US" sz="1400" dirty="0"/>
+              <a:t>Incident beam: 10keV, 50um (full width), 1fs</a:t>
+            </a:r>
+          </a:p>
+          <a:p>
+            <a:pPr lvl="1"/>
+            <a:r>
+              <a:rPr lang="en-US" sz="1400" dirty="0"/>
+              <a:t>Sampling range: 1.8mm, 1000fs</a:t>
+            </a:r>
+          </a:p>
+          <a:p>
+            <a:pPr marL="233362" lvl="1" indent="0">
+              <a:buNone/>
+            </a:pPr>
+            <a:r>
+              <a:rPr lang="en-US" sz="1400" dirty="0"/>
+              <a:t>Issues:</a:t>
+            </a:r>
+          </a:p>
+          <a:p>
+            <a:pPr lvl="1"/>
+            <a:r>
+              <a:rPr lang="en-US" sz="1400" dirty="0"/>
+              <a:t>Looks alright now</a:t>
+            </a:r>
+          </a:p>
+          <a:p>
+            <a:pPr lvl="1"/>
+            <a:endParaRPr lang="en-US" sz="1400" dirty="0"/>
+          </a:p>
+        </p:txBody>
+      </p:sp>
+    </p:spTree>
+    <p:extLst>
+      <p:ext uri="{BB962C8B-B14F-4D97-AF65-F5344CB8AC3E}">
+        <p14:creationId xmlns:p14="http://schemas.microsoft.com/office/powerpoint/2010/main" val="1063425737"/>
+      </p:ext>
+    </p:extLst>
+  </p:cSld>
+  <p:clrMapOvr>
+    <a:masterClrMapping/>
+  </p:clrMapOvr>
+</p:sld>
+</file>
+
 <file path=ppt/slides/slide2.xml><?xml version="1.0" encoding="utf-8"?>
 <p:sld xmlns:a="http://schemas.openxmlformats.org/drawingml/2006/main" xmlns:r="http://schemas.openxmlformats.org/officeDocument/2006/relationships" xmlns:p="http://schemas.openxmlformats.org/presentationml/2006/main">
   <p:cSld>
@@ -11932,6 +11712,13 @@
             </a:r>
           </a:p>
           <a:p>
+            <a:pPr lvl="2"/>
+            <a:r>
+              <a:rPr lang="en-US" dirty="0"/>
+              <a:t>Overall performance</a:t>
+            </a:r>
+          </a:p>
+          <a:p>
             <a:pPr lvl="1"/>
             <a:r>
               <a:rPr lang="en-US" dirty="0"/>
@@ -11949,6 +11736,916 @@
     <p:extLst>
       <p:ext uri="{BB962C8B-B14F-4D97-AF65-F5344CB8AC3E}">
         <p14:creationId xmlns:p14="http://schemas.microsoft.com/office/powerpoint/2010/main" val="3309940375"/>
+      </p:ext>
+    </p:extLst>
+  </p:cSld>
+  <p:clrMapOvr>
+    <a:masterClrMapping/>
+  </p:clrMapOvr>
+</p:sld>
+</file>
+
+<file path=ppt/slides/slide20.xml><?xml version="1.0" encoding="utf-8"?>
+<p:sld xmlns:a="http://schemas.openxmlformats.org/drawingml/2006/main" xmlns:r="http://schemas.openxmlformats.org/officeDocument/2006/relationships" xmlns:p="http://schemas.openxmlformats.org/presentationml/2006/main" show="0">
+  <p:cSld>
+    <p:spTree>
+      <p:nvGrpSpPr>
+        <p:cNvPr id="1" name=""/>
+        <p:cNvGrpSpPr/>
+        <p:nvPr/>
+      </p:nvGrpSpPr>
+      <p:grpSpPr>
+        <a:xfrm>
+          <a:off x="0" y="0"/>
+          <a:ext cx="0" cy="0"/>
+          <a:chOff x="0" y="0"/>
+          <a:chExt cx="0" cy="0"/>
+        </a:xfrm>
+      </p:grpSpPr>
+      <p:sp>
+        <p:nvSpPr>
+          <p:cNvPr id="7" name="Slide Number Placeholder 6"/>
+          <p:cNvSpPr>
+            <a:spLocks noGrp="1"/>
+          </p:cNvSpPr>
+          <p:nvPr>
+            <p:ph type="sldNum" sz="quarter" idx="11"/>
+          </p:nvPr>
+        </p:nvSpPr>
+        <p:spPr/>
+        <p:txBody>
+          <a:bodyPr/>
+          <a:lstStyle/>
+          <a:p>
+            <a:fld id="{5BD36294-2849-48A8-8531-5354CF3095D2}" type="slidenum">
+              <a:rPr lang="en-US" smtClean="0"/>
+              <a:pPr/>
+              <a:t>20</a:t>
+            </a:fld>
+            <a:endParaRPr lang="en-US" dirty="0"/>
+          </a:p>
+        </p:txBody>
+      </p:sp>
+      <p:sp>
+        <p:nvSpPr>
+          <p:cNvPr id="29" name="Title 28"/>
+          <p:cNvSpPr>
+            <a:spLocks noGrp="1"/>
+          </p:cNvSpPr>
+          <p:nvPr>
+            <p:ph type="title"/>
+          </p:nvPr>
+        </p:nvSpPr>
+        <p:spPr/>
+        <p:txBody>
+          <a:bodyPr/>
+          <a:lstStyle/>
+          <a:p>
+            <a:r>
+              <a:rPr lang="en-US" altLang="zh-CN" dirty="0"/>
+              <a:t>Crystal only, changing pulse duration, Si 220</a:t>
+            </a:r>
+            <a:endParaRPr lang="en-CA" dirty="0"/>
+          </a:p>
+        </p:txBody>
+      </p:sp>
+      <p:grpSp>
+        <p:nvGrpSpPr>
+          <p:cNvPr id="26" name="组合 25">
+            <a:extLst>
+              <a:ext uri="{FF2B5EF4-FFF2-40B4-BE49-F238E27FC236}">
+                <a16:creationId xmlns:a16="http://schemas.microsoft.com/office/drawing/2014/main" id="{118EE74E-010B-4071-B451-D4A78193064D}"/>
+              </a:ext>
+            </a:extLst>
+          </p:cNvPr>
+          <p:cNvGrpSpPr/>
+          <p:nvPr/>
+        </p:nvGrpSpPr>
+        <p:grpSpPr>
+          <a:xfrm>
+            <a:off x="1" y="1232834"/>
+            <a:ext cx="4260062" cy="1142938"/>
+            <a:chOff x="0" y="1414116"/>
+            <a:chExt cx="9144000" cy="2453257"/>
+          </a:xfrm>
+        </p:grpSpPr>
+        <p:pic>
+          <p:nvPicPr>
+            <p:cNvPr id="8" name="图片 7" descr="图片包含 游戏机, 吉他, 画&#10;&#10;描述已自动生成">
+              <a:extLst>
+                <a:ext uri="{FF2B5EF4-FFF2-40B4-BE49-F238E27FC236}">
+                  <a16:creationId xmlns:a16="http://schemas.microsoft.com/office/drawing/2014/main" id="{E8A749AF-7CE3-488A-A441-B01382BFFCC0}"/>
+                </a:ext>
+              </a:extLst>
+            </p:cNvPr>
+            <p:cNvPicPr>
+              <a:picLocks noChangeAspect="1"/>
+            </p:cNvPicPr>
+            <p:nvPr/>
+          </p:nvPicPr>
+          <p:blipFill>
+            <a:blip r:embed="rId3"/>
+            <a:stretch>
+              <a:fillRect/>
+            </a:stretch>
+          </p:blipFill>
+          <p:spPr>
+            <a:xfrm>
+              <a:off x="0" y="1769524"/>
+              <a:ext cx="9144000" cy="1659476"/>
+            </a:xfrm>
+            <a:prstGeom prst="rect">
+              <a:avLst/>
+            </a:prstGeom>
+          </p:spPr>
+        </p:pic>
+        <p:sp>
+          <p:nvSpPr>
+            <p:cNvPr id="11" name="文本框 10">
+              <a:extLst>
+                <a:ext uri="{FF2B5EF4-FFF2-40B4-BE49-F238E27FC236}">
+                  <a16:creationId xmlns:a16="http://schemas.microsoft.com/office/drawing/2014/main" id="{2EC05EBB-E2AC-4CC3-A6D2-2CCBB84162D6}"/>
+                </a:ext>
+              </a:extLst>
+            </p:cNvPr>
+            <p:cNvSpPr txBox="1"/>
+            <p:nvPr/>
+          </p:nvSpPr>
+          <p:spPr>
+            <a:xfrm>
+              <a:off x="1035234" y="3305841"/>
+              <a:ext cx="2960728" cy="561532"/>
+            </a:xfrm>
+            <a:prstGeom prst="rect">
+              <a:avLst/>
+            </a:prstGeom>
+            <a:noFill/>
+          </p:spPr>
+          <p:txBody>
+            <a:bodyPr wrap="square" rtlCol="0">
+              <a:spAutoFit/>
+            </a:bodyPr>
+            <a:lstStyle/>
+            <a:p>
+              <a:r>
+                <a:rPr lang="en-US" altLang="zh-CN" sz="1050" dirty="0">
+                  <a:solidFill>
+                    <a:srgbClr val="FF0000"/>
+                  </a:solidFill>
+                </a:rPr>
+                <a:t>C1, z = 200m</a:t>
+              </a:r>
+              <a:endParaRPr lang="zh-CN" altLang="en-US" sz="1050" dirty="0">
+                <a:solidFill>
+                  <a:srgbClr val="FF0000"/>
+                </a:solidFill>
+              </a:endParaRPr>
+            </a:p>
+          </p:txBody>
+        </p:sp>
+        <p:sp>
+          <p:nvSpPr>
+            <p:cNvPr id="12" name="文本框 11">
+              <a:extLst>
+                <a:ext uri="{FF2B5EF4-FFF2-40B4-BE49-F238E27FC236}">
+                  <a16:creationId xmlns:a16="http://schemas.microsoft.com/office/drawing/2014/main" id="{BB6D2045-68E7-4B8E-AD21-FC556102651B}"/>
+                </a:ext>
+              </a:extLst>
+            </p:cNvPr>
+            <p:cNvSpPr txBox="1"/>
+            <p:nvPr/>
+          </p:nvSpPr>
+          <p:spPr>
+            <a:xfrm>
+              <a:off x="2689346" y="1414116"/>
+              <a:ext cx="2431751" cy="561532"/>
+            </a:xfrm>
+            <a:prstGeom prst="rect">
+              <a:avLst/>
+            </a:prstGeom>
+            <a:noFill/>
+          </p:spPr>
+          <p:txBody>
+            <a:bodyPr wrap="square" rtlCol="0">
+              <a:spAutoFit/>
+            </a:bodyPr>
+            <a:lstStyle/>
+            <a:p>
+              <a:r>
+                <a:rPr lang="en-US" altLang="zh-CN" sz="1050" dirty="0">
+                  <a:solidFill>
+                    <a:srgbClr val="FF0000"/>
+                  </a:solidFill>
+                </a:rPr>
+                <a:t>C2, -5 deg</a:t>
+              </a:r>
+              <a:endParaRPr lang="zh-CN" altLang="en-US" sz="1050" dirty="0">
+                <a:solidFill>
+                  <a:srgbClr val="FF0000"/>
+                </a:solidFill>
+              </a:endParaRPr>
+            </a:p>
+          </p:txBody>
+        </p:sp>
+        <p:sp>
+          <p:nvSpPr>
+            <p:cNvPr id="13" name="文本框 12">
+              <a:extLst>
+                <a:ext uri="{FF2B5EF4-FFF2-40B4-BE49-F238E27FC236}">
+                  <a16:creationId xmlns:a16="http://schemas.microsoft.com/office/drawing/2014/main" id="{1BB76494-6058-49C6-B356-DAE4A2FE0DF9}"/>
+                </a:ext>
+              </a:extLst>
+            </p:cNvPr>
+            <p:cNvSpPr txBox="1"/>
+            <p:nvPr/>
+          </p:nvSpPr>
+          <p:spPr>
+            <a:xfrm>
+              <a:off x="5591880" y="1488758"/>
+              <a:ext cx="2185852" cy="561532"/>
+            </a:xfrm>
+            <a:prstGeom prst="rect">
+              <a:avLst/>
+            </a:prstGeom>
+            <a:noFill/>
+          </p:spPr>
+          <p:txBody>
+            <a:bodyPr wrap="square" rtlCol="0">
+              <a:spAutoFit/>
+            </a:bodyPr>
+            <a:lstStyle/>
+            <a:p>
+              <a:r>
+                <a:rPr lang="en-US" altLang="zh-CN" sz="1050" dirty="0">
+                  <a:solidFill>
+                    <a:srgbClr val="FF0000"/>
+                  </a:solidFill>
+                </a:rPr>
+                <a:t>C3</a:t>
+              </a:r>
+              <a:endParaRPr lang="zh-CN" altLang="en-US" sz="1050" dirty="0">
+                <a:solidFill>
+                  <a:srgbClr val="FF0000"/>
+                </a:solidFill>
+              </a:endParaRPr>
+            </a:p>
+          </p:txBody>
+        </p:sp>
+        <p:sp>
+          <p:nvSpPr>
+            <p:cNvPr id="14" name="文本框 13">
+              <a:extLst>
+                <a:ext uri="{FF2B5EF4-FFF2-40B4-BE49-F238E27FC236}">
+                  <a16:creationId xmlns:a16="http://schemas.microsoft.com/office/drawing/2014/main" id="{E59C5294-A50D-43F3-B08E-459FF40806EA}"/>
+                </a:ext>
+              </a:extLst>
+            </p:cNvPr>
+            <p:cNvSpPr txBox="1"/>
+            <p:nvPr/>
+          </p:nvSpPr>
+          <p:spPr>
+            <a:xfrm>
+              <a:off x="6433511" y="3233338"/>
+              <a:ext cx="1943100" cy="561532"/>
+            </a:xfrm>
+            <a:prstGeom prst="rect">
+              <a:avLst/>
+            </a:prstGeom>
+            <a:noFill/>
+          </p:spPr>
+          <p:txBody>
+            <a:bodyPr wrap="square" rtlCol="0">
+              <a:spAutoFit/>
+            </a:bodyPr>
+            <a:lstStyle/>
+            <a:p>
+              <a:r>
+                <a:rPr lang="en-US" altLang="zh-CN" sz="1050" dirty="0">
+                  <a:solidFill>
+                    <a:srgbClr val="FF0000"/>
+                  </a:solidFill>
+                </a:rPr>
+                <a:t>C4, 5 deg</a:t>
+              </a:r>
+              <a:endParaRPr lang="zh-CN" altLang="en-US" sz="1050" dirty="0">
+                <a:solidFill>
+                  <a:srgbClr val="FF0000"/>
+                </a:solidFill>
+              </a:endParaRPr>
+            </a:p>
+          </p:txBody>
+        </p:sp>
+        <p:sp>
+          <p:nvSpPr>
+            <p:cNvPr id="18" name="文本框 17">
+              <a:extLst>
+                <a:ext uri="{FF2B5EF4-FFF2-40B4-BE49-F238E27FC236}">
+                  <a16:creationId xmlns:a16="http://schemas.microsoft.com/office/drawing/2014/main" id="{25E2B448-6696-4A92-AB80-3DFBC1EC09E2}"/>
+                </a:ext>
+              </a:extLst>
+            </p:cNvPr>
+            <p:cNvSpPr txBox="1"/>
+            <p:nvPr/>
+          </p:nvSpPr>
+          <p:spPr>
+            <a:xfrm>
+              <a:off x="1626396" y="2164418"/>
+              <a:ext cx="864319" cy="495469"/>
+            </a:xfrm>
+            <a:prstGeom prst="rect">
+              <a:avLst/>
+            </a:prstGeom>
+            <a:noFill/>
+          </p:spPr>
+          <p:txBody>
+            <a:bodyPr wrap="none" rtlCol="0">
+              <a:spAutoFit/>
+            </a:bodyPr>
+            <a:lstStyle/>
+            <a:p>
+              <a:r>
+                <a:rPr lang="en-US" altLang="zh-CN" sz="900" dirty="0">
+                  <a:solidFill>
+                    <a:srgbClr val="00B0F0"/>
+                  </a:solidFill>
+                </a:rPr>
+                <a:t>3cm</a:t>
+              </a:r>
+              <a:endParaRPr lang="zh-CN" altLang="en-US" sz="900" dirty="0">
+                <a:solidFill>
+                  <a:srgbClr val="00B0F0"/>
+                </a:solidFill>
+              </a:endParaRPr>
+            </a:p>
+          </p:txBody>
+        </p:sp>
+        <p:sp>
+          <p:nvSpPr>
+            <p:cNvPr id="28" name="文本框 27">
+              <a:extLst>
+                <a:ext uri="{FF2B5EF4-FFF2-40B4-BE49-F238E27FC236}">
+                  <a16:creationId xmlns:a16="http://schemas.microsoft.com/office/drawing/2014/main" id="{A0D154BD-937F-4708-9E44-C6FE05DDF224}"/>
+                </a:ext>
+              </a:extLst>
+            </p:cNvPr>
+            <p:cNvSpPr txBox="1"/>
+            <p:nvPr/>
+          </p:nvSpPr>
+          <p:spPr>
+            <a:xfrm>
+              <a:off x="4373067" y="2357300"/>
+              <a:ext cx="740451" cy="495469"/>
+            </a:xfrm>
+            <a:prstGeom prst="rect">
+              <a:avLst/>
+            </a:prstGeom>
+            <a:noFill/>
+          </p:spPr>
+          <p:txBody>
+            <a:bodyPr wrap="none" rtlCol="0">
+              <a:spAutoFit/>
+            </a:bodyPr>
+            <a:lstStyle/>
+            <a:p>
+              <a:r>
+                <a:rPr lang="en-US" altLang="zh-CN" sz="900" dirty="0">
+                  <a:solidFill>
+                    <a:srgbClr val="00B0F0"/>
+                  </a:solidFill>
+                </a:rPr>
+                <a:t>1m</a:t>
+              </a:r>
+              <a:endParaRPr lang="zh-CN" altLang="en-US" sz="900" dirty="0">
+                <a:solidFill>
+                  <a:srgbClr val="00B0F0"/>
+                </a:solidFill>
+              </a:endParaRPr>
+            </a:p>
+          </p:txBody>
+        </p:sp>
+      </p:grpSp>
+      <p:pic>
+        <p:nvPicPr>
+          <p:cNvPr id="31" name="图片 30">
+            <a:extLst>
+              <a:ext uri="{FF2B5EF4-FFF2-40B4-BE49-F238E27FC236}">
+                <a16:creationId xmlns:a16="http://schemas.microsoft.com/office/drawing/2014/main" id="{6EC0BD79-1238-4B2D-B45C-18AAE5842F87}"/>
+              </a:ext>
+            </a:extLst>
+          </p:cNvPr>
+          <p:cNvPicPr>
+            <a:picLocks noChangeAspect="1"/>
+          </p:cNvPicPr>
+          <p:nvPr/>
+        </p:nvPicPr>
+        <p:blipFill>
+          <a:blip r:embed="rId4"/>
+          <a:srcRect/>
+          <a:stretch/>
+        </p:blipFill>
+        <p:spPr>
+          <a:xfrm>
+            <a:off x="-568068" y="2346927"/>
+            <a:ext cx="6480000" cy="1620000"/>
+          </a:xfrm>
+          <a:prstGeom prst="rect">
+            <a:avLst/>
+          </a:prstGeom>
+        </p:spPr>
+      </p:pic>
+      <p:pic>
+        <p:nvPicPr>
+          <p:cNvPr id="33" name="图片 32">
+            <a:extLst>
+              <a:ext uri="{FF2B5EF4-FFF2-40B4-BE49-F238E27FC236}">
+                <a16:creationId xmlns:a16="http://schemas.microsoft.com/office/drawing/2014/main" id="{C84BDE3E-0A96-4D2B-8509-A98AB788CA5F}"/>
+              </a:ext>
+            </a:extLst>
+          </p:cNvPr>
+          <p:cNvPicPr>
+            <a:picLocks noChangeAspect="1"/>
+          </p:cNvPicPr>
+          <p:nvPr/>
+        </p:nvPicPr>
+        <p:blipFill>
+          <a:blip r:embed="rId5"/>
+          <a:srcRect/>
+          <a:stretch/>
+        </p:blipFill>
+        <p:spPr>
+          <a:xfrm>
+            <a:off x="-568070" y="3810000"/>
+            <a:ext cx="6480000" cy="1619999"/>
+          </a:xfrm>
+          <a:prstGeom prst="rect">
+            <a:avLst/>
+          </a:prstGeom>
+        </p:spPr>
+      </p:pic>
+      <p:pic>
+        <p:nvPicPr>
+          <p:cNvPr id="35" name="图片 34">
+            <a:extLst>
+              <a:ext uri="{FF2B5EF4-FFF2-40B4-BE49-F238E27FC236}">
+                <a16:creationId xmlns:a16="http://schemas.microsoft.com/office/drawing/2014/main" id="{ED81AFAD-9C3C-4818-BC14-2F919C053A70}"/>
+              </a:ext>
+            </a:extLst>
+          </p:cNvPr>
+          <p:cNvPicPr>
+            <a:picLocks noChangeAspect="1"/>
+          </p:cNvPicPr>
+          <p:nvPr/>
+        </p:nvPicPr>
+        <p:blipFill>
+          <a:blip r:embed="rId6"/>
+          <a:srcRect/>
+          <a:stretch/>
+        </p:blipFill>
+        <p:spPr>
+          <a:xfrm>
+            <a:off x="-568073" y="5257800"/>
+            <a:ext cx="6480000" cy="1620000"/>
+          </a:xfrm>
+          <a:prstGeom prst="rect">
+            <a:avLst/>
+          </a:prstGeom>
+        </p:spPr>
+      </p:pic>
+      <p:graphicFrame>
+        <p:nvGraphicFramePr>
+          <p:cNvPr id="2" name="表格 2">
+            <a:extLst>
+              <a:ext uri="{FF2B5EF4-FFF2-40B4-BE49-F238E27FC236}">
+                <a16:creationId xmlns:a16="http://schemas.microsoft.com/office/drawing/2014/main" id="{E5DB6E62-07B5-4FB6-A18E-2D7B79820588}"/>
+              </a:ext>
+            </a:extLst>
+          </p:cNvPr>
+          <p:cNvGraphicFramePr>
+            <a:graphicFrameLocks noGrp="1"/>
+          </p:cNvGraphicFramePr>
+          <p:nvPr/>
+        </p:nvGraphicFramePr>
+        <p:xfrm>
+          <a:off x="5727266" y="1348889"/>
+          <a:ext cx="2209800" cy="1097280"/>
+        </p:xfrm>
+        <a:graphic>
+          <a:graphicData uri="http://schemas.openxmlformats.org/drawingml/2006/table">
+            <a:tbl>
+              <a:tblPr firstRow="1" bandRow="1">
+                <a:tableStyleId>{5C22544A-7EE6-4342-B048-85BDC9FD1C3A}</a:tableStyleId>
+              </a:tblPr>
+              <a:tblGrid>
+                <a:gridCol w="735451">
+                  <a:extLst>
+                    <a:ext uri="{9D8B030D-6E8A-4147-A177-3AD203B41FA5}">
+                      <a16:colId xmlns:a16="http://schemas.microsoft.com/office/drawing/2014/main" val="2508812721"/>
+                    </a:ext>
+                  </a:extLst>
+                </a:gridCol>
+                <a:gridCol w="1474349">
+                  <a:extLst>
+                    <a:ext uri="{9D8B030D-6E8A-4147-A177-3AD203B41FA5}">
+                      <a16:colId xmlns:a16="http://schemas.microsoft.com/office/drawing/2014/main" val="4227102101"/>
+                    </a:ext>
+                  </a:extLst>
+                </a:gridCol>
+              </a:tblGrid>
+              <a:tr h="272317">
+                <a:tc>
+                  <a:txBody>
+                    <a:bodyPr/>
+                    <a:lstStyle/>
+                    <a:p>
+                      <a:endParaRPr lang="zh-CN" altLang="en-US" sz="1200" dirty="0"/>
+                    </a:p>
+                  </a:txBody>
+                  <a:tcPr/>
+                </a:tc>
+                <a:tc>
+                  <a:txBody>
+                    <a:bodyPr/>
+                    <a:lstStyle/>
+                    <a:p>
+                      <a:r>
+                        <a:rPr lang="en-US" altLang="zh-CN" sz="1200" dirty="0"/>
+                        <a:t>Pulse duration</a:t>
+                      </a:r>
+                      <a:endParaRPr lang="zh-CN" altLang="en-US" sz="1200" dirty="0"/>
+                    </a:p>
+                  </a:txBody>
+                  <a:tcPr/>
+                </a:tc>
+                <a:extLst>
+                  <a:ext uri="{0D108BD9-81ED-4DB2-BD59-A6C34878D82A}">
+                    <a16:rowId xmlns:a16="http://schemas.microsoft.com/office/drawing/2014/main" val="3762957718"/>
+                  </a:ext>
+                </a:extLst>
+              </a:tr>
+              <a:tr h="272317">
+                <a:tc>
+                  <a:txBody>
+                    <a:bodyPr/>
+                    <a:lstStyle/>
+                    <a:p>
+                      <a:r>
+                        <a:rPr lang="en-US" altLang="zh-CN" sz="1200" dirty="0"/>
+                        <a:t>Top</a:t>
+                      </a:r>
+                      <a:endParaRPr lang="zh-CN" altLang="en-US" sz="1200" dirty="0"/>
+                    </a:p>
+                  </a:txBody>
+                  <a:tcPr/>
+                </a:tc>
+                <a:tc>
+                  <a:txBody>
+                    <a:bodyPr/>
+                    <a:lstStyle/>
+                    <a:p>
+                      <a:r>
+                        <a:rPr lang="en-US" altLang="zh-CN" sz="1200" dirty="0"/>
+                        <a:t>1 fs</a:t>
+                      </a:r>
+                      <a:endParaRPr lang="zh-CN" altLang="en-US" sz="1200" dirty="0"/>
+                    </a:p>
+                  </a:txBody>
+                  <a:tcPr/>
+                </a:tc>
+                <a:extLst>
+                  <a:ext uri="{0D108BD9-81ED-4DB2-BD59-A6C34878D82A}">
+                    <a16:rowId xmlns:a16="http://schemas.microsoft.com/office/drawing/2014/main" val="2494080765"/>
+                  </a:ext>
+                </a:extLst>
+              </a:tr>
+              <a:tr h="272317">
+                <a:tc>
+                  <a:txBody>
+                    <a:bodyPr/>
+                    <a:lstStyle/>
+                    <a:p>
+                      <a:r>
+                        <a:rPr lang="en-US" altLang="zh-CN" sz="1200" dirty="0"/>
+                        <a:t>Mid</a:t>
+                      </a:r>
+                      <a:endParaRPr lang="zh-CN" altLang="en-US" sz="1200" dirty="0"/>
+                    </a:p>
+                  </a:txBody>
+                  <a:tcPr/>
+                </a:tc>
+                <a:tc>
+                  <a:txBody>
+                    <a:bodyPr/>
+                    <a:lstStyle/>
+                    <a:p>
+                      <a:r>
+                        <a:rPr lang="en-US" altLang="zh-CN" sz="1200" dirty="0"/>
+                        <a:t>10 fs</a:t>
+                      </a:r>
+                      <a:endParaRPr lang="zh-CN" altLang="en-US" sz="1200" dirty="0"/>
+                    </a:p>
+                  </a:txBody>
+                  <a:tcPr/>
+                </a:tc>
+                <a:extLst>
+                  <a:ext uri="{0D108BD9-81ED-4DB2-BD59-A6C34878D82A}">
+                    <a16:rowId xmlns:a16="http://schemas.microsoft.com/office/drawing/2014/main" val="1357814628"/>
+                  </a:ext>
+                </a:extLst>
+              </a:tr>
+              <a:tr h="272317">
+                <a:tc>
+                  <a:txBody>
+                    <a:bodyPr/>
+                    <a:lstStyle/>
+                    <a:p>
+                      <a:r>
+                        <a:rPr lang="en-US" altLang="zh-CN" sz="1200" dirty="0"/>
+                        <a:t>Bottom</a:t>
+                      </a:r>
+                      <a:endParaRPr lang="zh-CN" altLang="en-US" sz="1200" dirty="0"/>
+                    </a:p>
+                  </a:txBody>
+                  <a:tcPr/>
+                </a:tc>
+                <a:tc>
+                  <a:txBody>
+                    <a:bodyPr/>
+                    <a:lstStyle/>
+                    <a:p>
+                      <a:r>
+                        <a:rPr lang="en-US" altLang="zh-CN" sz="1200" dirty="0"/>
+                        <a:t>50 fs</a:t>
+                      </a:r>
+                      <a:endParaRPr lang="zh-CN" altLang="en-US" sz="1200" dirty="0"/>
+                    </a:p>
+                  </a:txBody>
+                  <a:tcPr/>
+                </a:tc>
+                <a:extLst>
+                  <a:ext uri="{0D108BD9-81ED-4DB2-BD59-A6C34878D82A}">
+                    <a16:rowId xmlns:a16="http://schemas.microsoft.com/office/drawing/2014/main" val="3299385531"/>
+                  </a:ext>
+                </a:extLst>
+              </a:tr>
+            </a:tbl>
+          </a:graphicData>
+        </a:graphic>
+      </p:graphicFrame>
+      <p:sp>
+        <p:nvSpPr>
+          <p:cNvPr id="21" name="Content Placeholder 29">
+            <a:extLst>
+              <a:ext uri="{FF2B5EF4-FFF2-40B4-BE49-F238E27FC236}">
+                <a16:creationId xmlns:a16="http://schemas.microsoft.com/office/drawing/2014/main" id="{9702A31B-1747-4FF6-8502-95CCFDEE3B63}"/>
+              </a:ext>
+            </a:extLst>
+          </p:cNvPr>
+          <p:cNvSpPr txBox="1">
+            <a:spLocks/>
+          </p:cNvSpPr>
+          <p:nvPr/>
+        </p:nvSpPr>
+        <p:spPr>
+          <a:xfrm>
+            <a:off x="5410200" y="2627108"/>
+            <a:ext cx="3581400" cy="3681998"/>
+          </a:xfrm>
+          <a:prstGeom prst="rect">
+            <a:avLst/>
+          </a:prstGeom>
+        </p:spPr>
+        <p:txBody>
+          <a:bodyPr vert="horz" lIns="0" tIns="0" rIns="0" bIns="0" rtlCol="0">
+            <a:normAutofit/>
+          </a:bodyPr>
+          <a:lstStyle>
+            <a:lvl1pPr marL="0" indent="0" algn="l" defTabSz="914400" rtl="0" eaLnBrk="1" latinLnBrk="0" hangingPunct="1">
+              <a:lnSpc>
+                <a:spcPct val="120000"/>
+              </a:lnSpc>
+              <a:spcBef>
+                <a:spcPts val="0"/>
+              </a:spcBef>
+              <a:spcAft>
+                <a:spcPts val="300"/>
+              </a:spcAft>
+              <a:buClr>
+                <a:srgbClr val="981E32"/>
+              </a:buClr>
+              <a:buFont typeface="Arial" pitchFamily="34" charset="0"/>
+              <a:buNone/>
+              <a:defRPr sz="2400" b="0" kern="1200" baseline="0">
+                <a:solidFill>
+                  <a:schemeClr val="tx1"/>
+                </a:solidFill>
+                <a:latin typeface="Arial" pitchFamily="34" charset="0"/>
+                <a:ea typeface="+mn-ea"/>
+                <a:cs typeface="Arial" pitchFamily="34" charset="0"/>
+              </a:defRPr>
+            </a:lvl1pPr>
+            <a:lvl2pPr marL="457200" indent="-223838" algn="l" defTabSz="914400" rtl="0" eaLnBrk="1" latinLnBrk="0" hangingPunct="1">
+              <a:lnSpc>
+                <a:spcPct val="120000"/>
+              </a:lnSpc>
+              <a:spcBef>
+                <a:spcPts val="0"/>
+              </a:spcBef>
+              <a:spcAft>
+                <a:spcPts val="0"/>
+              </a:spcAft>
+              <a:buClr>
+                <a:srgbClr val="981E32"/>
+              </a:buClr>
+              <a:buSzPct val="120000"/>
+              <a:buFont typeface="Arial" pitchFamily="34" charset="0"/>
+              <a:buChar char="•"/>
+              <a:defRPr sz="2200" kern="1200">
+                <a:solidFill>
+                  <a:schemeClr val="tx1"/>
+                </a:solidFill>
+                <a:latin typeface="Arial" pitchFamily="34" charset="0"/>
+                <a:ea typeface="+mn-ea"/>
+                <a:cs typeface="Arial" pitchFamily="34" charset="0"/>
+              </a:defRPr>
+            </a:lvl2pPr>
+            <a:lvl3pPr marL="690563" indent="-233363" algn="l" defTabSz="914400" rtl="0" eaLnBrk="1" latinLnBrk="0" hangingPunct="1">
+              <a:lnSpc>
+                <a:spcPct val="120000"/>
+              </a:lnSpc>
+              <a:spcBef>
+                <a:spcPts val="0"/>
+              </a:spcBef>
+              <a:buClr>
+                <a:srgbClr val="981E32"/>
+              </a:buClr>
+              <a:buSzPct val="120000"/>
+              <a:buFont typeface="Arial" pitchFamily="34" charset="0"/>
+              <a:buChar char="-"/>
+              <a:defRPr sz="2000" b="0" kern="1200">
+                <a:solidFill>
+                  <a:schemeClr val="tx1"/>
+                </a:solidFill>
+                <a:latin typeface="Arial" pitchFamily="34" charset="0"/>
+                <a:ea typeface="+mn-ea"/>
+                <a:cs typeface="Arial" pitchFamily="34" charset="0"/>
+              </a:defRPr>
+            </a:lvl3pPr>
+            <a:lvl4pPr marL="914400" indent="-223838" algn="l" defTabSz="914400" rtl="0" eaLnBrk="1" latinLnBrk="0" hangingPunct="1">
+              <a:lnSpc>
+                <a:spcPct val="120000"/>
+              </a:lnSpc>
+              <a:spcBef>
+                <a:spcPts val="0"/>
+              </a:spcBef>
+              <a:buClr>
+                <a:srgbClr val="981E32"/>
+              </a:buClr>
+              <a:buSzPct val="120000"/>
+              <a:buFont typeface="Arial" pitchFamily="34" charset="0"/>
+              <a:buChar char="•"/>
+              <a:defRPr sz="1800" kern="1200">
+                <a:solidFill>
+                  <a:schemeClr val="tx1"/>
+                </a:solidFill>
+                <a:latin typeface="Arial" pitchFamily="34" charset="0"/>
+                <a:ea typeface="+mn-ea"/>
+                <a:cs typeface="Arial" pitchFamily="34" charset="0"/>
+              </a:defRPr>
+            </a:lvl4pPr>
+            <a:lvl5pPr marL="1147763" indent="-233363" algn="l" defTabSz="914400" rtl="0" eaLnBrk="1" latinLnBrk="0" hangingPunct="1">
+              <a:lnSpc>
+                <a:spcPct val="120000"/>
+              </a:lnSpc>
+              <a:spcBef>
+                <a:spcPts val="0"/>
+              </a:spcBef>
+              <a:buClr>
+                <a:srgbClr val="981E32"/>
+              </a:buClr>
+              <a:buSzPct val="120000"/>
+              <a:buFont typeface="Arial" pitchFamily="34" charset="0"/>
+              <a:buChar char="-"/>
+              <a:defRPr sz="1600" kern="1200">
+                <a:solidFill>
+                  <a:schemeClr val="tx1"/>
+                </a:solidFill>
+                <a:latin typeface="+mn-lt"/>
+                <a:ea typeface="+mn-ea"/>
+                <a:cs typeface="+mn-cs"/>
+              </a:defRPr>
+            </a:lvl5pPr>
+            <a:lvl6pPr marL="2514600" indent="-228600" algn="l" defTabSz="914400" rtl="0" eaLnBrk="1" latinLnBrk="0" hangingPunct="1">
+              <a:spcBef>
+                <a:spcPct val="20000"/>
+              </a:spcBef>
+              <a:buFont typeface="Arial" pitchFamily="34" charset="0"/>
+              <a:buChar char="•"/>
+              <a:defRPr sz="2000" kern="1200">
+                <a:solidFill>
+                  <a:schemeClr val="tx1"/>
+                </a:solidFill>
+                <a:latin typeface="+mn-lt"/>
+                <a:ea typeface="+mn-ea"/>
+                <a:cs typeface="+mn-cs"/>
+              </a:defRPr>
+            </a:lvl6pPr>
+            <a:lvl7pPr marL="2971800" indent="-228600" algn="l" defTabSz="914400" rtl="0" eaLnBrk="1" latinLnBrk="0" hangingPunct="1">
+              <a:spcBef>
+                <a:spcPct val="20000"/>
+              </a:spcBef>
+              <a:buFont typeface="Arial" pitchFamily="34" charset="0"/>
+              <a:buChar char="•"/>
+              <a:defRPr sz="2000" kern="1200">
+                <a:solidFill>
+                  <a:schemeClr val="tx1"/>
+                </a:solidFill>
+                <a:latin typeface="+mn-lt"/>
+                <a:ea typeface="+mn-ea"/>
+                <a:cs typeface="+mn-cs"/>
+              </a:defRPr>
+            </a:lvl7pPr>
+            <a:lvl8pPr marL="3429000" indent="-228600" algn="l" defTabSz="914400" rtl="0" eaLnBrk="1" latinLnBrk="0" hangingPunct="1">
+              <a:spcBef>
+                <a:spcPct val="20000"/>
+              </a:spcBef>
+              <a:buFont typeface="Arial" pitchFamily="34" charset="0"/>
+              <a:buChar char="•"/>
+              <a:defRPr sz="2000" kern="1200">
+                <a:solidFill>
+                  <a:schemeClr val="tx1"/>
+                </a:solidFill>
+                <a:latin typeface="+mn-lt"/>
+                <a:ea typeface="+mn-ea"/>
+                <a:cs typeface="+mn-cs"/>
+              </a:defRPr>
+            </a:lvl8pPr>
+            <a:lvl9pPr marL="3886200" indent="-228600" algn="l" defTabSz="914400" rtl="0" eaLnBrk="1" latinLnBrk="0" hangingPunct="1">
+              <a:spcBef>
+                <a:spcPct val="20000"/>
+              </a:spcBef>
+              <a:buFont typeface="Arial" pitchFamily="34" charset="0"/>
+              <a:buChar char="•"/>
+              <a:defRPr sz="2000" kern="1200">
+                <a:solidFill>
+                  <a:schemeClr val="tx1"/>
+                </a:solidFill>
+                <a:latin typeface="+mn-lt"/>
+                <a:ea typeface="+mn-ea"/>
+                <a:cs typeface="+mn-cs"/>
+              </a:defRPr>
+            </a:lvl9pPr>
+          </a:lstStyle>
+          <a:p>
+            <a:pPr marL="233362" lvl="1" indent="0">
+              <a:buFont typeface="Arial" pitchFamily="34" charset="0"/>
+              <a:buNone/>
+            </a:pPr>
+            <a:endParaRPr lang="en-US" sz="1400" dirty="0"/>
+          </a:p>
+        </p:txBody>
+      </p:sp>
+      <p:sp>
+        <p:nvSpPr>
+          <p:cNvPr id="22" name="Content Placeholder 29">
+            <a:extLst>
+              <a:ext uri="{FF2B5EF4-FFF2-40B4-BE49-F238E27FC236}">
+                <a16:creationId xmlns:a16="http://schemas.microsoft.com/office/drawing/2014/main" id="{73DEE189-048C-4169-9816-3163E217194F}"/>
+              </a:ext>
+            </a:extLst>
+          </p:cNvPr>
+          <p:cNvSpPr>
+            <a:spLocks noGrp="1"/>
+          </p:cNvSpPr>
+          <p:nvPr>
+            <p:ph sz="quarter" idx="14"/>
+          </p:nvPr>
+        </p:nvSpPr>
+        <p:spPr>
+          <a:xfrm>
+            <a:off x="5562600" y="2779508"/>
+            <a:ext cx="3581400" cy="3681998"/>
+          </a:xfrm>
+        </p:spPr>
+        <p:txBody>
+          <a:bodyPr>
+            <a:normAutofit/>
+          </a:bodyPr>
+          <a:lstStyle/>
+          <a:p>
+            <a:pPr marL="233362" lvl="1" indent="0">
+              <a:buNone/>
+            </a:pPr>
+            <a:r>
+              <a:rPr lang="en-US" sz="1400" dirty="0"/>
+              <a:t>Looks alright now</a:t>
+            </a:r>
+          </a:p>
+        </p:txBody>
+      </p:sp>
+    </p:spTree>
+    <p:extLst>
+      <p:ext uri="{BB962C8B-B14F-4D97-AF65-F5344CB8AC3E}">
+        <p14:creationId xmlns:p14="http://schemas.microsoft.com/office/powerpoint/2010/main" val="2141101455"/>
       </p:ext>
     </p:extLst>
   </p:cSld>
@@ -17628,15 +18325,6 @@
 </file>
 
 <file path=customXml/item1.xml><?xml version="1.0" encoding="utf-8"?>
-<?mso-contentType ?>
-<FormTemplates xmlns="http://schemas.microsoft.com/sharepoint/v3/contenttype/forms">
-  <Display>DocumentLibraryForm</Display>
-  <Edit>DocumentLibraryForm</Edit>
-  <New>DocumentLibraryForm</New>
-</FormTemplates>
-</file>
-
-<file path=customXml/item2.xml><?xml version="1.0" encoding="utf-8"?>
 <ct:contentTypeSchema xmlns:ct="http://schemas.microsoft.com/office/2006/metadata/contentType" xmlns:ma="http://schemas.microsoft.com/office/2006/metadata/properties/metaAttributes" ct:_="" ma:_="" ma:contentTypeName="Document" ma:contentTypeID="0x0101003309C022A5BACE4D8A86646BFE6F373A" ma:contentTypeVersion="6" ma:contentTypeDescription="Create a new document." ma:contentTypeScope="" ma:versionID="fa09eca8e9885d653412965b564ef40e">
   <xsd:schema xmlns:xsd="http://www.w3.org/2001/XMLSchema" xmlns:xs="http://www.w3.org/2001/XMLSchema" xmlns:p="http://schemas.microsoft.com/office/2006/metadata/properties" xmlns:ns1="http://schemas.microsoft.com/sharepoint/v3" xmlns:ns2="be4c3ea6-cad5-4867-91d9-7216788d6e80" targetNamespace="http://schemas.microsoft.com/office/2006/metadata/properties" ma:root="true" ma:fieldsID="5e650a32204f281424193f6b0635a9f5" ns1:_="" ns2:_="">
     <xsd:import namespace="http://schemas.microsoft.com/sharepoint/v3"/>
@@ -17810,6 +18498,15 @@
 </ct:contentTypeSchema>
 </file>
 
+<file path=customXml/item2.xml><?xml version="1.0" encoding="utf-8"?>
+<?mso-contentType ?>
+<FormTemplates xmlns="http://schemas.microsoft.com/sharepoint/v3/contenttype/forms">
+  <Display>DocumentLibraryForm</Display>
+  <Edit>DocumentLibraryForm</Edit>
+  <New>DocumentLibraryForm</New>
+</FormTemplates>
+</file>
+
 <file path=customXml/item3.xml><?xml version="1.0" encoding="utf-8"?>
 <p:properties xmlns:p="http://schemas.microsoft.com/office/2006/metadata/properties" xmlns:xsi="http://www.w3.org/2001/XMLSchema-instance" xmlns:pc="http://schemas.microsoft.com/office/infopath/2007/PartnerControls">
   <documentManagement>
@@ -17825,14 +18522,6 @@
 </file>
 
 <file path=customXml/itemProps1.xml><?xml version="1.0" encoding="utf-8"?>
-<ds:datastoreItem xmlns:ds="http://schemas.openxmlformats.org/officeDocument/2006/customXml" ds:itemID="{0D38D205-A273-4ABA-A83A-77DB3B1F8800}">
-  <ds:schemaRefs>
-    <ds:schemaRef ds:uri="http://schemas.microsoft.com/sharepoint/v3/contenttype/forms"/>
-  </ds:schemaRefs>
-</ds:datastoreItem>
-</file>
-
-<file path=customXml/itemProps2.xml><?xml version="1.0" encoding="utf-8"?>
 <ds:datastoreItem xmlns:ds="http://schemas.openxmlformats.org/officeDocument/2006/customXml" ds:itemID="{320C2239-B20E-4DE6-814B-AECCA40A802B}">
   <ds:schemaRefs>
     <ds:schemaRef ds:uri="http://schemas.microsoft.com/office/2006/metadata/contentType"/>
@@ -17851,6 +18540,14 @@
 </ds:datastoreItem>
 </file>
 
+<file path=customXml/itemProps2.xml><?xml version="1.0" encoding="utf-8"?>
+<ds:datastoreItem xmlns:ds="http://schemas.openxmlformats.org/officeDocument/2006/customXml" ds:itemID="{0D38D205-A273-4ABA-A83A-77DB3B1F8800}">
+  <ds:schemaRefs>
+    <ds:schemaRef ds:uri="http://schemas.microsoft.com/sharepoint/v3/contenttype/forms"/>
+  </ds:schemaRefs>
+</ds:datastoreItem>
+</file>
+
 <file path=customXml/itemProps3.xml><?xml version="1.0" encoding="utf-8"?>
 <ds:datastoreItem xmlns:ds="http://schemas.openxmlformats.org/officeDocument/2006/customXml" ds:itemID="{B5DC465C-0AFA-4B02-8D00-CB14DF55DD98}">
   <ds:schemaRefs>

</xml_diff>